<commit_message>
add codepen link in notes
</commit_message>
<xml_diff>
--- a/Week02/IntroductionToJavaScript.pptx
+++ b/Week02/IntroductionToJavaScript.pptx
@@ -215,7 +215,7 @@
           <a:p>
             <a:fld id="{60C6A8C3-8392-4BC1-B99F-0D6991348B0F}" type="datetimeFigureOut">
               <a:rPr lang="en-US" smtClean="0"/>
-              <a:t>9/26/2018</a:t>
+              <a:t>2/17/2020</a:t>
             </a:fld>
             <a:endParaRPr lang="en-US"/>
           </a:p>
@@ -701,13 +701,8 @@
             </a:r>
             <a:r>
               <a:rPr lang="en-US" b="0" baseline="0" dirty="0" smtClean="0"/>
-              <a:t> will be shown</a:t>
-            </a:r>
-            <a:r>
-              <a:rPr lang="en-US" b="0" baseline="0" dirty="0" smtClean="0"/>
-              <a:t>.</a:t>
-            </a:r>
-            <a:endParaRPr lang="en-US" b="0" baseline="0" dirty="0" smtClean="0"/>
+              <a:t> will be shown.</a:t>
+            </a:r>
           </a:p>
         </p:txBody>
       </p:sp>
@@ -1245,13 +1240,8 @@
             </a:r>
             <a:r>
               <a:rPr lang="en-US" baseline="0" dirty="0" smtClean="0"/>
-              <a:t> and how they were interactive</a:t>
-            </a:r>
-            <a:r>
-              <a:rPr lang="en-US" baseline="0" dirty="0" smtClean="0"/>
-              <a:t>.</a:t>
-            </a:r>
-            <a:endParaRPr lang="en-US" baseline="0" dirty="0" smtClean="0"/>
+              <a:t> and how they were interactive.</a:t>
+            </a:r>
           </a:p>
         </p:txBody>
       </p:sp>
@@ -1921,6 +1911,10 @@
           <a:bodyPr/>
           <a:lstStyle/>
           <a:p>
+            <a:r>
+              <a:rPr lang="en-US" dirty="0" smtClean="0"/>
+              <a:t>https://codepen.io/jmaxwell/pen/oPjOvv?editors=1000</a:t>
+            </a:r>
             <a:endParaRPr lang="en-US" dirty="0"/>
           </a:p>
         </p:txBody>
@@ -2092,7 +2086,7 @@
           <a:p>
             <a:fld id="{61FD5E12-641C-4696-BA65-B86205845F69}" type="datetimeFigureOut">
               <a:rPr lang="en-US" smtClean="0"/>
-              <a:t>9/26/2018</a:t>
+              <a:t>2/17/2020</a:t>
             </a:fld>
             <a:endParaRPr lang="en-US"/>
           </a:p>
@@ -2262,7 +2256,7 @@
           <a:p>
             <a:fld id="{61FD5E12-641C-4696-BA65-B86205845F69}" type="datetimeFigureOut">
               <a:rPr lang="en-US" smtClean="0"/>
-              <a:t>9/26/2018</a:t>
+              <a:t>2/17/2020</a:t>
             </a:fld>
             <a:endParaRPr lang="en-US"/>
           </a:p>
@@ -2442,7 +2436,7 @@
           <a:p>
             <a:fld id="{61FD5E12-641C-4696-BA65-B86205845F69}" type="datetimeFigureOut">
               <a:rPr lang="en-US" smtClean="0"/>
-              <a:t>9/26/2018</a:t>
+              <a:t>2/17/2020</a:t>
             </a:fld>
             <a:endParaRPr lang="en-US"/>
           </a:p>
@@ -3242,7 +3236,7 @@
           <a:p>
             <a:fld id="{61FD5E12-641C-4696-BA65-B86205845F69}" type="datetimeFigureOut">
               <a:rPr lang="en-US" smtClean="0"/>
-              <a:t>9/26/2018</a:t>
+              <a:t>2/17/2020</a:t>
             </a:fld>
             <a:endParaRPr lang="en-US"/>
           </a:p>
@@ -3488,7 +3482,7 @@
           <a:p>
             <a:fld id="{61FD5E12-641C-4696-BA65-B86205845F69}" type="datetimeFigureOut">
               <a:rPr lang="en-US" smtClean="0"/>
-              <a:t>9/26/2018</a:t>
+              <a:t>2/17/2020</a:t>
             </a:fld>
             <a:endParaRPr lang="en-US"/>
           </a:p>
@@ -3720,7 +3714,7 @@
           <a:p>
             <a:fld id="{61FD5E12-641C-4696-BA65-B86205845F69}" type="datetimeFigureOut">
               <a:rPr lang="en-US" smtClean="0"/>
-              <a:t>9/26/2018</a:t>
+              <a:t>2/17/2020</a:t>
             </a:fld>
             <a:endParaRPr lang="en-US"/>
           </a:p>
@@ -4087,7 +4081,7 @@
           <a:p>
             <a:fld id="{61FD5E12-641C-4696-BA65-B86205845F69}" type="datetimeFigureOut">
               <a:rPr lang="en-US" smtClean="0"/>
-              <a:t>9/26/2018</a:t>
+              <a:t>2/17/2020</a:t>
             </a:fld>
             <a:endParaRPr lang="en-US"/>
           </a:p>
@@ -4205,7 +4199,7 @@
           <a:p>
             <a:fld id="{61FD5E12-641C-4696-BA65-B86205845F69}" type="datetimeFigureOut">
               <a:rPr lang="en-US" smtClean="0"/>
-              <a:t>9/26/2018</a:t>
+              <a:t>2/17/2020</a:t>
             </a:fld>
             <a:endParaRPr lang="en-US"/>
           </a:p>
@@ -4300,7 +4294,7 @@
           <a:p>
             <a:fld id="{61FD5E12-641C-4696-BA65-B86205845F69}" type="datetimeFigureOut">
               <a:rPr lang="en-US" smtClean="0"/>
-              <a:t>9/26/2018</a:t>
+              <a:t>2/17/2020</a:t>
             </a:fld>
             <a:endParaRPr lang="en-US"/>
           </a:p>
@@ -4577,7 +4571,7 @@
           <a:p>
             <a:fld id="{61FD5E12-641C-4696-BA65-B86205845F69}" type="datetimeFigureOut">
               <a:rPr lang="en-US" smtClean="0"/>
-              <a:t>9/26/2018</a:t>
+              <a:t>2/17/2020</a:t>
             </a:fld>
             <a:endParaRPr lang="en-US"/>
           </a:p>
@@ -4834,7 +4828,7 @@
           <a:p>
             <a:fld id="{61FD5E12-641C-4696-BA65-B86205845F69}" type="datetimeFigureOut">
               <a:rPr lang="en-US" smtClean="0"/>
-              <a:t>9/26/2018</a:t>
+              <a:t>2/17/2020</a:t>
             </a:fld>
             <a:endParaRPr lang="en-US"/>
           </a:p>
@@ -5047,7 +5041,7 @@
           <a:p>
             <a:fld id="{61FD5E12-641C-4696-BA65-B86205845F69}" type="datetimeFigureOut">
               <a:rPr lang="en-US" smtClean="0"/>
-              <a:t>9/26/2018</a:t>
+              <a:t>2/17/2020</a:t>
             </a:fld>
             <a:endParaRPr lang="en-US"/>
           </a:p>

</xml_diff>

<commit_message>
Deploy hytechclub/web-102 to github.com/hytechclub/web-102.git:gh-pages
</commit_message>
<xml_diff>
--- a/Week02/IntroductionToJavaScript.pptx
+++ b/Week02/IntroductionToJavaScript.pptx
@@ -215,7 +215,7 @@
           <a:p>
             <a:fld id="{60C6A8C3-8392-4BC1-B99F-0D6991348B0F}" type="datetimeFigureOut">
               <a:rPr lang="en-US" smtClean="0"/>
-              <a:t>9/26/2018</a:t>
+              <a:t>2/17/2020</a:t>
             </a:fld>
             <a:endParaRPr lang="en-US"/>
           </a:p>
@@ -701,13 +701,8 @@
             </a:r>
             <a:r>
               <a:rPr lang="en-US" b="0" baseline="0" dirty="0" smtClean="0"/>
-              <a:t> will be shown</a:t>
-            </a:r>
-            <a:r>
-              <a:rPr lang="en-US" b="0" baseline="0" dirty="0" smtClean="0"/>
-              <a:t>.</a:t>
-            </a:r>
-            <a:endParaRPr lang="en-US" b="0" baseline="0" dirty="0" smtClean="0"/>
+              <a:t> will be shown.</a:t>
+            </a:r>
           </a:p>
         </p:txBody>
       </p:sp>
@@ -1245,13 +1240,8 @@
             </a:r>
             <a:r>
               <a:rPr lang="en-US" baseline="0" dirty="0" smtClean="0"/>
-              <a:t> and how they were interactive</a:t>
-            </a:r>
-            <a:r>
-              <a:rPr lang="en-US" baseline="0" dirty="0" smtClean="0"/>
-              <a:t>.</a:t>
-            </a:r>
-            <a:endParaRPr lang="en-US" baseline="0" dirty="0" smtClean="0"/>
+              <a:t> and how they were interactive.</a:t>
+            </a:r>
           </a:p>
         </p:txBody>
       </p:sp>
@@ -1921,6 +1911,10 @@
           <a:bodyPr/>
           <a:lstStyle/>
           <a:p>
+            <a:r>
+              <a:rPr lang="en-US" dirty="0" smtClean="0"/>
+              <a:t>https://codepen.io/jmaxwell/pen/oPjOvv?editors=1000</a:t>
+            </a:r>
             <a:endParaRPr lang="en-US" dirty="0"/>
           </a:p>
         </p:txBody>
@@ -2092,7 +2086,7 @@
           <a:p>
             <a:fld id="{61FD5E12-641C-4696-BA65-B86205845F69}" type="datetimeFigureOut">
               <a:rPr lang="en-US" smtClean="0"/>
-              <a:t>9/26/2018</a:t>
+              <a:t>2/17/2020</a:t>
             </a:fld>
             <a:endParaRPr lang="en-US"/>
           </a:p>
@@ -2262,7 +2256,7 @@
           <a:p>
             <a:fld id="{61FD5E12-641C-4696-BA65-B86205845F69}" type="datetimeFigureOut">
               <a:rPr lang="en-US" smtClean="0"/>
-              <a:t>9/26/2018</a:t>
+              <a:t>2/17/2020</a:t>
             </a:fld>
             <a:endParaRPr lang="en-US"/>
           </a:p>
@@ -2442,7 +2436,7 @@
           <a:p>
             <a:fld id="{61FD5E12-641C-4696-BA65-B86205845F69}" type="datetimeFigureOut">
               <a:rPr lang="en-US" smtClean="0"/>
-              <a:t>9/26/2018</a:t>
+              <a:t>2/17/2020</a:t>
             </a:fld>
             <a:endParaRPr lang="en-US"/>
           </a:p>
@@ -3242,7 +3236,7 @@
           <a:p>
             <a:fld id="{61FD5E12-641C-4696-BA65-B86205845F69}" type="datetimeFigureOut">
               <a:rPr lang="en-US" smtClean="0"/>
-              <a:t>9/26/2018</a:t>
+              <a:t>2/17/2020</a:t>
             </a:fld>
             <a:endParaRPr lang="en-US"/>
           </a:p>
@@ -3488,7 +3482,7 @@
           <a:p>
             <a:fld id="{61FD5E12-641C-4696-BA65-B86205845F69}" type="datetimeFigureOut">
               <a:rPr lang="en-US" smtClean="0"/>
-              <a:t>9/26/2018</a:t>
+              <a:t>2/17/2020</a:t>
             </a:fld>
             <a:endParaRPr lang="en-US"/>
           </a:p>
@@ -3720,7 +3714,7 @@
           <a:p>
             <a:fld id="{61FD5E12-641C-4696-BA65-B86205845F69}" type="datetimeFigureOut">
               <a:rPr lang="en-US" smtClean="0"/>
-              <a:t>9/26/2018</a:t>
+              <a:t>2/17/2020</a:t>
             </a:fld>
             <a:endParaRPr lang="en-US"/>
           </a:p>
@@ -4087,7 +4081,7 @@
           <a:p>
             <a:fld id="{61FD5E12-641C-4696-BA65-B86205845F69}" type="datetimeFigureOut">
               <a:rPr lang="en-US" smtClean="0"/>
-              <a:t>9/26/2018</a:t>
+              <a:t>2/17/2020</a:t>
             </a:fld>
             <a:endParaRPr lang="en-US"/>
           </a:p>
@@ -4205,7 +4199,7 @@
           <a:p>
             <a:fld id="{61FD5E12-641C-4696-BA65-B86205845F69}" type="datetimeFigureOut">
               <a:rPr lang="en-US" smtClean="0"/>
-              <a:t>9/26/2018</a:t>
+              <a:t>2/17/2020</a:t>
             </a:fld>
             <a:endParaRPr lang="en-US"/>
           </a:p>
@@ -4300,7 +4294,7 @@
           <a:p>
             <a:fld id="{61FD5E12-641C-4696-BA65-B86205845F69}" type="datetimeFigureOut">
               <a:rPr lang="en-US" smtClean="0"/>
-              <a:t>9/26/2018</a:t>
+              <a:t>2/17/2020</a:t>
             </a:fld>
             <a:endParaRPr lang="en-US"/>
           </a:p>
@@ -4577,7 +4571,7 @@
           <a:p>
             <a:fld id="{61FD5E12-641C-4696-BA65-B86205845F69}" type="datetimeFigureOut">
               <a:rPr lang="en-US" smtClean="0"/>
-              <a:t>9/26/2018</a:t>
+              <a:t>2/17/2020</a:t>
             </a:fld>
             <a:endParaRPr lang="en-US"/>
           </a:p>
@@ -4834,7 +4828,7 @@
           <a:p>
             <a:fld id="{61FD5E12-641C-4696-BA65-B86205845F69}" type="datetimeFigureOut">
               <a:rPr lang="en-US" smtClean="0"/>
-              <a:t>9/26/2018</a:t>
+              <a:t>2/17/2020</a:t>
             </a:fld>
             <a:endParaRPr lang="en-US"/>
           </a:p>
@@ -5047,7 +5041,7 @@
           <a:p>
             <a:fld id="{61FD5E12-641C-4696-BA65-B86205845F69}" type="datetimeFigureOut">
               <a:rPr lang="en-US" smtClean="0"/>
-              <a:t>9/26/2018</a:t>
+              <a:t>2/17/2020</a:t>
             </a:fld>
             <a:endParaRPr lang="en-US"/>
           </a:p>

</xml_diff>

<commit_message>
fall 2022: updates for week 2
</commit_message>
<xml_diff>
--- a/Week02/IntroductionToJavaScript.pptx
+++ b/Week02/IntroductionToJavaScript.pptx
@@ -5,7 +5,7 @@
     <p:sldMasterId id="2147483648" r:id="rId1"/>
   </p:sldMasterIdLst>
   <p:notesMasterIdLst>
-    <p:notesMasterId r:id="rId10"/>
+    <p:notesMasterId r:id="rId11"/>
   </p:notesMasterIdLst>
   <p:sldIdLst>
     <p:sldId id="258" r:id="rId2"/>
@@ -16,6 +16,7 @@
     <p:sldId id="311" r:id="rId7"/>
     <p:sldId id="312" r:id="rId8"/>
     <p:sldId id="313" r:id="rId9"/>
+    <p:sldId id="314" r:id="rId10"/>
   </p:sldIdLst>
   <p:sldSz cx="12192000" cy="6858000"/>
   <p:notesSz cx="6858000" cy="9144000"/>
@@ -215,7 +216,7 @@
           <a:p>
             <a:fld id="{19104133-B5B0-4351-8158-4F0E5EB1E2BF}" type="datetimeFigureOut">
               <a:rPr lang="en-US" smtClean="0"/>
-              <a:t>3/24/2020</a:t>
+              <a:t>9/1/2022</a:t>
             </a:fld>
             <a:endParaRPr lang="en-US"/>
           </a:p>
@@ -279,38 +280,37 @@
           <a:p>
             <a:pPr lvl="0"/>
             <a:r>
-              <a:rPr lang="en-US" smtClean="0"/>
+              <a:rPr lang="en-US"/>
               <a:t>Edit Master text styles</a:t>
             </a:r>
           </a:p>
           <a:p>
             <a:pPr lvl="1"/>
             <a:r>
-              <a:rPr lang="en-US" smtClean="0"/>
+              <a:rPr lang="en-US"/>
               <a:t>Second level</a:t>
             </a:r>
           </a:p>
           <a:p>
             <a:pPr lvl="2"/>
             <a:r>
-              <a:rPr lang="en-US" smtClean="0"/>
+              <a:rPr lang="en-US"/>
               <a:t>Third level</a:t>
             </a:r>
           </a:p>
           <a:p>
             <a:pPr lvl="3"/>
             <a:r>
-              <a:rPr lang="en-US" smtClean="0"/>
+              <a:rPr lang="en-US"/>
               <a:t>Fourth level</a:t>
             </a:r>
           </a:p>
           <a:p>
             <a:pPr lvl="4"/>
             <a:r>
-              <a:rPr lang="en-US" smtClean="0"/>
+              <a:rPr lang="en-US"/>
               <a:t>Fifth level</a:t>
             </a:r>
-            <a:endParaRPr lang="en-US"/>
           </a:p>
         </p:txBody>
       </p:sp>
@@ -528,11 +528,11 @@
           <a:lstStyle/>
           <a:p>
             <a:r>
-              <a:rPr lang="en-US" dirty="0" smtClean="0"/>
+              <a:rPr lang="en-US" dirty="0"/>
               <a:t>Visit the site to show</a:t>
             </a:r>
             <a:r>
-              <a:rPr lang="en-US" baseline="0" dirty="0" smtClean="0"/>
+              <a:rPr lang="en-US" baseline="0" dirty="0"/>
               <a:t> what the web was like before JavaScript. No interactivity – the internet used to be a lot of links going to websites – just a directory</a:t>
             </a:r>
             <a:endParaRPr lang="en-US" dirty="0"/>
@@ -637,11 +637,11 @@
               <a:defRPr/>
             </a:pPr>
             <a:r>
-              <a:rPr lang="en-US" dirty="0" smtClean="0"/>
+              <a:rPr lang="en-US" dirty="0"/>
               <a:t>Ask the students about their favorite websites,</a:t>
             </a:r>
             <a:r>
-              <a:rPr lang="en-US" baseline="0" dirty="0" smtClean="0"/>
+              <a:rPr lang="en-US" baseline="0" dirty="0"/>
               <a:t> and how they were interactive. These are some examples of things JavaScript can do</a:t>
             </a:r>
           </a:p>
@@ -728,11 +728,11 @@
           <a:lstStyle/>
           <a:p>
             <a:r>
-              <a:rPr lang="en-US" dirty="0" smtClean="0"/>
+              <a:rPr lang="en-US" dirty="0"/>
               <a:t>Ask the</a:t>
             </a:r>
             <a:r>
-              <a:rPr lang="en-US" baseline="0" dirty="0" smtClean="0"/>
+              <a:rPr lang="en-US" baseline="0" dirty="0"/>
               <a:t> students to guess what this does</a:t>
             </a:r>
             <a:endParaRPr lang="en-US" dirty="0"/>
@@ -820,11 +820,11 @@
           <a:lstStyle/>
           <a:p>
             <a:r>
-              <a:rPr lang="en-US" dirty="0" smtClean="0"/>
+              <a:rPr lang="en-US" dirty="0"/>
               <a:t>Unpack the important</a:t>
             </a:r>
             <a:r>
-              <a:rPr lang="en-US" baseline="0" dirty="0" smtClean="0"/>
+              <a:rPr lang="en-US" baseline="0" dirty="0"/>
               <a:t> parts of the JavaScript in the example.</a:t>
             </a:r>
             <a:endParaRPr lang="en-US" dirty="0"/>
@@ -912,28 +912,28 @@
           <a:lstStyle/>
           <a:p>
             <a:r>
-              <a:rPr lang="en-US" dirty="0" smtClean="0"/>
+              <a:rPr lang="en-US" dirty="0"/>
               <a:t>List each part of the JavaScript statement. Explain that</a:t>
             </a:r>
             <a:r>
-              <a:rPr lang="en-US" baseline="0" dirty="0" smtClean="0"/>
+              <a:rPr lang="en-US" baseline="0" dirty="0"/>
               <a:t> for the code to work, it has to be </a:t>
             </a:r>
             <a:r>
-              <a:rPr lang="en-US" b="1" i="1" baseline="0" dirty="0" smtClean="0"/>
+              <a:rPr lang="en-US" b="1" i="1" baseline="0" dirty="0"/>
               <a:t>exactly</a:t>
             </a:r>
             <a:r>
-              <a:rPr lang="en-US" b="0" i="0" baseline="0" dirty="0" smtClean="0"/>
+              <a:rPr lang="en-US" b="0" i="0" baseline="0" dirty="0"/>
               <a:t> right.</a:t>
             </a:r>
           </a:p>
           <a:p>
-            <a:endParaRPr lang="en-US" b="0" i="0" baseline="0" dirty="0" smtClean="0"/>
+            <a:endParaRPr lang="en-US" b="0" i="0" baseline="0" dirty="0"/>
           </a:p>
           <a:p>
             <a:r>
-              <a:rPr lang="en-US" b="0" i="0" baseline="0" dirty="0" smtClean="0"/>
+              <a:rPr lang="en-US" b="0" i="0" baseline="0" dirty="0"/>
               <a:t>This statement, when executed, will show the message in a small box in the browser.</a:t>
             </a:r>
             <a:endParaRPr lang="en-US" dirty="0"/>
@@ -1116,15 +1116,7 @@
           <a:p>
             <a:r>
               <a:rPr lang="en-US" dirty="0"/>
-              <a:t>Click to edit Master </a:t>
-            </a:r>
-            <a:r>
-              <a:rPr lang="en-US" dirty="0" smtClean="0"/>
-              <a:t>subtitle </a:t>
-            </a:r>
-            <a:r>
-              <a:rPr lang="en-US" dirty="0"/>
-              <a:t>style</a:t>
+              <a:t>Click to edit Master subtitle style</a:t>
             </a:r>
           </a:p>
         </p:txBody>
@@ -1166,7 +1158,7 @@
             <a:fld id="{1C2D31DE-C454-491C-B5C3-F097855E3DF7}" type="datetime4">
               <a:rPr lang="en-US" smtClean="0"/>
               <a:pPr/>
-              <a:t>March 24, 2020</a:t>
+              <a:t>September 1, 2022</a:t>
             </a:fld>
             <a:endParaRPr lang="en-US" dirty="0"/>
           </a:p>
@@ -4240,17 +4232,16 @@
           <a:p>
             <a:pPr lvl="0"/>
             <a:r>
-              <a:rPr lang="en-US" dirty="0" smtClean="0"/>
+              <a:rPr lang="en-US" dirty="0"/>
               <a:t>Presenter Name</a:t>
             </a:r>
             <a:br>
-              <a:rPr lang="en-US" dirty="0" smtClean="0"/>
+              <a:rPr lang="en-US" dirty="0"/>
             </a:br>
             <a:r>
-              <a:rPr lang="en-US" dirty="0" smtClean="0"/>
+              <a:rPr lang="en-US" dirty="0"/>
               <a:t>Presenter Title</a:t>
             </a:r>
-            <a:endParaRPr lang="en-US" dirty="0"/>
           </a:p>
         </p:txBody>
       </p:sp>
@@ -4267,13 +4258,6 @@
   <p:transition>
     <p:fade/>
   </p:transition>
-  <p:timing>
-    <p:tnLst>
-      <p:par>
-        <p:cTn id="1" dur="indefinite" restart="never" nodeType="tmRoot"/>
-      </p:par>
-    </p:tnLst>
-  </p:timing>
   <p:hf sldNum="0" hdr="0" ftr="0"/>
 </p:sldLayout>
 </file>
@@ -4566,7 +4550,7 @@
           <a:p>
             <a:fld id="{5958763E-B898-436D-883D-03711491D54A}" type="datetimeFigureOut">
               <a:rPr lang="en-US" smtClean="0"/>
-              <a:t>3/24/2020</a:t>
+              <a:t>9/1/2022</a:t>
             </a:fld>
             <a:endParaRPr lang="en-US"/>
           </a:p>
@@ -4639,13 +4623,6 @@
   <p:transition>
     <p:fade/>
   </p:transition>
-  <p:timing>
-    <p:tnLst>
-      <p:par>
-        <p:cTn id="1" dur="indefinite" restart="never" nodeType="tmRoot"/>
-      </p:par>
-    </p:tnLst>
-  </p:timing>
 </p:sldLayout>
 </file>
 
@@ -4694,10 +4671,9 @@
           </a:lstStyle>
           <a:p>
             <a:r>
-              <a:rPr lang="en-US" dirty="0" smtClean="0"/>
+              <a:rPr lang="en-US" dirty="0"/>
               <a:t>Click icon to add picture</a:t>
             </a:r>
-            <a:endParaRPr lang="en-US" dirty="0"/>
           </a:p>
         </p:txBody>
       </p:sp>
@@ -4767,7 +4743,7 @@
           <a:p>
             <a:fld id="{5958763E-B898-436D-883D-03711491D54A}" type="datetimeFigureOut">
               <a:rPr lang="en-US" smtClean="0"/>
-              <a:t>3/24/2020</a:t>
+              <a:t>9/1/2022</a:t>
             </a:fld>
             <a:endParaRPr lang="en-US"/>
           </a:p>
@@ -4840,13 +4816,6 @@
   <p:transition>
     <p:fade/>
   </p:transition>
-  <p:timing>
-    <p:tnLst>
-      <p:par>
-        <p:cTn id="1" dur="indefinite" restart="never" nodeType="tmRoot"/>
-      </p:par>
-    </p:tnLst>
-  </p:timing>
 </p:sldLayout>
 </file>
 
@@ -5024,7 +4993,7 @@
           <a:p>
             <a:fld id="{5958763E-B898-436D-883D-03711491D54A}" type="datetimeFigureOut">
               <a:rPr lang="en-US" smtClean="0"/>
-              <a:t>3/24/2020</a:t>
+              <a:t>9/1/2022</a:t>
             </a:fld>
             <a:endParaRPr lang="en-US"/>
           </a:p>
@@ -5097,13 +5066,6 @@
   <p:transition>
     <p:fade/>
   </p:transition>
-  <p:timing>
-    <p:tnLst>
-      <p:par>
-        <p:cTn id="1" dur="indefinite" restart="never" nodeType="tmRoot"/>
-      </p:par>
-    </p:tnLst>
-  </p:timing>
 </p:sldLayout>
 </file>
 
@@ -5379,7 +5341,7 @@
           <a:p>
             <a:fld id="{5958763E-B898-436D-883D-03711491D54A}" type="datetimeFigureOut">
               <a:rPr lang="en-US" smtClean="0"/>
-              <a:t>3/24/2020</a:t>
+              <a:t>9/1/2022</a:t>
             </a:fld>
             <a:endParaRPr lang="en-US"/>
           </a:p>
@@ -5440,13 +5402,6 @@
   <p:transition>
     <p:fade/>
   </p:transition>
-  <p:timing>
-    <p:tnLst>
-      <p:par>
-        <p:cTn id="1" dur="indefinite" restart="never" nodeType="tmRoot"/>
-      </p:par>
-    </p:tnLst>
-  </p:timing>
 </p:sldLayout>
 </file>
 
@@ -5802,7 +5757,7 @@
           <a:p>
             <a:fld id="{5958763E-B898-436D-883D-03711491D54A}" type="datetimeFigureOut">
               <a:rPr lang="en-US" smtClean="0"/>
-              <a:t>3/24/2020</a:t>
+              <a:t>9/1/2022</a:t>
             </a:fld>
             <a:endParaRPr lang="en-US"/>
           </a:p>
@@ -5863,13 +5818,6 @@
   <p:transition>
     <p:fade/>
   </p:transition>
-  <p:timing>
-    <p:tnLst>
-      <p:par>
-        <p:cTn id="1" dur="indefinite" restart="never" nodeType="tmRoot"/>
-      </p:par>
-    </p:tnLst>
-  </p:timing>
 </p:sldLayout>
 </file>
 
@@ -6310,7 +6258,7 @@
           <a:p>
             <a:fld id="{5958763E-B898-436D-883D-03711491D54A}" type="datetimeFigureOut">
               <a:rPr lang="en-US" smtClean="0"/>
-              <a:t>3/24/2020</a:t>
+              <a:t>9/1/2022</a:t>
             </a:fld>
             <a:endParaRPr lang="en-US"/>
           </a:p>
@@ -6371,13 +6319,6 @@
   <p:transition>
     <p:fade/>
   </p:transition>
-  <p:timing>
-    <p:tnLst>
-      <p:par>
-        <p:cTn id="1" dur="indefinite" restart="never" nodeType="tmRoot"/>
-      </p:par>
-    </p:tnLst>
-  </p:timing>
 </p:sldLayout>
 </file>
 
@@ -6768,7 +6709,7 @@
           <a:p>
             <a:fld id="{5958763E-B898-436D-883D-03711491D54A}" type="datetimeFigureOut">
               <a:rPr lang="en-US" smtClean="0"/>
-              <a:t>3/24/2020</a:t>
+              <a:t>9/1/2022</a:t>
             </a:fld>
             <a:endParaRPr lang="en-US"/>
           </a:p>
@@ -6829,13 +6770,6 @@
   <p:transition>
     <p:fade/>
   </p:transition>
-  <p:timing>
-    <p:tnLst>
-      <p:par>
-        <p:cTn id="1" dur="indefinite" restart="never" nodeType="tmRoot"/>
-      </p:par>
-    </p:tnLst>
-  </p:timing>
 </p:sldLayout>
 </file>
 
@@ -7386,7 +7320,7 @@
           <a:p>
             <a:fld id="{5958763E-B898-436D-883D-03711491D54A}" type="datetimeFigureOut">
               <a:rPr lang="en-US" smtClean="0"/>
-              <a:t>3/24/2020</a:t>
+              <a:t>9/1/2022</a:t>
             </a:fld>
             <a:endParaRPr lang="en-US"/>
           </a:p>
@@ -7447,13 +7381,6 @@
   <p:transition>
     <p:fade/>
   </p:transition>
-  <p:timing>
-    <p:tnLst>
-      <p:par>
-        <p:cTn id="1" dur="indefinite" restart="never" nodeType="tmRoot"/>
-      </p:par>
-    </p:tnLst>
-  </p:timing>
 </p:sldLayout>
 </file>
 
@@ -8164,7 +8091,7 @@
           <a:p>
             <a:fld id="{5958763E-B898-436D-883D-03711491D54A}" type="datetimeFigureOut">
               <a:rPr lang="en-US" smtClean="0"/>
-              <a:t>3/24/2020</a:t>
+              <a:t>9/1/2022</a:t>
             </a:fld>
             <a:endParaRPr lang="en-US"/>
           </a:p>
@@ -8225,13 +8152,6 @@
   <p:transition>
     <p:fade/>
   </p:transition>
-  <p:timing>
-    <p:tnLst>
-      <p:par>
-        <p:cTn id="1" dur="indefinite" restart="never" nodeType="tmRoot"/>
-      </p:par>
-    </p:tnLst>
-  </p:timing>
 </p:sldLayout>
 </file>
 
@@ -8275,7 +8195,7 @@
           <a:p>
             <a:fld id="{5958763E-B898-436D-883D-03711491D54A}" type="datetimeFigureOut">
               <a:rPr lang="en-US" smtClean="0"/>
-              <a:t>3/24/2020</a:t>
+              <a:t>9/1/2022</a:t>
             </a:fld>
             <a:endParaRPr lang="en-US"/>
           </a:p>
@@ -8348,13 +8268,6 @@
   <p:transition>
     <p:fade/>
   </p:transition>
-  <p:timing>
-    <p:tnLst>
-      <p:par>
-        <p:cTn id="1" dur="indefinite" restart="never" nodeType="tmRoot"/>
-      </p:par>
-    </p:tnLst>
-  </p:timing>
 </p:sldLayout>
 </file>
 
@@ -8434,7 +8347,7 @@
                 <a:spcPct val="0"/>
               </a:spcAft>
             </a:pPr>
-            <a:endParaRPr lang="en-US" sz="2400" dirty="0" err="1" smtClean="0">
+            <a:endParaRPr lang="en-US" sz="2400" dirty="0" err="1">
               <a:gradFill>
                 <a:gsLst>
                   <a:gs pos="0">
@@ -8567,15 +8480,7 @@
           <a:p>
             <a:r>
               <a:rPr lang="en-US" dirty="0"/>
-              <a:t>Click to edit Master </a:t>
-            </a:r>
-            <a:r>
-              <a:rPr lang="en-US" dirty="0" smtClean="0"/>
-              <a:t>subtitle </a:t>
-            </a:r>
-            <a:r>
-              <a:rPr lang="en-US" dirty="0"/>
-              <a:t>style</a:t>
+              <a:t>Click to edit Master subtitle style</a:t>
             </a:r>
           </a:p>
         </p:txBody>
@@ -8617,7 +8522,7 @@
             <a:fld id="{1C2D31DE-C454-491C-B5C3-F097855E3DF7}" type="datetime4">
               <a:rPr lang="en-US" smtClean="0"/>
               <a:pPr/>
-              <a:t>March 24, 2020</a:t>
+              <a:t>September 1, 2022</a:t>
             </a:fld>
             <a:endParaRPr lang="en-US" dirty="0"/>
           </a:p>
@@ -11691,17 +11596,16 @@
           <a:p>
             <a:pPr lvl="0"/>
             <a:r>
-              <a:rPr lang="en-US" dirty="0" smtClean="0"/>
+              <a:rPr lang="en-US" dirty="0"/>
               <a:t>Presenter Name</a:t>
             </a:r>
             <a:br>
-              <a:rPr lang="en-US" dirty="0" smtClean="0"/>
+              <a:rPr lang="en-US" dirty="0"/>
             </a:br>
             <a:r>
-              <a:rPr lang="en-US" dirty="0" smtClean="0"/>
+              <a:rPr lang="en-US" dirty="0"/>
               <a:t>Presenter Title</a:t>
             </a:r>
-            <a:endParaRPr lang="en-US" dirty="0"/>
           </a:p>
         </p:txBody>
       </p:sp>
@@ -11718,13 +11622,6 @@
   <p:transition>
     <p:fade/>
   </p:transition>
-  <p:timing>
-    <p:tnLst>
-      <p:par>
-        <p:cTn id="1" dur="indefinite" restart="never" nodeType="tmRoot"/>
-      </p:par>
-    </p:tnLst>
-  </p:timing>
   <p:hf sldNum="0" hdr="0" ftr="0"/>
 </p:sldLayout>
 </file>
@@ -11777,7 +11674,7 @@
           <a:p>
             <a:fld id="{5958763E-B898-436D-883D-03711491D54A}" type="datetimeFigureOut">
               <a:rPr lang="en-US" smtClean="0"/>
-              <a:t>3/24/2020</a:t>
+              <a:t>9/1/2022</a:t>
             </a:fld>
             <a:endParaRPr lang="en-US"/>
           </a:p>
@@ -11850,13 +11747,6 @@
   <p:transition>
     <p:fade/>
   </p:transition>
-  <p:timing>
-    <p:tnLst>
-      <p:par>
-        <p:cTn id="1" dur="indefinite" restart="never" nodeType="tmRoot"/>
-      </p:par>
-    </p:tnLst>
-  </p:timing>
 </p:sldLayout>
 </file>
 
@@ -11908,7 +11798,7 @@
           <a:p>
             <a:fld id="{5958763E-B898-436D-883D-03711491D54A}" type="datetimeFigureOut">
               <a:rPr lang="en-US" smtClean="0"/>
-              <a:t>3/24/2020</a:t>
+              <a:t>9/1/2022</a:t>
             </a:fld>
             <a:endParaRPr lang="en-US"/>
           </a:p>
@@ -11981,13 +11871,6 @@
   <p:transition>
     <p:fade/>
   </p:transition>
-  <p:timing>
-    <p:tnLst>
-      <p:par>
-        <p:cTn id="1" dur="indefinite" restart="never" nodeType="tmRoot"/>
-      </p:par>
-    </p:tnLst>
-  </p:timing>
 </p:sldLayout>
 </file>
 
@@ -12039,7 +11922,7 @@
           <a:p>
             <a:fld id="{5958763E-B898-436D-883D-03711491D54A}" type="datetimeFigureOut">
               <a:rPr lang="en-US" smtClean="0"/>
-              <a:t>3/24/2020</a:t>
+              <a:t>9/1/2022</a:t>
             </a:fld>
             <a:endParaRPr lang="en-US"/>
           </a:p>
@@ -12112,13 +11995,6 @@
   <p:transition>
     <p:fade/>
   </p:transition>
-  <p:timing>
-    <p:tnLst>
-      <p:par>
-        <p:cTn id="1" dur="indefinite" restart="never" nodeType="tmRoot"/>
-      </p:par>
-    </p:tnLst>
-  </p:timing>
 </p:sldLayout>
 </file>
 
@@ -12170,7 +12046,7 @@
           <a:p>
             <a:fld id="{5958763E-B898-436D-883D-03711491D54A}" type="datetimeFigureOut">
               <a:rPr lang="en-US" smtClean="0"/>
-              <a:t>3/24/2020</a:t>
+              <a:t>9/1/2022</a:t>
             </a:fld>
             <a:endParaRPr lang="en-US"/>
           </a:p>
@@ -12243,13 +12119,6 @@
   <p:transition>
     <p:fade/>
   </p:transition>
-  <p:timing>
-    <p:tnLst>
-      <p:par>
-        <p:cTn id="1" dur="indefinite" restart="never" nodeType="tmRoot"/>
-      </p:par>
-    </p:tnLst>
-  </p:timing>
 </p:sldLayout>
 </file>
 
@@ -12301,7 +12170,7 @@
           <a:p>
             <a:fld id="{5958763E-B898-436D-883D-03711491D54A}" type="datetimeFigureOut">
               <a:rPr lang="en-US" smtClean="0"/>
-              <a:t>3/24/2020</a:t>
+              <a:t>9/1/2022</a:t>
             </a:fld>
             <a:endParaRPr lang="en-US"/>
           </a:p>
@@ -12374,13 +12243,6 @@
   <p:transition>
     <p:fade/>
   </p:transition>
-  <p:timing>
-    <p:tnLst>
-      <p:par>
-        <p:cTn id="1" dur="indefinite" restart="never" nodeType="tmRoot"/>
-      </p:par>
-    </p:tnLst>
-  </p:timing>
 </p:sldLayout>
 </file>
 
@@ -12432,7 +12294,7 @@
           <a:p>
             <a:fld id="{5958763E-B898-436D-883D-03711491D54A}" type="datetimeFigureOut">
               <a:rPr lang="en-US" smtClean="0"/>
-              <a:t>3/24/2020</a:t>
+              <a:t>9/1/2022</a:t>
             </a:fld>
             <a:endParaRPr lang="en-US"/>
           </a:p>
@@ -12505,13 +12367,6 @@
   <p:transition>
     <p:fade/>
   </p:transition>
-  <p:timing>
-    <p:tnLst>
-      <p:par>
-        <p:cTn id="1" dur="indefinite" restart="never" nodeType="tmRoot"/>
-      </p:par>
-    </p:tnLst>
-  </p:timing>
 </p:sldLayout>
 </file>
 
@@ -12563,7 +12418,7 @@
           <a:p>
             <a:fld id="{5958763E-B898-436D-883D-03711491D54A}" type="datetimeFigureOut">
               <a:rPr lang="en-US" smtClean="0"/>
-              <a:t>3/24/2020</a:t>
+              <a:t>9/1/2022</a:t>
             </a:fld>
             <a:endParaRPr lang="en-US"/>
           </a:p>
@@ -12636,13 +12491,6 @@
   <p:transition>
     <p:fade/>
   </p:transition>
-  <p:timing>
-    <p:tnLst>
-      <p:par>
-        <p:cTn id="1" dur="indefinite" restart="never" nodeType="tmRoot"/>
-      </p:par>
-    </p:tnLst>
-  </p:timing>
 </p:sldLayout>
 </file>
 
@@ -12694,7 +12542,7 @@
           <a:p>
             <a:fld id="{5958763E-B898-436D-883D-03711491D54A}" type="datetimeFigureOut">
               <a:rPr lang="en-US" smtClean="0"/>
-              <a:t>3/24/2020</a:t>
+              <a:t>9/1/2022</a:t>
             </a:fld>
             <a:endParaRPr lang="en-US"/>
           </a:p>
@@ -12767,13 +12615,6 @@
   <p:transition>
     <p:fade/>
   </p:transition>
-  <p:timing>
-    <p:tnLst>
-      <p:par>
-        <p:cTn id="1" dur="indefinite" restart="never" nodeType="tmRoot"/>
-      </p:par>
-    </p:tnLst>
-  </p:timing>
 </p:sldLayout>
 </file>
 
@@ -12834,7 +12675,7 @@
           <a:p>
             <a:fld id="{5958763E-B898-436D-883D-03711491D54A}" type="datetimeFigureOut">
               <a:rPr lang="en-US" smtClean="0"/>
-              <a:t>3/24/2020</a:t>
+              <a:t>9/1/2022</a:t>
             </a:fld>
             <a:endParaRPr lang="en-US"/>
           </a:p>
@@ -12907,13 +12748,6 @@
   <p:transition>
     <p:fade/>
   </p:transition>
-  <p:timing>
-    <p:tnLst>
-      <p:par>
-        <p:cTn id="1" dur="indefinite" restart="never" nodeType="tmRoot"/>
-      </p:par>
-    </p:tnLst>
-  </p:timing>
 </p:sldLayout>
 </file>
 
@@ -15915,13 +15749,6 @@
   <p:transition>
     <p:fade/>
   </p:transition>
-  <p:timing>
-    <p:tnLst>
-      <p:par>
-        <p:cTn id="1" dur="indefinite" restart="never" nodeType="tmRoot"/>
-      </p:par>
-    </p:tnLst>
-  </p:timing>
 </p:sldLayout>
 </file>
 
@@ -16009,7 +15836,7 @@
                 <a:spcPct val="0"/>
               </a:spcAft>
             </a:pPr>
-            <a:endParaRPr lang="en-US" sz="2400" dirty="0" err="1" smtClean="0">
+            <a:endParaRPr lang="en-US" sz="2400" dirty="0" err="1">
               <a:gradFill>
                 <a:gsLst>
                   <a:gs pos="0">
@@ -16145,15 +15972,7 @@
           <a:p>
             <a:r>
               <a:rPr lang="en-US" dirty="0"/>
-              <a:t>Click to edit Master </a:t>
-            </a:r>
-            <a:r>
-              <a:rPr lang="en-US" dirty="0" smtClean="0"/>
-              <a:t>subtitle </a:t>
-            </a:r>
-            <a:r>
-              <a:rPr lang="en-US" dirty="0"/>
-              <a:t>style</a:t>
+              <a:t>Click to edit Master subtitle style</a:t>
             </a:r>
           </a:p>
         </p:txBody>
@@ -16195,7 +16014,7 @@
             <a:fld id="{1C2D31DE-C454-491C-B5C3-F097855E3DF7}" type="datetime4">
               <a:rPr lang="en-US" smtClean="0"/>
               <a:pPr/>
-              <a:t>March 24, 2020</a:t>
+              <a:t>September 1, 2022</a:t>
             </a:fld>
             <a:endParaRPr lang="en-US" dirty="0"/>
           </a:p>
@@ -19277,17 +19096,16 @@
           <a:p>
             <a:pPr lvl="0"/>
             <a:r>
-              <a:rPr lang="en-US" dirty="0" smtClean="0"/>
+              <a:rPr lang="en-US" dirty="0"/>
               <a:t>Presenter Name</a:t>
             </a:r>
             <a:br>
-              <a:rPr lang="en-US" dirty="0" smtClean="0"/>
+              <a:rPr lang="en-US" dirty="0"/>
             </a:br>
             <a:r>
-              <a:rPr lang="en-US" dirty="0" smtClean="0"/>
+              <a:rPr lang="en-US" dirty="0"/>
               <a:t>Presenter Title</a:t>
             </a:r>
-            <a:endParaRPr lang="en-US" dirty="0"/>
           </a:p>
         </p:txBody>
       </p:sp>
@@ -19304,13 +19122,6 @@
   <p:transition>
     <p:fade/>
   </p:transition>
-  <p:timing>
-    <p:tnLst>
-      <p:par>
-        <p:cTn id="1" dur="indefinite" restart="never" nodeType="tmRoot"/>
-      </p:par>
-    </p:tnLst>
-  </p:timing>
   <p:hf sldNum="0" hdr="0" ftr="0"/>
 </p:sldLayout>
 </file>
@@ -26820,10 +26631,9 @@
           <a:p>
             <a:pPr lvl="0"/>
             <a:r>
-              <a:rPr lang="en-US" dirty="0" smtClean="0"/>
+              <a:rPr lang="en-US" dirty="0"/>
               <a:t>&lt;Call to action&gt;</a:t>
             </a:r>
-            <a:endParaRPr lang="en-US" dirty="0"/>
           </a:p>
         </p:txBody>
       </p:sp>
@@ -28440,7 +28250,7 @@
           <a:p>
             <a:fld id="{5958763E-B898-436D-883D-03711491D54A}" type="datetimeFigureOut">
               <a:rPr lang="en-US" smtClean="0"/>
-              <a:t>3/24/2020</a:t>
+              <a:t>9/1/2022</a:t>
             </a:fld>
             <a:endParaRPr lang="en-US"/>
           </a:p>
@@ -28567,7 +28377,7 @@
                 <a:spcPct val="0"/>
               </a:spcAft>
             </a:pPr>
-            <a:endParaRPr lang="en-US" sz="2400" dirty="0" err="1" smtClean="0">
+            <a:endParaRPr lang="en-US" sz="2400" dirty="0" err="1">
               <a:gradFill>
                 <a:gsLst>
                   <a:gs pos="0">
@@ -28598,13 +28408,6 @@
   <p:transition>
     <p:fade/>
   </p:transition>
-  <p:timing>
-    <p:tnLst>
-      <p:par>
-        <p:cTn id="1" dur="indefinite" restart="never" nodeType="tmRoot"/>
-      </p:par>
-    </p:tnLst>
-  </p:timing>
 </p:sldLayout>
 </file>
 
@@ -28849,7 +28652,7 @@
           <a:p>
             <a:fld id="{5958763E-B898-436D-883D-03711491D54A}" type="datetimeFigureOut">
               <a:rPr lang="en-US" smtClean="0"/>
-              <a:t>3/24/2020</a:t>
+              <a:t>9/1/2022</a:t>
             </a:fld>
             <a:endParaRPr lang="en-US"/>
           </a:p>
@@ -28922,13 +28725,6 @@
   <p:transition>
     <p:fade/>
   </p:transition>
-  <p:timing>
-    <p:tnLst>
-      <p:par>
-        <p:cTn id="1" dur="indefinite" restart="never" nodeType="tmRoot"/>
-      </p:par>
-    </p:tnLst>
-  </p:timing>
 </p:sldLayout>
 </file>
 
@@ -29150,7 +28946,7 @@
           <a:p>
             <a:fld id="{5958763E-B898-436D-883D-03711491D54A}" type="datetimeFigureOut">
               <a:rPr lang="en-US" smtClean="0"/>
-              <a:t>3/24/2020</a:t>
+              <a:t>9/1/2022</a:t>
             </a:fld>
             <a:endParaRPr lang="en-US"/>
           </a:p>
@@ -29223,13 +29019,6 @@
   <p:transition>
     <p:fade/>
   </p:transition>
-  <p:timing>
-    <p:tnLst>
-      <p:par>
-        <p:cTn id="1" dur="indefinite" restart="never" nodeType="tmRoot"/>
-      </p:par>
-    </p:tnLst>
-  </p:timing>
 </p:sldLayout>
 </file>
 
@@ -29358,7 +29147,7 @@
           <a:p>
             <a:fld id="{5958763E-B898-436D-883D-03711491D54A}" type="datetimeFigureOut">
               <a:rPr lang="en-US" smtClean="0"/>
-              <a:t>3/24/2020</a:t>
+              <a:t>9/1/2022</a:t>
             </a:fld>
             <a:endParaRPr lang="en-US"/>
           </a:p>
@@ -29481,13 +29270,6 @@
   <p:transition>
     <p:fade/>
   </p:transition>
-  <p:timing>
-    <p:tnLst>
-      <p:par>
-        <p:cTn id="1" dur="indefinite" restart="never" nodeType="tmRoot"/>
-      </p:par>
-    </p:tnLst>
-  </p:timing>
 </p:sldLayout>
 </file>
 
@@ -29626,7 +29408,7 @@
           <a:p>
             <a:fld id="{5958763E-B898-436D-883D-03711491D54A}" type="datetimeFigureOut">
               <a:rPr lang="en-US" smtClean="0"/>
-              <a:t>3/24/2020</a:t>
+              <a:t>9/1/2022</a:t>
             </a:fld>
             <a:endParaRPr lang="en-US"/>
           </a:p>
@@ -29753,13 +29535,6 @@
   <p:transition>
     <p:fade/>
   </p:transition>
-  <p:timing>
-    <p:tnLst>
-      <p:par>
-        <p:cTn id="1" dur="indefinite" restart="never" nodeType="tmRoot"/>
-      </p:par>
-    </p:tnLst>
-  </p:timing>
 </p:sldLayout>
 </file>
 
@@ -29921,7 +29696,7 @@
                 <a:spcPct val="0"/>
               </a:spcAft>
             </a:pPr>
-            <a:endParaRPr lang="en-US" sz="2400" dirty="0" err="1" smtClean="0">
+            <a:endParaRPr lang="en-US" sz="2400" dirty="0" err="1">
               <a:gradFill>
                 <a:gsLst>
                   <a:gs pos="0">
@@ -29972,10 +29747,9 @@
           </a:lstStyle>
           <a:p>
             <a:r>
-              <a:rPr lang="en-US" dirty="0" smtClean="0"/>
+              <a:rPr lang="en-US" dirty="0"/>
               <a:t>Type “Agenda”</a:t>
             </a:r>
-            <a:endParaRPr lang="en-US" dirty="0"/>
           </a:p>
         </p:txBody>
       </p:sp>
@@ -30099,24 +29873,23 @@
           <a:p>
             <a:pPr lvl="0"/>
             <a:r>
-              <a:rPr lang="en-US" dirty="0" smtClean="0"/>
+              <a:rPr lang="en-US" dirty="0"/>
               <a:t>Item 1</a:t>
             </a:r>
           </a:p>
           <a:p>
             <a:pPr lvl="0"/>
             <a:r>
-              <a:rPr lang="en-US" dirty="0" smtClean="0"/>
+              <a:rPr lang="en-US" dirty="0"/>
               <a:t>Item 2</a:t>
             </a:r>
           </a:p>
           <a:p>
             <a:pPr lvl="0"/>
             <a:r>
-              <a:rPr lang="en-US" dirty="0" smtClean="0"/>
+              <a:rPr lang="en-US" dirty="0"/>
               <a:t>Item 3</a:t>
             </a:r>
-            <a:endParaRPr lang="en-US" dirty="0"/>
           </a:p>
         </p:txBody>
       </p:sp>
@@ -30143,7 +29916,7 @@
           <a:p>
             <a:fld id="{5958763E-B898-436D-883D-03711491D54A}" type="datetimeFigureOut">
               <a:rPr lang="en-US" smtClean="0"/>
-              <a:t>3/24/2020</a:t>
+              <a:t>9/1/2022</a:t>
             </a:fld>
             <a:endParaRPr lang="en-US"/>
           </a:p>
@@ -30250,13 +30023,6 @@
   <p:transition>
     <p:fade/>
   </p:transition>
-  <p:timing>
-    <p:tnLst>
-      <p:par>
-        <p:cTn id="1" dur="indefinite" restart="never" nodeType="tmRoot"/>
-      </p:par>
-    </p:tnLst>
-  </p:timing>
 </p:sldLayout>
 </file>
 
@@ -30418,7 +30184,7 @@
                 <a:spcPct val="0"/>
               </a:spcAft>
             </a:pPr>
-            <a:endParaRPr lang="en-US" sz="2400" dirty="0" err="1" smtClean="0">
+            <a:endParaRPr lang="en-US" sz="2400" dirty="0" err="1">
               <a:gradFill>
                 <a:gsLst>
                   <a:gs pos="0">
@@ -30471,10 +30237,9 @@
           </a:lstStyle>
           <a:p>
             <a:r>
-              <a:rPr lang="en-US" dirty="0" smtClean="0"/>
+              <a:rPr lang="en-US" dirty="0"/>
               <a:t>Notable Quote</a:t>
             </a:r>
-            <a:endParaRPr lang="en-US" dirty="0"/>
           </a:p>
         </p:txBody>
       </p:sp>
@@ -30601,10 +30366,9 @@
           <a:p>
             <a:pPr lvl="0"/>
             <a:r>
-              <a:rPr lang="en-US" dirty="0" smtClean="0"/>
+              <a:rPr lang="en-US" dirty="0"/>
               <a:t>– Attribution</a:t>
             </a:r>
-            <a:endParaRPr lang="en-US" dirty="0"/>
           </a:p>
         </p:txBody>
       </p:sp>
@@ -30631,7 +30395,7 @@
           <a:p>
             <a:fld id="{5958763E-B898-436D-883D-03711491D54A}" type="datetimeFigureOut">
               <a:rPr lang="en-US" smtClean="0"/>
-              <a:t>3/24/2020</a:t>
+              <a:t>9/1/2022</a:t>
             </a:fld>
             <a:endParaRPr lang="en-US"/>
           </a:p>
@@ -31379,13 +31143,6 @@
   <p:transition>
     <p:fade/>
   </p:transition>
-  <p:timing>
-    <p:tnLst>
-      <p:par>
-        <p:cTn id="1" dur="indefinite" restart="never" nodeType="tmRoot"/>
-      </p:par>
-    </p:tnLst>
-  </p:timing>
 </p:sldLayout>
 </file>
 
@@ -31457,7 +31214,7 @@
           <a:p>
             <a:fld id="{5958763E-B898-436D-883D-03711491D54A}" type="datetimeFigureOut">
               <a:rPr lang="en-US" smtClean="0"/>
-              <a:t>3/24/2020</a:t>
+              <a:t>9/1/2022</a:t>
             </a:fld>
             <a:endParaRPr lang="en-US"/>
           </a:p>
@@ -31530,13 +31287,6 @@
   <p:transition>
     <p:fade/>
   </p:transition>
-  <p:timing>
-    <p:tnLst>
-      <p:par>
-        <p:cTn id="1" dur="indefinite" restart="never" nodeType="tmRoot"/>
-      </p:par>
-    </p:tnLst>
-  </p:timing>
 </p:sldLayout>
 </file>
 
@@ -31665,7 +31415,7 @@
           <a:p>
             <a:fld id="{5958763E-B898-436D-883D-03711491D54A}" type="datetimeFigureOut">
               <a:rPr lang="en-US" smtClean="0"/>
-              <a:t>3/24/2020</a:t>
+              <a:t>9/1/2022</a:t>
             </a:fld>
             <a:endParaRPr lang="en-US"/>
           </a:p>
@@ -31788,13 +31538,6 @@
   <p:transition>
     <p:fade/>
   </p:transition>
-  <p:timing>
-    <p:tnLst>
-      <p:par>
-        <p:cTn id="1" dur="indefinite" restart="never" nodeType="tmRoot"/>
-      </p:par>
-    </p:tnLst>
-  </p:timing>
 </p:sldLayout>
 </file>
 
@@ -32007,7 +31750,7 @@
           <a:p>
             <a:fld id="{5958763E-B898-436D-883D-03711491D54A}" type="datetimeFigureOut">
               <a:rPr lang="en-US" smtClean="0"/>
-              <a:t>3/24/2020</a:t>
+              <a:t>9/1/2022</a:t>
             </a:fld>
             <a:endParaRPr lang="en-US"/>
           </a:p>
@@ -32080,13 +31823,6 @@
   <p:transition>
     <p:fade/>
   </p:transition>
-  <p:timing>
-    <p:tnLst>
-      <p:par>
-        <p:cTn id="1" dur="indefinite" restart="never" nodeType="tmRoot"/>
-      </p:par>
-    </p:tnLst>
-  </p:timing>
 </p:sldLayout>
 </file>
 
@@ -32244,7 +31980,7 @@
           <a:p>
             <a:fld id="{5958763E-B898-436D-883D-03711491D54A}" type="datetimeFigureOut">
               <a:rPr lang="en-US" smtClean="0"/>
-              <a:t>3/24/2020</a:t>
+              <a:t>9/1/2022</a:t>
             </a:fld>
             <a:endParaRPr lang="en-US"/>
           </a:p>
@@ -32317,13 +32053,6 @@
   <p:transition>
     <p:fade/>
   </p:transition>
-  <p:timing>
-    <p:tnLst>
-      <p:par>
-        <p:cTn id="1" dur="indefinite" restart="never" nodeType="tmRoot"/>
-      </p:par>
-    </p:tnLst>
-  </p:timing>
 </p:sldLayout>
 </file>
 
@@ -32495,7 +32224,7 @@
           <a:p>
             <a:fld id="{5958763E-B898-436D-883D-03711491D54A}" type="datetimeFigureOut">
               <a:rPr lang="en-US" smtClean="0"/>
-              <a:t>3/24/2020</a:t>
+              <a:t>9/1/2022</a:t>
             </a:fld>
             <a:endParaRPr lang="en-US"/>
           </a:p>
@@ -32641,13 +32370,6 @@
   <p:transition>
     <p:fade/>
   </p:transition>
-  <p:timing>
-    <p:tnLst>
-      <p:par>
-        <p:cTn id="1" dur="indefinite" restart="never" nodeType="tmRoot"/>
-      </p:par>
-    </p:tnLst>
-  </p:timing>
   <p:txStyles>
     <p:titleStyle>
       <a:lvl1pPr algn="l" defTabSz="914400" rtl="0" eaLnBrk="1" latinLnBrk="0" hangingPunct="1">
@@ -32952,7 +32674,7 @@
       </a:lvl9pPr>
     </p:otherStyle>
   </p:txStyles>
-  <p:extLst mod="1">
+  <p:extLst>
     <p:ext uri="{27BBF7A9-308A-43DC-89C8-2F10F3537804}">
       <p15:sldGuideLst xmlns:p15="http://schemas.microsoft.com/office/powerpoint/2012/main">
         <p15:guide id="1" orient="horz" pos="2160" userDrawn="1">
@@ -33031,10 +32753,9 @@
           <a:lstStyle/>
           <a:p>
             <a:r>
-              <a:rPr lang="en-US" sz="6600" dirty="0" smtClean="0"/>
+              <a:rPr lang="en-US" sz="6600" dirty="0"/>
               <a:t>Introduction to JavaScript</a:t>
             </a:r>
-            <a:endParaRPr lang="en-US" sz="6600" dirty="0"/>
           </a:p>
         </p:txBody>
       </p:sp>
@@ -33059,14 +32780,9 @@
           <a:lstStyle/>
           <a:p>
             <a:r>
-              <a:rPr lang="en-US" dirty="0" smtClean="0"/>
-              <a:t>Hy-Tech Club: Web </a:t>
+              <a:rPr lang="en-US" dirty="0"/>
+              <a:t>Hy-Tech Club: Web 102</a:t>
             </a:r>
-            <a:r>
-              <a:rPr lang="en-US" dirty="0" smtClean="0"/>
-              <a:t>102</a:t>
-            </a:r>
-            <a:endParaRPr lang="en-US" dirty="0"/>
           </a:p>
         </p:txBody>
       </p:sp>
@@ -36051,13 +35767,6 @@
   <p:transition>
     <p:fade/>
   </p:transition>
-  <p:timing>
-    <p:tnLst>
-      <p:par>
-        <p:cTn id="1" dur="indefinite" restart="never" nodeType="tmRoot"/>
-      </p:par>
-    </p:tnLst>
-  </p:timing>
 </p:sld>
 </file>
 
@@ -36099,36 +35808,31 @@
           <a:lstStyle/>
           <a:p>
             <a:r>
-              <a:rPr lang="en-US" cap="none" dirty="0" smtClean="0"/>
+              <a:rPr lang="en-US" cap="none" dirty="0"/>
               <a:t>JavaScript</a:t>
             </a:r>
             <a:r>
-              <a:rPr lang="en-US" b="0" cap="none" dirty="0" smtClean="0"/>
+              <a:rPr lang="en-US" b="0" cap="none" dirty="0"/>
               <a:t> is the programming language of the web.</a:t>
             </a:r>
             <a:br>
-              <a:rPr lang="en-US" b="0" cap="none" dirty="0" smtClean="0"/>
+              <a:rPr lang="en-US" b="0" cap="none" dirty="0"/>
+            </a:br>
+            <a:br>
+              <a:rPr lang="en-US" b="0" cap="none" dirty="0"/>
             </a:br>
             <a:r>
-              <a:rPr lang="en-US" b="0" cap="none" dirty="0" smtClean="0"/>
-              <a:t/>
-            </a:r>
-            <a:br>
-              <a:rPr lang="en-US" b="0" cap="none" dirty="0" smtClean="0"/>
-            </a:br>
-            <a:r>
-              <a:rPr lang="en-US" b="0" cap="none" dirty="0" smtClean="0"/>
+              <a:rPr lang="en-US" b="0" cap="none" dirty="0"/>
               <a:t>It makes websites </a:t>
             </a:r>
             <a:r>
-              <a:rPr lang="en-US" b="0" i="1" cap="none" dirty="0" smtClean="0"/>
+              <a:rPr lang="en-US" b="0" i="1" cap="none" dirty="0"/>
               <a:t>interactive</a:t>
             </a:r>
             <a:r>
-              <a:rPr lang="en-US" b="0" cap="none" dirty="0" smtClean="0"/>
+              <a:rPr lang="en-US" b="0" cap="none" dirty="0"/>
               <a:t>.</a:t>
             </a:r>
-            <a:endParaRPr lang="en-US" b="0" cap="none" dirty="0"/>
           </a:p>
         </p:txBody>
       </p:sp>
@@ -36145,13 +35849,6 @@
   <p:transition>
     <p:fade/>
   </p:transition>
-  <p:timing>
-    <p:tnLst>
-      <p:par>
-        <p:cTn id="1" dur="indefinite" restart="never" nodeType="tmRoot"/>
-      </p:par>
-    </p:tnLst>
-  </p:timing>
 </p:sld>
 </file>
 
@@ -36188,10 +35885,9 @@
           <a:lstStyle/>
           <a:p>
             <a:r>
-              <a:rPr lang="en-US" dirty="0" smtClean="0"/>
+              <a:rPr lang="en-US" dirty="0"/>
               <a:t>A world without JavaScript</a:t>
             </a:r>
-            <a:endParaRPr lang="en-US" dirty="0"/>
           </a:p>
         </p:txBody>
       </p:sp>
@@ -36221,16 +35917,10 @@
               <a:buNone/>
             </a:pPr>
             <a:r>
-              <a:rPr lang="en-US" sz="4400" dirty="0" smtClean="0">
-                <a:hlinkClick r:id="rId3"/>
-              </a:rPr>
-              <a:t>https</a:t>
-            </a:r>
-            <a:r>
               <a:rPr lang="en-US" sz="4400" dirty="0">
                 <a:hlinkClick r:id="rId3"/>
               </a:rPr>
-              <a:t>://web.archive.org/web/19961017235908/http://www2.yahoo.com:80/</a:t>
+              <a:t>https://web.archive.org/web/19961017235908/http://www2.yahoo.com:80/</a:t>
             </a:r>
             <a:endParaRPr lang="en-US" sz="4400" dirty="0"/>
           </a:p>
@@ -36290,13 +35980,6 @@
   <p:transition>
     <p:fade/>
   </p:transition>
-  <p:timing>
-    <p:tnLst>
-      <p:par>
-        <p:cTn id="1" dur="indefinite" restart="never" nodeType="tmRoot"/>
-      </p:par>
-    </p:tnLst>
-  </p:timing>
 </p:sld>
 </file>
 
@@ -36333,18 +36016,17 @@
           <a:lstStyle/>
           <a:p>
             <a:r>
-              <a:rPr lang="en-US" dirty="0" smtClean="0"/>
+              <a:rPr lang="en-US" dirty="0"/>
               <a:t>What do developers use </a:t>
             </a:r>
             <a:r>
-              <a:rPr lang="en-US" dirty="0" err="1" smtClean="0"/>
+              <a:rPr lang="en-US" dirty="0" err="1"/>
               <a:t>javascript</a:t>
             </a:r>
             <a:r>
-              <a:rPr lang="en-US" dirty="0" smtClean="0"/>
+              <a:rPr lang="en-US" dirty="0"/>
               <a:t> for?</a:t>
             </a:r>
-            <a:endParaRPr lang="en-US" dirty="0"/>
           </a:p>
         </p:txBody>
       </p:sp>
@@ -36416,13 +36098,6 @@
   <p:transition>
     <p:fade/>
   </p:transition>
-  <p:timing>
-    <p:tnLst>
-      <p:par>
-        <p:cTn id="1" dur="indefinite" restart="never" nodeType="tmRoot"/>
-      </p:par>
-    </p:tnLst>
-  </p:timing>
 </p:sld>
 </file>
 
@@ -36459,10 +36134,9 @@
           <a:lstStyle/>
           <a:p>
             <a:r>
-              <a:rPr lang="en-US" dirty="0" smtClean="0"/>
+              <a:rPr lang="en-US" dirty="0"/>
               <a:t>A simple JavaScript program – in html</a:t>
             </a:r>
-            <a:endParaRPr lang="en-US" dirty="0"/>
           </a:p>
         </p:txBody>
       </p:sp>
@@ -36644,27 +36318,8 @@
                 </a:solidFill>
                 <a:latin typeface="Consolas" panose="020B0609020204030204" pitchFamily="49" charset="0"/>
               </a:rPr>
-              <a:t>&lt;/html</a:t>
+              <a:t>&lt;/html&gt;</a:t>
             </a:r>
-            <a:r>
-              <a:rPr lang="en-US" dirty="0" smtClean="0">
-                <a:solidFill>
-                  <a:srgbClr val="800000">
-                    <a:alpha val="50000"/>
-                  </a:srgbClr>
-                </a:solidFill>
-                <a:latin typeface="Consolas" panose="020B0609020204030204" pitchFamily="49" charset="0"/>
-              </a:rPr>
-              <a:t>&gt;</a:t>
-            </a:r>
-            <a:endParaRPr lang="en-US" dirty="0">
-              <a:solidFill>
-                <a:srgbClr val="800000">
-                  <a:alpha val="50000"/>
-                </a:srgbClr>
-              </a:solidFill>
-              <a:latin typeface="Consolas" panose="020B0609020204030204" pitchFamily="49" charset="0"/>
-            </a:endParaRPr>
           </a:p>
         </p:txBody>
       </p:sp>
@@ -36681,13 +36336,6 @@
   <p:transition>
     <p:fade/>
   </p:transition>
-  <p:timing>
-    <p:tnLst>
-      <p:par>
-        <p:cTn id="1" dur="indefinite" restart="never" nodeType="tmRoot"/>
-      </p:par>
-    </p:tnLst>
-  </p:timing>
 </p:sld>
 </file>
 
@@ -36724,10 +36372,9 @@
           <a:lstStyle/>
           <a:p>
             <a:r>
-              <a:rPr lang="en-US" dirty="0" smtClean="0"/>
+              <a:rPr lang="en-US" dirty="0"/>
               <a:t>Unpacking the example</a:t>
             </a:r>
-            <a:endParaRPr lang="en-US" dirty="0"/>
           </a:p>
         </p:txBody>
       </p:sp>
@@ -36759,13 +36406,8 @@
             </a:r>
             <a:r>
               <a:rPr lang="en-US" sz="3600" dirty="0"/>
-              <a:t> </a:t>
+              <a:t> element</a:t>
             </a:r>
-            <a:r>
-              <a:rPr lang="en-US" sz="3600" dirty="0" smtClean="0"/>
-              <a:t>element</a:t>
-            </a:r>
-            <a:endParaRPr lang="en-US" sz="3600" dirty="0"/>
           </a:p>
           <a:p>
             <a:pPr lvl="1"/>
@@ -36775,21 +36417,8 @@
                   <a:schemeClr val="tx2"/>
                 </a:solidFill>
               </a:rPr>
-              <a:t>This is </a:t>
+              <a:t>This is contains JavaScript code</a:t>
             </a:r>
-            <a:r>
-              <a:rPr lang="en-US" sz="3067" dirty="0" smtClean="0">
-                <a:solidFill>
-                  <a:schemeClr val="tx2"/>
-                </a:solidFill>
-              </a:rPr>
-              <a:t>contains JavaScript code</a:t>
-            </a:r>
-            <a:endParaRPr lang="en-US" sz="3067" dirty="0">
-              <a:solidFill>
-                <a:schemeClr val="tx2"/>
-              </a:solidFill>
-            </a:endParaRPr>
           </a:p>
           <a:p>
             <a:pPr lvl="1"/>
@@ -36807,13 +36436,8 @@
             </a:r>
             <a:r>
               <a:rPr lang="en-US" sz="3600" dirty="0"/>
-              <a:t> </a:t>
+              <a:t> element</a:t>
             </a:r>
-            <a:r>
-              <a:rPr lang="en-US" sz="3600" dirty="0" smtClean="0"/>
-              <a:t>element</a:t>
-            </a:r>
-            <a:endParaRPr lang="en-US" sz="3600" dirty="0"/>
           </a:p>
           <a:p>
             <a:pPr lvl="1"/>
@@ -36823,15 +36447,7 @@
                   <a:schemeClr val="tx2"/>
                 </a:solidFill>
               </a:rPr>
-              <a:t>This is where </a:t>
-            </a:r>
-            <a:r>
-              <a:rPr lang="en-US" sz="3067" dirty="0" smtClean="0">
-                <a:solidFill>
-                  <a:schemeClr val="tx2"/>
-                </a:solidFill>
-              </a:rPr>
-              <a:t>the </a:t>
+              <a:t>This is where the </a:t>
             </a:r>
             <a:r>
               <a:rPr lang="en-US" sz="3067" dirty="0">
@@ -36851,20 +36467,12 @@
               <a:t> </a:t>
             </a:r>
             <a:r>
-              <a:rPr lang="en-US" sz="3067" dirty="0" smtClean="0">
-                <a:solidFill>
-                  <a:schemeClr val="tx2"/>
-                </a:solidFill>
-              </a:rPr>
-              <a:t>element </a:t>
-            </a:r>
-            <a:r>
               <a:rPr lang="en-US" sz="3067" dirty="0">
                 <a:solidFill>
                   <a:schemeClr val="tx2"/>
                 </a:solidFill>
               </a:rPr>
-              <a:t>goes</a:t>
+              <a:t>element goes</a:t>
             </a:r>
           </a:p>
           <a:p>
@@ -36924,23 +36532,7 @@
                   <a:schemeClr val="tx2"/>
                 </a:solidFill>
               </a:rPr>
-              <a:t> in JavaScript. This one tells the computer to </a:t>
-            </a:r>
-            <a:r>
-              <a:rPr lang="en-US" sz="3067" dirty="0" smtClean="0">
-                <a:solidFill>
-                  <a:schemeClr val="tx2"/>
-                </a:solidFill>
-              </a:rPr>
-              <a:t>display a message of </a:t>
-            </a:r>
-            <a:r>
-              <a:rPr lang="en-US" sz="3067" dirty="0">
-                <a:solidFill>
-                  <a:schemeClr val="tx2"/>
-                </a:solidFill>
-              </a:rPr>
-              <a:t>“Hello, world!”</a:t>
+              <a:t> in JavaScript. This one tells the computer to display a message of “Hello, world!”</a:t>
             </a:r>
           </a:p>
           <a:p>
@@ -37345,10 +36937,9 @@
           <a:lstStyle/>
           <a:p>
             <a:r>
-              <a:rPr lang="en-US" dirty="0" smtClean="0"/>
+              <a:rPr lang="en-US" dirty="0"/>
               <a:t>Unpacking the statement</a:t>
             </a:r>
-            <a:endParaRPr lang="en-US" dirty="0"/>
           </a:p>
         </p:txBody>
       </p:sp>
@@ -37416,12 +37007,8 @@
               <a:t>alert</a:t>
             </a:r>
             <a:r>
-              <a:rPr lang="en-US" dirty="0" smtClean="0"/>
-              <a:t> </a:t>
-            </a:r>
-            <a:r>
               <a:rPr lang="en-US" dirty="0"/>
-              <a:t>keyword</a:t>
+              <a:t> keyword</a:t>
             </a:r>
           </a:p>
           <a:p>
@@ -38062,10 +37649,9 @@
           <a:lstStyle/>
           <a:p>
             <a:r>
-              <a:rPr lang="en-US" dirty="0" smtClean="0"/>
+              <a:rPr lang="en-US" dirty="0"/>
               <a:t>Mini-challenge</a:t>
             </a:r>
-            <a:endParaRPr lang="en-US" dirty="0"/>
           </a:p>
         </p:txBody>
       </p:sp>
@@ -38088,7 +37674,7 @@
               <a:buNone/>
             </a:pPr>
             <a:r>
-              <a:rPr lang="en-US" sz="6000" dirty="0" smtClean="0"/>
+              <a:rPr lang="en-US" sz="6000" dirty="0"/>
               <a:t>Write your own program that will say hello to you by name.</a:t>
             </a:r>
           </a:p>
@@ -38103,7 +37689,7 @@
               <a:buNone/>
             </a:pPr>
             <a:r>
-              <a:rPr lang="en-US" sz="4400" dirty="0" smtClean="0">
+              <a:rPr lang="en-US" sz="4400" dirty="0">
                 <a:solidFill>
                   <a:schemeClr val="accent1">
                     <a:lumMod val="50000"/>
@@ -38112,13 +37698,6 @@
               </a:rPr>
               <a:t>For example, if your name were Drake, it should say “Hello, Drake!”</a:t>
             </a:r>
-            <a:endParaRPr lang="en-US" sz="4400" dirty="0">
-              <a:solidFill>
-                <a:schemeClr val="accent1">
-                  <a:lumMod val="50000"/>
-                </a:schemeClr>
-              </a:solidFill>
-            </a:endParaRPr>
           </a:p>
         </p:txBody>
       </p:sp>
@@ -38135,13 +37714,67 @@
   <p:transition>
     <p:fade/>
   </p:transition>
-  <p:timing>
-    <p:tnLst>
-      <p:par>
-        <p:cTn id="1" dur="indefinite" restart="never" nodeType="tmRoot"/>
-      </p:par>
-    </p:tnLst>
-  </p:timing>
+</p:sld>
+</file>
+
+<file path=ppt/slides/slide9.xml><?xml version="1.0" encoding="utf-8"?>
+<p:sld xmlns:a="http://schemas.openxmlformats.org/drawingml/2006/main" xmlns:r="http://schemas.openxmlformats.org/officeDocument/2006/relationships" xmlns:p="http://schemas.openxmlformats.org/presentationml/2006/main">
+  <p:cSld>
+    <p:spTree>
+      <p:nvGrpSpPr>
+        <p:cNvPr id="1" name=""/>
+        <p:cNvGrpSpPr/>
+        <p:nvPr/>
+      </p:nvGrpSpPr>
+      <p:grpSpPr>
+        <a:xfrm>
+          <a:off x="0" y="0"/>
+          <a:ext cx="0" cy="0"/>
+          <a:chOff x="0" y="0"/>
+          <a:chExt cx="0" cy="0"/>
+        </a:xfrm>
+      </p:grpSpPr>
+      <p:sp>
+        <p:nvSpPr>
+          <p:cNvPr id="2" name="Text Placeholder 1">
+            <a:extLst>
+              <a:ext uri="{FF2B5EF4-FFF2-40B4-BE49-F238E27FC236}">
+                <a16:creationId xmlns:a16="http://schemas.microsoft.com/office/drawing/2014/main" id="{B7A791CB-AA68-4769-B673-C015ECF3D832}"/>
+              </a:ext>
+            </a:extLst>
+          </p:cNvPr>
+          <p:cNvSpPr>
+            <a:spLocks noGrp="1"/>
+          </p:cNvSpPr>
+          <p:nvPr>
+            <p:ph type="body" sz="quarter" idx="10"/>
+          </p:nvPr>
+        </p:nvSpPr>
+        <p:spPr/>
+        <p:txBody>
+          <a:bodyPr/>
+          <a:lstStyle/>
+          <a:p>
+            <a:r>
+              <a:rPr lang="en-US"/>
+              <a:t>Questions?</a:t>
+            </a:r>
+          </a:p>
+        </p:txBody>
+      </p:sp>
+    </p:spTree>
+    <p:extLst>
+      <p:ext uri="{BB962C8B-B14F-4D97-AF65-F5344CB8AC3E}">
+        <p14:creationId xmlns:p14="http://schemas.microsoft.com/office/powerpoint/2010/main" val="2492034236"/>
+      </p:ext>
+    </p:extLst>
+  </p:cSld>
+  <p:clrMapOvr>
+    <a:masterClrMapping/>
+  </p:clrMapOvr>
+  <p:transition>
+    <p:fade/>
+  </p:transition>
 </p:sld>
 </file>
 

</xml_diff>

<commit_message>
Update gitbook 2022-09-01 19:48:06
</commit_message>
<xml_diff>
--- a/Week02/IntroductionToJavaScript.pptx
+++ b/Week02/IntroductionToJavaScript.pptx
@@ -5,7 +5,7 @@
     <p:sldMasterId id="2147483648" r:id="rId1"/>
   </p:sldMasterIdLst>
   <p:notesMasterIdLst>
-    <p:notesMasterId r:id="rId10"/>
+    <p:notesMasterId r:id="rId11"/>
   </p:notesMasterIdLst>
   <p:sldIdLst>
     <p:sldId id="258" r:id="rId2"/>
@@ -16,6 +16,7 @@
     <p:sldId id="311" r:id="rId7"/>
     <p:sldId id="312" r:id="rId8"/>
     <p:sldId id="313" r:id="rId9"/>
+    <p:sldId id="314" r:id="rId10"/>
   </p:sldIdLst>
   <p:sldSz cx="12192000" cy="6858000"/>
   <p:notesSz cx="6858000" cy="9144000"/>
@@ -215,7 +216,7 @@
           <a:p>
             <a:fld id="{19104133-B5B0-4351-8158-4F0E5EB1E2BF}" type="datetimeFigureOut">
               <a:rPr lang="en-US" smtClean="0"/>
-              <a:t>3/24/2020</a:t>
+              <a:t>9/1/2022</a:t>
             </a:fld>
             <a:endParaRPr lang="en-US"/>
           </a:p>
@@ -279,38 +280,37 @@
           <a:p>
             <a:pPr lvl="0"/>
             <a:r>
-              <a:rPr lang="en-US" smtClean="0"/>
+              <a:rPr lang="en-US"/>
               <a:t>Edit Master text styles</a:t>
             </a:r>
           </a:p>
           <a:p>
             <a:pPr lvl="1"/>
             <a:r>
-              <a:rPr lang="en-US" smtClean="0"/>
+              <a:rPr lang="en-US"/>
               <a:t>Second level</a:t>
             </a:r>
           </a:p>
           <a:p>
             <a:pPr lvl="2"/>
             <a:r>
-              <a:rPr lang="en-US" smtClean="0"/>
+              <a:rPr lang="en-US"/>
               <a:t>Third level</a:t>
             </a:r>
           </a:p>
           <a:p>
             <a:pPr lvl="3"/>
             <a:r>
-              <a:rPr lang="en-US" smtClean="0"/>
+              <a:rPr lang="en-US"/>
               <a:t>Fourth level</a:t>
             </a:r>
           </a:p>
           <a:p>
             <a:pPr lvl="4"/>
             <a:r>
-              <a:rPr lang="en-US" smtClean="0"/>
+              <a:rPr lang="en-US"/>
               <a:t>Fifth level</a:t>
             </a:r>
-            <a:endParaRPr lang="en-US"/>
           </a:p>
         </p:txBody>
       </p:sp>
@@ -528,11 +528,11 @@
           <a:lstStyle/>
           <a:p>
             <a:r>
-              <a:rPr lang="en-US" dirty="0" smtClean="0"/>
+              <a:rPr lang="en-US" dirty="0"/>
               <a:t>Visit the site to show</a:t>
             </a:r>
             <a:r>
-              <a:rPr lang="en-US" baseline="0" dirty="0" smtClean="0"/>
+              <a:rPr lang="en-US" baseline="0" dirty="0"/>
               <a:t> what the web was like before JavaScript. No interactivity – the internet used to be a lot of links going to websites – just a directory</a:t>
             </a:r>
             <a:endParaRPr lang="en-US" dirty="0"/>
@@ -637,11 +637,11 @@
               <a:defRPr/>
             </a:pPr>
             <a:r>
-              <a:rPr lang="en-US" dirty="0" smtClean="0"/>
+              <a:rPr lang="en-US" dirty="0"/>
               <a:t>Ask the students about their favorite websites,</a:t>
             </a:r>
             <a:r>
-              <a:rPr lang="en-US" baseline="0" dirty="0" smtClean="0"/>
+              <a:rPr lang="en-US" baseline="0" dirty="0"/>
               <a:t> and how they were interactive. These are some examples of things JavaScript can do</a:t>
             </a:r>
           </a:p>
@@ -728,11 +728,11 @@
           <a:lstStyle/>
           <a:p>
             <a:r>
-              <a:rPr lang="en-US" dirty="0" smtClean="0"/>
+              <a:rPr lang="en-US" dirty="0"/>
               <a:t>Ask the</a:t>
             </a:r>
             <a:r>
-              <a:rPr lang="en-US" baseline="0" dirty="0" smtClean="0"/>
+              <a:rPr lang="en-US" baseline="0" dirty="0"/>
               <a:t> students to guess what this does</a:t>
             </a:r>
             <a:endParaRPr lang="en-US" dirty="0"/>
@@ -820,11 +820,11 @@
           <a:lstStyle/>
           <a:p>
             <a:r>
-              <a:rPr lang="en-US" dirty="0" smtClean="0"/>
+              <a:rPr lang="en-US" dirty="0"/>
               <a:t>Unpack the important</a:t>
             </a:r>
             <a:r>
-              <a:rPr lang="en-US" baseline="0" dirty="0" smtClean="0"/>
+              <a:rPr lang="en-US" baseline="0" dirty="0"/>
               <a:t> parts of the JavaScript in the example.</a:t>
             </a:r>
             <a:endParaRPr lang="en-US" dirty="0"/>
@@ -912,28 +912,28 @@
           <a:lstStyle/>
           <a:p>
             <a:r>
-              <a:rPr lang="en-US" dirty="0" smtClean="0"/>
+              <a:rPr lang="en-US" dirty="0"/>
               <a:t>List each part of the JavaScript statement. Explain that</a:t>
             </a:r>
             <a:r>
-              <a:rPr lang="en-US" baseline="0" dirty="0" smtClean="0"/>
+              <a:rPr lang="en-US" baseline="0" dirty="0"/>
               <a:t> for the code to work, it has to be </a:t>
             </a:r>
             <a:r>
-              <a:rPr lang="en-US" b="1" i="1" baseline="0" dirty="0" smtClean="0"/>
+              <a:rPr lang="en-US" b="1" i="1" baseline="0" dirty="0"/>
               <a:t>exactly</a:t>
             </a:r>
             <a:r>
-              <a:rPr lang="en-US" b="0" i="0" baseline="0" dirty="0" smtClean="0"/>
+              <a:rPr lang="en-US" b="0" i="0" baseline="0" dirty="0"/>
               <a:t> right.</a:t>
             </a:r>
           </a:p>
           <a:p>
-            <a:endParaRPr lang="en-US" b="0" i="0" baseline="0" dirty="0" smtClean="0"/>
+            <a:endParaRPr lang="en-US" b="0" i="0" baseline="0" dirty="0"/>
           </a:p>
           <a:p>
             <a:r>
-              <a:rPr lang="en-US" b="0" i="0" baseline="0" dirty="0" smtClean="0"/>
+              <a:rPr lang="en-US" b="0" i="0" baseline="0" dirty="0"/>
               <a:t>This statement, when executed, will show the message in a small box in the browser.</a:t>
             </a:r>
             <a:endParaRPr lang="en-US" dirty="0"/>
@@ -1116,15 +1116,7 @@
           <a:p>
             <a:r>
               <a:rPr lang="en-US" dirty="0"/>
-              <a:t>Click to edit Master </a:t>
-            </a:r>
-            <a:r>
-              <a:rPr lang="en-US" dirty="0" smtClean="0"/>
-              <a:t>subtitle </a:t>
-            </a:r>
-            <a:r>
-              <a:rPr lang="en-US" dirty="0"/>
-              <a:t>style</a:t>
+              <a:t>Click to edit Master subtitle style</a:t>
             </a:r>
           </a:p>
         </p:txBody>
@@ -1166,7 +1158,7 @@
             <a:fld id="{1C2D31DE-C454-491C-B5C3-F097855E3DF7}" type="datetime4">
               <a:rPr lang="en-US" smtClean="0"/>
               <a:pPr/>
-              <a:t>March 24, 2020</a:t>
+              <a:t>September 1, 2022</a:t>
             </a:fld>
             <a:endParaRPr lang="en-US" dirty="0"/>
           </a:p>
@@ -4240,17 +4232,16 @@
           <a:p>
             <a:pPr lvl="0"/>
             <a:r>
-              <a:rPr lang="en-US" dirty="0" smtClean="0"/>
+              <a:rPr lang="en-US" dirty="0"/>
               <a:t>Presenter Name</a:t>
             </a:r>
             <a:br>
-              <a:rPr lang="en-US" dirty="0" smtClean="0"/>
+              <a:rPr lang="en-US" dirty="0"/>
             </a:br>
             <a:r>
-              <a:rPr lang="en-US" dirty="0" smtClean="0"/>
+              <a:rPr lang="en-US" dirty="0"/>
               <a:t>Presenter Title</a:t>
             </a:r>
-            <a:endParaRPr lang="en-US" dirty="0"/>
           </a:p>
         </p:txBody>
       </p:sp>
@@ -4267,13 +4258,6 @@
   <p:transition>
     <p:fade/>
   </p:transition>
-  <p:timing>
-    <p:tnLst>
-      <p:par>
-        <p:cTn id="1" dur="indefinite" restart="never" nodeType="tmRoot"/>
-      </p:par>
-    </p:tnLst>
-  </p:timing>
   <p:hf sldNum="0" hdr="0" ftr="0"/>
 </p:sldLayout>
 </file>
@@ -4566,7 +4550,7 @@
           <a:p>
             <a:fld id="{5958763E-B898-436D-883D-03711491D54A}" type="datetimeFigureOut">
               <a:rPr lang="en-US" smtClean="0"/>
-              <a:t>3/24/2020</a:t>
+              <a:t>9/1/2022</a:t>
             </a:fld>
             <a:endParaRPr lang="en-US"/>
           </a:p>
@@ -4639,13 +4623,6 @@
   <p:transition>
     <p:fade/>
   </p:transition>
-  <p:timing>
-    <p:tnLst>
-      <p:par>
-        <p:cTn id="1" dur="indefinite" restart="never" nodeType="tmRoot"/>
-      </p:par>
-    </p:tnLst>
-  </p:timing>
 </p:sldLayout>
 </file>
 
@@ -4694,10 +4671,9 @@
           </a:lstStyle>
           <a:p>
             <a:r>
-              <a:rPr lang="en-US" dirty="0" smtClean="0"/>
+              <a:rPr lang="en-US" dirty="0"/>
               <a:t>Click icon to add picture</a:t>
             </a:r>
-            <a:endParaRPr lang="en-US" dirty="0"/>
           </a:p>
         </p:txBody>
       </p:sp>
@@ -4767,7 +4743,7 @@
           <a:p>
             <a:fld id="{5958763E-B898-436D-883D-03711491D54A}" type="datetimeFigureOut">
               <a:rPr lang="en-US" smtClean="0"/>
-              <a:t>3/24/2020</a:t>
+              <a:t>9/1/2022</a:t>
             </a:fld>
             <a:endParaRPr lang="en-US"/>
           </a:p>
@@ -4840,13 +4816,6 @@
   <p:transition>
     <p:fade/>
   </p:transition>
-  <p:timing>
-    <p:tnLst>
-      <p:par>
-        <p:cTn id="1" dur="indefinite" restart="never" nodeType="tmRoot"/>
-      </p:par>
-    </p:tnLst>
-  </p:timing>
 </p:sldLayout>
 </file>
 
@@ -5024,7 +4993,7 @@
           <a:p>
             <a:fld id="{5958763E-B898-436D-883D-03711491D54A}" type="datetimeFigureOut">
               <a:rPr lang="en-US" smtClean="0"/>
-              <a:t>3/24/2020</a:t>
+              <a:t>9/1/2022</a:t>
             </a:fld>
             <a:endParaRPr lang="en-US"/>
           </a:p>
@@ -5097,13 +5066,6 @@
   <p:transition>
     <p:fade/>
   </p:transition>
-  <p:timing>
-    <p:tnLst>
-      <p:par>
-        <p:cTn id="1" dur="indefinite" restart="never" nodeType="tmRoot"/>
-      </p:par>
-    </p:tnLst>
-  </p:timing>
 </p:sldLayout>
 </file>
 
@@ -5379,7 +5341,7 @@
           <a:p>
             <a:fld id="{5958763E-B898-436D-883D-03711491D54A}" type="datetimeFigureOut">
               <a:rPr lang="en-US" smtClean="0"/>
-              <a:t>3/24/2020</a:t>
+              <a:t>9/1/2022</a:t>
             </a:fld>
             <a:endParaRPr lang="en-US"/>
           </a:p>
@@ -5440,13 +5402,6 @@
   <p:transition>
     <p:fade/>
   </p:transition>
-  <p:timing>
-    <p:tnLst>
-      <p:par>
-        <p:cTn id="1" dur="indefinite" restart="never" nodeType="tmRoot"/>
-      </p:par>
-    </p:tnLst>
-  </p:timing>
 </p:sldLayout>
 </file>
 
@@ -5802,7 +5757,7 @@
           <a:p>
             <a:fld id="{5958763E-B898-436D-883D-03711491D54A}" type="datetimeFigureOut">
               <a:rPr lang="en-US" smtClean="0"/>
-              <a:t>3/24/2020</a:t>
+              <a:t>9/1/2022</a:t>
             </a:fld>
             <a:endParaRPr lang="en-US"/>
           </a:p>
@@ -5863,13 +5818,6 @@
   <p:transition>
     <p:fade/>
   </p:transition>
-  <p:timing>
-    <p:tnLst>
-      <p:par>
-        <p:cTn id="1" dur="indefinite" restart="never" nodeType="tmRoot"/>
-      </p:par>
-    </p:tnLst>
-  </p:timing>
 </p:sldLayout>
 </file>
 
@@ -6310,7 +6258,7 @@
           <a:p>
             <a:fld id="{5958763E-B898-436D-883D-03711491D54A}" type="datetimeFigureOut">
               <a:rPr lang="en-US" smtClean="0"/>
-              <a:t>3/24/2020</a:t>
+              <a:t>9/1/2022</a:t>
             </a:fld>
             <a:endParaRPr lang="en-US"/>
           </a:p>
@@ -6371,13 +6319,6 @@
   <p:transition>
     <p:fade/>
   </p:transition>
-  <p:timing>
-    <p:tnLst>
-      <p:par>
-        <p:cTn id="1" dur="indefinite" restart="never" nodeType="tmRoot"/>
-      </p:par>
-    </p:tnLst>
-  </p:timing>
 </p:sldLayout>
 </file>
 
@@ -6768,7 +6709,7 @@
           <a:p>
             <a:fld id="{5958763E-B898-436D-883D-03711491D54A}" type="datetimeFigureOut">
               <a:rPr lang="en-US" smtClean="0"/>
-              <a:t>3/24/2020</a:t>
+              <a:t>9/1/2022</a:t>
             </a:fld>
             <a:endParaRPr lang="en-US"/>
           </a:p>
@@ -6829,13 +6770,6 @@
   <p:transition>
     <p:fade/>
   </p:transition>
-  <p:timing>
-    <p:tnLst>
-      <p:par>
-        <p:cTn id="1" dur="indefinite" restart="never" nodeType="tmRoot"/>
-      </p:par>
-    </p:tnLst>
-  </p:timing>
 </p:sldLayout>
 </file>
 
@@ -7386,7 +7320,7 @@
           <a:p>
             <a:fld id="{5958763E-B898-436D-883D-03711491D54A}" type="datetimeFigureOut">
               <a:rPr lang="en-US" smtClean="0"/>
-              <a:t>3/24/2020</a:t>
+              <a:t>9/1/2022</a:t>
             </a:fld>
             <a:endParaRPr lang="en-US"/>
           </a:p>
@@ -7447,13 +7381,6 @@
   <p:transition>
     <p:fade/>
   </p:transition>
-  <p:timing>
-    <p:tnLst>
-      <p:par>
-        <p:cTn id="1" dur="indefinite" restart="never" nodeType="tmRoot"/>
-      </p:par>
-    </p:tnLst>
-  </p:timing>
 </p:sldLayout>
 </file>
 
@@ -8164,7 +8091,7 @@
           <a:p>
             <a:fld id="{5958763E-B898-436D-883D-03711491D54A}" type="datetimeFigureOut">
               <a:rPr lang="en-US" smtClean="0"/>
-              <a:t>3/24/2020</a:t>
+              <a:t>9/1/2022</a:t>
             </a:fld>
             <a:endParaRPr lang="en-US"/>
           </a:p>
@@ -8225,13 +8152,6 @@
   <p:transition>
     <p:fade/>
   </p:transition>
-  <p:timing>
-    <p:tnLst>
-      <p:par>
-        <p:cTn id="1" dur="indefinite" restart="never" nodeType="tmRoot"/>
-      </p:par>
-    </p:tnLst>
-  </p:timing>
 </p:sldLayout>
 </file>
 
@@ -8275,7 +8195,7 @@
           <a:p>
             <a:fld id="{5958763E-B898-436D-883D-03711491D54A}" type="datetimeFigureOut">
               <a:rPr lang="en-US" smtClean="0"/>
-              <a:t>3/24/2020</a:t>
+              <a:t>9/1/2022</a:t>
             </a:fld>
             <a:endParaRPr lang="en-US"/>
           </a:p>
@@ -8348,13 +8268,6 @@
   <p:transition>
     <p:fade/>
   </p:transition>
-  <p:timing>
-    <p:tnLst>
-      <p:par>
-        <p:cTn id="1" dur="indefinite" restart="never" nodeType="tmRoot"/>
-      </p:par>
-    </p:tnLst>
-  </p:timing>
 </p:sldLayout>
 </file>
 
@@ -8434,7 +8347,7 @@
                 <a:spcPct val="0"/>
               </a:spcAft>
             </a:pPr>
-            <a:endParaRPr lang="en-US" sz="2400" dirty="0" err="1" smtClean="0">
+            <a:endParaRPr lang="en-US" sz="2400" dirty="0" err="1">
               <a:gradFill>
                 <a:gsLst>
                   <a:gs pos="0">
@@ -8567,15 +8480,7 @@
           <a:p>
             <a:r>
               <a:rPr lang="en-US" dirty="0"/>
-              <a:t>Click to edit Master </a:t>
-            </a:r>
-            <a:r>
-              <a:rPr lang="en-US" dirty="0" smtClean="0"/>
-              <a:t>subtitle </a:t>
-            </a:r>
-            <a:r>
-              <a:rPr lang="en-US" dirty="0"/>
-              <a:t>style</a:t>
+              <a:t>Click to edit Master subtitle style</a:t>
             </a:r>
           </a:p>
         </p:txBody>
@@ -8617,7 +8522,7 @@
             <a:fld id="{1C2D31DE-C454-491C-B5C3-F097855E3DF7}" type="datetime4">
               <a:rPr lang="en-US" smtClean="0"/>
               <a:pPr/>
-              <a:t>March 24, 2020</a:t>
+              <a:t>September 1, 2022</a:t>
             </a:fld>
             <a:endParaRPr lang="en-US" dirty="0"/>
           </a:p>
@@ -11691,17 +11596,16 @@
           <a:p>
             <a:pPr lvl="0"/>
             <a:r>
-              <a:rPr lang="en-US" dirty="0" smtClean="0"/>
+              <a:rPr lang="en-US" dirty="0"/>
               <a:t>Presenter Name</a:t>
             </a:r>
             <a:br>
-              <a:rPr lang="en-US" dirty="0" smtClean="0"/>
+              <a:rPr lang="en-US" dirty="0"/>
             </a:br>
             <a:r>
-              <a:rPr lang="en-US" dirty="0" smtClean="0"/>
+              <a:rPr lang="en-US" dirty="0"/>
               <a:t>Presenter Title</a:t>
             </a:r>
-            <a:endParaRPr lang="en-US" dirty="0"/>
           </a:p>
         </p:txBody>
       </p:sp>
@@ -11718,13 +11622,6 @@
   <p:transition>
     <p:fade/>
   </p:transition>
-  <p:timing>
-    <p:tnLst>
-      <p:par>
-        <p:cTn id="1" dur="indefinite" restart="never" nodeType="tmRoot"/>
-      </p:par>
-    </p:tnLst>
-  </p:timing>
   <p:hf sldNum="0" hdr="0" ftr="0"/>
 </p:sldLayout>
 </file>
@@ -11777,7 +11674,7 @@
           <a:p>
             <a:fld id="{5958763E-B898-436D-883D-03711491D54A}" type="datetimeFigureOut">
               <a:rPr lang="en-US" smtClean="0"/>
-              <a:t>3/24/2020</a:t>
+              <a:t>9/1/2022</a:t>
             </a:fld>
             <a:endParaRPr lang="en-US"/>
           </a:p>
@@ -11850,13 +11747,6 @@
   <p:transition>
     <p:fade/>
   </p:transition>
-  <p:timing>
-    <p:tnLst>
-      <p:par>
-        <p:cTn id="1" dur="indefinite" restart="never" nodeType="tmRoot"/>
-      </p:par>
-    </p:tnLst>
-  </p:timing>
 </p:sldLayout>
 </file>
 
@@ -11908,7 +11798,7 @@
           <a:p>
             <a:fld id="{5958763E-B898-436D-883D-03711491D54A}" type="datetimeFigureOut">
               <a:rPr lang="en-US" smtClean="0"/>
-              <a:t>3/24/2020</a:t>
+              <a:t>9/1/2022</a:t>
             </a:fld>
             <a:endParaRPr lang="en-US"/>
           </a:p>
@@ -11981,13 +11871,6 @@
   <p:transition>
     <p:fade/>
   </p:transition>
-  <p:timing>
-    <p:tnLst>
-      <p:par>
-        <p:cTn id="1" dur="indefinite" restart="never" nodeType="tmRoot"/>
-      </p:par>
-    </p:tnLst>
-  </p:timing>
 </p:sldLayout>
 </file>
 
@@ -12039,7 +11922,7 @@
           <a:p>
             <a:fld id="{5958763E-B898-436D-883D-03711491D54A}" type="datetimeFigureOut">
               <a:rPr lang="en-US" smtClean="0"/>
-              <a:t>3/24/2020</a:t>
+              <a:t>9/1/2022</a:t>
             </a:fld>
             <a:endParaRPr lang="en-US"/>
           </a:p>
@@ -12112,13 +11995,6 @@
   <p:transition>
     <p:fade/>
   </p:transition>
-  <p:timing>
-    <p:tnLst>
-      <p:par>
-        <p:cTn id="1" dur="indefinite" restart="never" nodeType="tmRoot"/>
-      </p:par>
-    </p:tnLst>
-  </p:timing>
 </p:sldLayout>
 </file>
 
@@ -12170,7 +12046,7 @@
           <a:p>
             <a:fld id="{5958763E-B898-436D-883D-03711491D54A}" type="datetimeFigureOut">
               <a:rPr lang="en-US" smtClean="0"/>
-              <a:t>3/24/2020</a:t>
+              <a:t>9/1/2022</a:t>
             </a:fld>
             <a:endParaRPr lang="en-US"/>
           </a:p>
@@ -12243,13 +12119,6 @@
   <p:transition>
     <p:fade/>
   </p:transition>
-  <p:timing>
-    <p:tnLst>
-      <p:par>
-        <p:cTn id="1" dur="indefinite" restart="never" nodeType="tmRoot"/>
-      </p:par>
-    </p:tnLst>
-  </p:timing>
 </p:sldLayout>
 </file>
 
@@ -12301,7 +12170,7 @@
           <a:p>
             <a:fld id="{5958763E-B898-436D-883D-03711491D54A}" type="datetimeFigureOut">
               <a:rPr lang="en-US" smtClean="0"/>
-              <a:t>3/24/2020</a:t>
+              <a:t>9/1/2022</a:t>
             </a:fld>
             <a:endParaRPr lang="en-US"/>
           </a:p>
@@ -12374,13 +12243,6 @@
   <p:transition>
     <p:fade/>
   </p:transition>
-  <p:timing>
-    <p:tnLst>
-      <p:par>
-        <p:cTn id="1" dur="indefinite" restart="never" nodeType="tmRoot"/>
-      </p:par>
-    </p:tnLst>
-  </p:timing>
 </p:sldLayout>
 </file>
 
@@ -12432,7 +12294,7 @@
           <a:p>
             <a:fld id="{5958763E-B898-436D-883D-03711491D54A}" type="datetimeFigureOut">
               <a:rPr lang="en-US" smtClean="0"/>
-              <a:t>3/24/2020</a:t>
+              <a:t>9/1/2022</a:t>
             </a:fld>
             <a:endParaRPr lang="en-US"/>
           </a:p>
@@ -12505,13 +12367,6 @@
   <p:transition>
     <p:fade/>
   </p:transition>
-  <p:timing>
-    <p:tnLst>
-      <p:par>
-        <p:cTn id="1" dur="indefinite" restart="never" nodeType="tmRoot"/>
-      </p:par>
-    </p:tnLst>
-  </p:timing>
 </p:sldLayout>
 </file>
 
@@ -12563,7 +12418,7 @@
           <a:p>
             <a:fld id="{5958763E-B898-436D-883D-03711491D54A}" type="datetimeFigureOut">
               <a:rPr lang="en-US" smtClean="0"/>
-              <a:t>3/24/2020</a:t>
+              <a:t>9/1/2022</a:t>
             </a:fld>
             <a:endParaRPr lang="en-US"/>
           </a:p>
@@ -12636,13 +12491,6 @@
   <p:transition>
     <p:fade/>
   </p:transition>
-  <p:timing>
-    <p:tnLst>
-      <p:par>
-        <p:cTn id="1" dur="indefinite" restart="never" nodeType="tmRoot"/>
-      </p:par>
-    </p:tnLst>
-  </p:timing>
 </p:sldLayout>
 </file>
 
@@ -12694,7 +12542,7 @@
           <a:p>
             <a:fld id="{5958763E-B898-436D-883D-03711491D54A}" type="datetimeFigureOut">
               <a:rPr lang="en-US" smtClean="0"/>
-              <a:t>3/24/2020</a:t>
+              <a:t>9/1/2022</a:t>
             </a:fld>
             <a:endParaRPr lang="en-US"/>
           </a:p>
@@ -12767,13 +12615,6 @@
   <p:transition>
     <p:fade/>
   </p:transition>
-  <p:timing>
-    <p:tnLst>
-      <p:par>
-        <p:cTn id="1" dur="indefinite" restart="never" nodeType="tmRoot"/>
-      </p:par>
-    </p:tnLst>
-  </p:timing>
 </p:sldLayout>
 </file>
 
@@ -12834,7 +12675,7 @@
           <a:p>
             <a:fld id="{5958763E-B898-436D-883D-03711491D54A}" type="datetimeFigureOut">
               <a:rPr lang="en-US" smtClean="0"/>
-              <a:t>3/24/2020</a:t>
+              <a:t>9/1/2022</a:t>
             </a:fld>
             <a:endParaRPr lang="en-US"/>
           </a:p>
@@ -12907,13 +12748,6 @@
   <p:transition>
     <p:fade/>
   </p:transition>
-  <p:timing>
-    <p:tnLst>
-      <p:par>
-        <p:cTn id="1" dur="indefinite" restart="never" nodeType="tmRoot"/>
-      </p:par>
-    </p:tnLst>
-  </p:timing>
 </p:sldLayout>
 </file>
 
@@ -15915,13 +15749,6 @@
   <p:transition>
     <p:fade/>
   </p:transition>
-  <p:timing>
-    <p:tnLst>
-      <p:par>
-        <p:cTn id="1" dur="indefinite" restart="never" nodeType="tmRoot"/>
-      </p:par>
-    </p:tnLst>
-  </p:timing>
 </p:sldLayout>
 </file>
 
@@ -16009,7 +15836,7 @@
                 <a:spcPct val="0"/>
               </a:spcAft>
             </a:pPr>
-            <a:endParaRPr lang="en-US" sz="2400" dirty="0" err="1" smtClean="0">
+            <a:endParaRPr lang="en-US" sz="2400" dirty="0" err="1">
               <a:gradFill>
                 <a:gsLst>
                   <a:gs pos="0">
@@ -16145,15 +15972,7 @@
           <a:p>
             <a:r>
               <a:rPr lang="en-US" dirty="0"/>
-              <a:t>Click to edit Master </a:t>
-            </a:r>
-            <a:r>
-              <a:rPr lang="en-US" dirty="0" smtClean="0"/>
-              <a:t>subtitle </a:t>
-            </a:r>
-            <a:r>
-              <a:rPr lang="en-US" dirty="0"/>
-              <a:t>style</a:t>
+              <a:t>Click to edit Master subtitle style</a:t>
             </a:r>
           </a:p>
         </p:txBody>
@@ -16195,7 +16014,7 @@
             <a:fld id="{1C2D31DE-C454-491C-B5C3-F097855E3DF7}" type="datetime4">
               <a:rPr lang="en-US" smtClean="0"/>
               <a:pPr/>
-              <a:t>March 24, 2020</a:t>
+              <a:t>September 1, 2022</a:t>
             </a:fld>
             <a:endParaRPr lang="en-US" dirty="0"/>
           </a:p>
@@ -19277,17 +19096,16 @@
           <a:p>
             <a:pPr lvl="0"/>
             <a:r>
-              <a:rPr lang="en-US" dirty="0" smtClean="0"/>
+              <a:rPr lang="en-US" dirty="0"/>
               <a:t>Presenter Name</a:t>
             </a:r>
             <a:br>
-              <a:rPr lang="en-US" dirty="0" smtClean="0"/>
+              <a:rPr lang="en-US" dirty="0"/>
             </a:br>
             <a:r>
-              <a:rPr lang="en-US" dirty="0" smtClean="0"/>
+              <a:rPr lang="en-US" dirty="0"/>
               <a:t>Presenter Title</a:t>
             </a:r>
-            <a:endParaRPr lang="en-US" dirty="0"/>
           </a:p>
         </p:txBody>
       </p:sp>
@@ -19304,13 +19122,6 @@
   <p:transition>
     <p:fade/>
   </p:transition>
-  <p:timing>
-    <p:tnLst>
-      <p:par>
-        <p:cTn id="1" dur="indefinite" restart="never" nodeType="tmRoot"/>
-      </p:par>
-    </p:tnLst>
-  </p:timing>
   <p:hf sldNum="0" hdr="0" ftr="0"/>
 </p:sldLayout>
 </file>
@@ -26820,10 +26631,9 @@
           <a:p>
             <a:pPr lvl="0"/>
             <a:r>
-              <a:rPr lang="en-US" dirty="0" smtClean="0"/>
+              <a:rPr lang="en-US" dirty="0"/>
               <a:t>&lt;Call to action&gt;</a:t>
             </a:r>
-            <a:endParaRPr lang="en-US" dirty="0"/>
           </a:p>
         </p:txBody>
       </p:sp>
@@ -28440,7 +28250,7 @@
           <a:p>
             <a:fld id="{5958763E-B898-436D-883D-03711491D54A}" type="datetimeFigureOut">
               <a:rPr lang="en-US" smtClean="0"/>
-              <a:t>3/24/2020</a:t>
+              <a:t>9/1/2022</a:t>
             </a:fld>
             <a:endParaRPr lang="en-US"/>
           </a:p>
@@ -28567,7 +28377,7 @@
                 <a:spcPct val="0"/>
               </a:spcAft>
             </a:pPr>
-            <a:endParaRPr lang="en-US" sz="2400" dirty="0" err="1" smtClean="0">
+            <a:endParaRPr lang="en-US" sz="2400" dirty="0" err="1">
               <a:gradFill>
                 <a:gsLst>
                   <a:gs pos="0">
@@ -28598,13 +28408,6 @@
   <p:transition>
     <p:fade/>
   </p:transition>
-  <p:timing>
-    <p:tnLst>
-      <p:par>
-        <p:cTn id="1" dur="indefinite" restart="never" nodeType="tmRoot"/>
-      </p:par>
-    </p:tnLst>
-  </p:timing>
 </p:sldLayout>
 </file>
 
@@ -28849,7 +28652,7 @@
           <a:p>
             <a:fld id="{5958763E-B898-436D-883D-03711491D54A}" type="datetimeFigureOut">
               <a:rPr lang="en-US" smtClean="0"/>
-              <a:t>3/24/2020</a:t>
+              <a:t>9/1/2022</a:t>
             </a:fld>
             <a:endParaRPr lang="en-US"/>
           </a:p>
@@ -28922,13 +28725,6 @@
   <p:transition>
     <p:fade/>
   </p:transition>
-  <p:timing>
-    <p:tnLst>
-      <p:par>
-        <p:cTn id="1" dur="indefinite" restart="never" nodeType="tmRoot"/>
-      </p:par>
-    </p:tnLst>
-  </p:timing>
 </p:sldLayout>
 </file>
 
@@ -29150,7 +28946,7 @@
           <a:p>
             <a:fld id="{5958763E-B898-436D-883D-03711491D54A}" type="datetimeFigureOut">
               <a:rPr lang="en-US" smtClean="0"/>
-              <a:t>3/24/2020</a:t>
+              <a:t>9/1/2022</a:t>
             </a:fld>
             <a:endParaRPr lang="en-US"/>
           </a:p>
@@ -29223,13 +29019,6 @@
   <p:transition>
     <p:fade/>
   </p:transition>
-  <p:timing>
-    <p:tnLst>
-      <p:par>
-        <p:cTn id="1" dur="indefinite" restart="never" nodeType="tmRoot"/>
-      </p:par>
-    </p:tnLst>
-  </p:timing>
 </p:sldLayout>
 </file>
 
@@ -29358,7 +29147,7 @@
           <a:p>
             <a:fld id="{5958763E-B898-436D-883D-03711491D54A}" type="datetimeFigureOut">
               <a:rPr lang="en-US" smtClean="0"/>
-              <a:t>3/24/2020</a:t>
+              <a:t>9/1/2022</a:t>
             </a:fld>
             <a:endParaRPr lang="en-US"/>
           </a:p>
@@ -29481,13 +29270,6 @@
   <p:transition>
     <p:fade/>
   </p:transition>
-  <p:timing>
-    <p:tnLst>
-      <p:par>
-        <p:cTn id="1" dur="indefinite" restart="never" nodeType="tmRoot"/>
-      </p:par>
-    </p:tnLst>
-  </p:timing>
 </p:sldLayout>
 </file>
 
@@ -29626,7 +29408,7 @@
           <a:p>
             <a:fld id="{5958763E-B898-436D-883D-03711491D54A}" type="datetimeFigureOut">
               <a:rPr lang="en-US" smtClean="0"/>
-              <a:t>3/24/2020</a:t>
+              <a:t>9/1/2022</a:t>
             </a:fld>
             <a:endParaRPr lang="en-US"/>
           </a:p>
@@ -29753,13 +29535,6 @@
   <p:transition>
     <p:fade/>
   </p:transition>
-  <p:timing>
-    <p:tnLst>
-      <p:par>
-        <p:cTn id="1" dur="indefinite" restart="never" nodeType="tmRoot"/>
-      </p:par>
-    </p:tnLst>
-  </p:timing>
 </p:sldLayout>
 </file>
 
@@ -29921,7 +29696,7 @@
                 <a:spcPct val="0"/>
               </a:spcAft>
             </a:pPr>
-            <a:endParaRPr lang="en-US" sz="2400" dirty="0" err="1" smtClean="0">
+            <a:endParaRPr lang="en-US" sz="2400" dirty="0" err="1">
               <a:gradFill>
                 <a:gsLst>
                   <a:gs pos="0">
@@ -29972,10 +29747,9 @@
           </a:lstStyle>
           <a:p>
             <a:r>
-              <a:rPr lang="en-US" dirty="0" smtClean="0"/>
+              <a:rPr lang="en-US" dirty="0"/>
               <a:t>Type “Agenda”</a:t>
             </a:r>
-            <a:endParaRPr lang="en-US" dirty="0"/>
           </a:p>
         </p:txBody>
       </p:sp>
@@ -30099,24 +29873,23 @@
           <a:p>
             <a:pPr lvl="0"/>
             <a:r>
-              <a:rPr lang="en-US" dirty="0" smtClean="0"/>
+              <a:rPr lang="en-US" dirty="0"/>
               <a:t>Item 1</a:t>
             </a:r>
           </a:p>
           <a:p>
             <a:pPr lvl="0"/>
             <a:r>
-              <a:rPr lang="en-US" dirty="0" smtClean="0"/>
+              <a:rPr lang="en-US" dirty="0"/>
               <a:t>Item 2</a:t>
             </a:r>
           </a:p>
           <a:p>
             <a:pPr lvl="0"/>
             <a:r>
-              <a:rPr lang="en-US" dirty="0" smtClean="0"/>
+              <a:rPr lang="en-US" dirty="0"/>
               <a:t>Item 3</a:t>
             </a:r>
-            <a:endParaRPr lang="en-US" dirty="0"/>
           </a:p>
         </p:txBody>
       </p:sp>
@@ -30143,7 +29916,7 @@
           <a:p>
             <a:fld id="{5958763E-B898-436D-883D-03711491D54A}" type="datetimeFigureOut">
               <a:rPr lang="en-US" smtClean="0"/>
-              <a:t>3/24/2020</a:t>
+              <a:t>9/1/2022</a:t>
             </a:fld>
             <a:endParaRPr lang="en-US"/>
           </a:p>
@@ -30250,13 +30023,6 @@
   <p:transition>
     <p:fade/>
   </p:transition>
-  <p:timing>
-    <p:tnLst>
-      <p:par>
-        <p:cTn id="1" dur="indefinite" restart="never" nodeType="tmRoot"/>
-      </p:par>
-    </p:tnLst>
-  </p:timing>
 </p:sldLayout>
 </file>
 
@@ -30418,7 +30184,7 @@
                 <a:spcPct val="0"/>
               </a:spcAft>
             </a:pPr>
-            <a:endParaRPr lang="en-US" sz="2400" dirty="0" err="1" smtClean="0">
+            <a:endParaRPr lang="en-US" sz="2400" dirty="0" err="1">
               <a:gradFill>
                 <a:gsLst>
                   <a:gs pos="0">
@@ -30471,10 +30237,9 @@
           </a:lstStyle>
           <a:p>
             <a:r>
-              <a:rPr lang="en-US" dirty="0" smtClean="0"/>
+              <a:rPr lang="en-US" dirty="0"/>
               <a:t>Notable Quote</a:t>
             </a:r>
-            <a:endParaRPr lang="en-US" dirty="0"/>
           </a:p>
         </p:txBody>
       </p:sp>
@@ -30601,10 +30366,9 @@
           <a:p>
             <a:pPr lvl="0"/>
             <a:r>
-              <a:rPr lang="en-US" dirty="0" smtClean="0"/>
+              <a:rPr lang="en-US" dirty="0"/>
               <a:t>– Attribution</a:t>
             </a:r>
-            <a:endParaRPr lang="en-US" dirty="0"/>
           </a:p>
         </p:txBody>
       </p:sp>
@@ -30631,7 +30395,7 @@
           <a:p>
             <a:fld id="{5958763E-B898-436D-883D-03711491D54A}" type="datetimeFigureOut">
               <a:rPr lang="en-US" smtClean="0"/>
-              <a:t>3/24/2020</a:t>
+              <a:t>9/1/2022</a:t>
             </a:fld>
             <a:endParaRPr lang="en-US"/>
           </a:p>
@@ -31379,13 +31143,6 @@
   <p:transition>
     <p:fade/>
   </p:transition>
-  <p:timing>
-    <p:tnLst>
-      <p:par>
-        <p:cTn id="1" dur="indefinite" restart="never" nodeType="tmRoot"/>
-      </p:par>
-    </p:tnLst>
-  </p:timing>
 </p:sldLayout>
 </file>
 
@@ -31457,7 +31214,7 @@
           <a:p>
             <a:fld id="{5958763E-B898-436D-883D-03711491D54A}" type="datetimeFigureOut">
               <a:rPr lang="en-US" smtClean="0"/>
-              <a:t>3/24/2020</a:t>
+              <a:t>9/1/2022</a:t>
             </a:fld>
             <a:endParaRPr lang="en-US"/>
           </a:p>
@@ -31530,13 +31287,6 @@
   <p:transition>
     <p:fade/>
   </p:transition>
-  <p:timing>
-    <p:tnLst>
-      <p:par>
-        <p:cTn id="1" dur="indefinite" restart="never" nodeType="tmRoot"/>
-      </p:par>
-    </p:tnLst>
-  </p:timing>
 </p:sldLayout>
 </file>
 
@@ -31665,7 +31415,7 @@
           <a:p>
             <a:fld id="{5958763E-B898-436D-883D-03711491D54A}" type="datetimeFigureOut">
               <a:rPr lang="en-US" smtClean="0"/>
-              <a:t>3/24/2020</a:t>
+              <a:t>9/1/2022</a:t>
             </a:fld>
             <a:endParaRPr lang="en-US"/>
           </a:p>
@@ -31788,13 +31538,6 @@
   <p:transition>
     <p:fade/>
   </p:transition>
-  <p:timing>
-    <p:tnLst>
-      <p:par>
-        <p:cTn id="1" dur="indefinite" restart="never" nodeType="tmRoot"/>
-      </p:par>
-    </p:tnLst>
-  </p:timing>
 </p:sldLayout>
 </file>
 
@@ -32007,7 +31750,7 @@
           <a:p>
             <a:fld id="{5958763E-B898-436D-883D-03711491D54A}" type="datetimeFigureOut">
               <a:rPr lang="en-US" smtClean="0"/>
-              <a:t>3/24/2020</a:t>
+              <a:t>9/1/2022</a:t>
             </a:fld>
             <a:endParaRPr lang="en-US"/>
           </a:p>
@@ -32080,13 +31823,6 @@
   <p:transition>
     <p:fade/>
   </p:transition>
-  <p:timing>
-    <p:tnLst>
-      <p:par>
-        <p:cTn id="1" dur="indefinite" restart="never" nodeType="tmRoot"/>
-      </p:par>
-    </p:tnLst>
-  </p:timing>
 </p:sldLayout>
 </file>
 
@@ -32244,7 +31980,7 @@
           <a:p>
             <a:fld id="{5958763E-B898-436D-883D-03711491D54A}" type="datetimeFigureOut">
               <a:rPr lang="en-US" smtClean="0"/>
-              <a:t>3/24/2020</a:t>
+              <a:t>9/1/2022</a:t>
             </a:fld>
             <a:endParaRPr lang="en-US"/>
           </a:p>
@@ -32317,13 +32053,6 @@
   <p:transition>
     <p:fade/>
   </p:transition>
-  <p:timing>
-    <p:tnLst>
-      <p:par>
-        <p:cTn id="1" dur="indefinite" restart="never" nodeType="tmRoot"/>
-      </p:par>
-    </p:tnLst>
-  </p:timing>
 </p:sldLayout>
 </file>
 
@@ -32495,7 +32224,7 @@
           <a:p>
             <a:fld id="{5958763E-B898-436D-883D-03711491D54A}" type="datetimeFigureOut">
               <a:rPr lang="en-US" smtClean="0"/>
-              <a:t>3/24/2020</a:t>
+              <a:t>9/1/2022</a:t>
             </a:fld>
             <a:endParaRPr lang="en-US"/>
           </a:p>
@@ -32641,13 +32370,6 @@
   <p:transition>
     <p:fade/>
   </p:transition>
-  <p:timing>
-    <p:tnLst>
-      <p:par>
-        <p:cTn id="1" dur="indefinite" restart="never" nodeType="tmRoot"/>
-      </p:par>
-    </p:tnLst>
-  </p:timing>
   <p:txStyles>
     <p:titleStyle>
       <a:lvl1pPr algn="l" defTabSz="914400" rtl="0" eaLnBrk="1" latinLnBrk="0" hangingPunct="1">
@@ -32952,7 +32674,7 @@
       </a:lvl9pPr>
     </p:otherStyle>
   </p:txStyles>
-  <p:extLst mod="1">
+  <p:extLst>
     <p:ext uri="{27BBF7A9-308A-43DC-89C8-2F10F3537804}">
       <p15:sldGuideLst xmlns:p15="http://schemas.microsoft.com/office/powerpoint/2012/main">
         <p15:guide id="1" orient="horz" pos="2160" userDrawn="1">
@@ -33031,10 +32753,9 @@
           <a:lstStyle/>
           <a:p>
             <a:r>
-              <a:rPr lang="en-US" sz="6600" dirty="0" smtClean="0"/>
+              <a:rPr lang="en-US" sz="6600" dirty="0"/>
               <a:t>Introduction to JavaScript</a:t>
             </a:r>
-            <a:endParaRPr lang="en-US" sz="6600" dirty="0"/>
           </a:p>
         </p:txBody>
       </p:sp>
@@ -33059,14 +32780,9 @@
           <a:lstStyle/>
           <a:p>
             <a:r>
-              <a:rPr lang="en-US" dirty="0" smtClean="0"/>
-              <a:t>Hy-Tech Club: Web </a:t>
+              <a:rPr lang="en-US" dirty="0"/>
+              <a:t>Hy-Tech Club: Web 102</a:t>
             </a:r>
-            <a:r>
-              <a:rPr lang="en-US" dirty="0" smtClean="0"/>
-              <a:t>102</a:t>
-            </a:r>
-            <a:endParaRPr lang="en-US" dirty="0"/>
           </a:p>
         </p:txBody>
       </p:sp>
@@ -36051,13 +35767,6 @@
   <p:transition>
     <p:fade/>
   </p:transition>
-  <p:timing>
-    <p:tnLst>
-      <p:par>
-        <p:cTn id="1" dur="indefinite" restart="never" nodeType="tmRoot"/>
-      </p:par>
-    </p:tnLst>
-  </p:timing>
 </p:sld>
 </file>
 
@@ -36099,36 +35808,31 @@
           <a:lstStyle/>
           <a:p>
             <a:r>
-              <a:rPr lang="en-US" cap="none" dirty="0" smtClean="0"/>
+              <a:rPr lang="en-US" cap="none" dirty="0"/>
               <a:t>JavaScript</a:t>
             </a:r>
             <a:r>
-              <a:rPr lang="en-US" b="0" cap="none" dirty="0" smtClean="0"/>
+              <a:rPr lang="en-US" b="0" cap="none" dirty="0"/>
               <a:t> is the programming language of the web.</a:t>
             </a:r>
             <a:br>
-              <a:rPr lang="en-US" b="0" cap="none" dirty="0" smtClean="0"/>
+              <a:rPr lang="en-US" b="0" cap="none" dirty="0"/>
+            </a:br>
+            <a:br>
+              <a:rPr lang="en-US" b="0" cap="none" dirty="0"/>
             </a:br>
             <a:r>
-              <a:rPr lang="en-US" b="0" cap="none" dirty="0" smtClean="0"/>
-              <a:t/>
-            </a:r>
-            <a:br>
-              <a:rPr lang="en-US" b="0" cap="none" dirty="0" smtClean="0"/>
-            </a:br>
-            <a:r>
-              <a:rPr lang="en-US" b="0" cap="none" dirty="0" smtClean="0"/>
+              <a:rPr lang="en-US" b="0" cap="none" dirty="0"/>
               <a:t>It makes websites </a:t>
             </a:r>
             <a:r>
-              <a:rPr lang="en-US" b="0" i="1" cap="none" dirty="0" smtClean="0"/>
+              <a:rPr lang="en-US" b="0" i="1" cap="none" dirty="0"/>
               <a:t>interactive</a:t>
             </a:r>
             <a:r>
-              <a:rPr lang="en-US" b="0" cap="none" dirty="0" smtClean="0"/>
+              <a:rPr lang="en-US" b="0" cap="none" dirty="0"/>
               <a:t>.</a:t>
             </a:r>
-            <a:endParaRPr lang="en-US" b="0" cap="none" dirty="0"/>
           </a:p>
         </p:txBody>
       </p:sp>
@@ -36145,13 +35849,6 @@
   <p:transition>
     <p:fade/>
   </p:transition>
-  <p:timing>
-    <p:tnLst>
-      <p:par>
-        <p:cTn id="1" dur="indefinite" restart="never" nodeType="tmRoot"/>
-      </p:par>
-    </p:tnLst>
-  </p:timing>
 </p:sld>
 </file>
 
@@ -36188,10 +35885,9 @@
           <a:lstStyle/>
           <a:p>
             <a:r>
-              <a:rPr lang="en-US" dirty="0" smtClean="0"/>
+              <a:rPr lang="en-US" dirty="0"/>
               <a:t>A world without JavaScript</a:t>
             </a:r>
-            <a:endParaRPr lang="en-US" dirty="0"/>
           </a:p>
         </p:txBody>
       </p:sp>
@@ -36221,16 +35917,10 @@
               <a:buNone/>
             </a:pPr>
             <a:r>
-              <a:rPr lang="en-US" sz="4400" dirty="0" smtClean="0">
-                <a:hlinkClick r:id="rId3"/>
-              </a:rPr>
-              <a:t>https</a:t>
-            </a:r>
-            <a:r>
               <a:rPr lang="en-US" sz="4400" dirty="0">
                 <a:hlinkClick r:id="rId3"/>
               </a:rPr>
-              <a:t>://web.archive.org/web/19961017235908/http://www2.yahoo.com:80/</a:t>
+              <a:t>https://web.archive.org/web/19961017235908/http://www2.yahoo.com:80/</a:t>
             </a:r>
             <a:endParaRPr lang="en-US" sz="4400" dirty="0"/>
           </a:p>
@@ -36290,13 +35980,6 @@
   <p:transition>
     <p:fade/>
   </p:transition>
-  <p:timing>
-    <p:tnLst>
-      <p:par>
-        <p:cTn id="1" dur="indefinite" restart="never" nodeType="tmRoot"/>
-      </p:par>
-    </p:tnLst>
-  </p:timing>
 </p:sld>
 </file>
 
@@ -36333,18 +36016,17 @@
           <a:lstStyle/>
           <a:p>
             <a:r>
-              <a:rPr lang="en-US" dirty="0" smtClean="0"/>
+              <a:rPr lang="en-US" dirty="0"/>
               <a:t>What do developers use </a:t>
             </a:r>
             <a:r>
-              <a:rPr lang="en-US" dirty="0" err="1" smtClean="0"/>
+              <a:rPr lang="en-US" dirty="0" err="1"/>
               <a:t>javascript</a:t>
             </a:r>
             <a:r>
-              <a:rPr lang="en-US" dirty="0" smtClean="0"/>
+              <a:rPr lang="en-US" dirty="0"/>
               <a:t> for?</a:t>
             </a:r>
-            <a:endParaRPr lang="en-US" dirty="0"/>
           </a:p>
         </p:txBody>
       </p:sp>
@@ -36416,13 +36098,6 @@
   <p:transition>
     <p:fade/>
   </p:transition>
-  <p:timing>
-    <p:tnLst>
-      <p:par>
-        <p:cTn id="1" dur="indefinite" restart="never" nodeType="tmRoot"/>
-      </p:par>
-    </p:tnLst>
-  </p:timing>
 </p:sld>
 </file>
 
@@ -36459,10 +36134,9 @@
           <a:lstStyle/>
           <a:p>
             <a:r>
-              <a:rPr lang="en-US" dirty="0" smtClean="0"/>
+              <a:rPr lang="en-US" dirty="0"/>
               <a:t>A simple JavaScript program – in html</a:t>
             </a:r>
-            <a:endParaRPr lang="en-US" dirty="0"/>
           </a:p>
         </p:txBody>
       </p:sp>
@@ -36644,27 +36318,8 @@
                 </a:solidFill>
                 <a:latin typeface="Consolas" panose="020B0609020204030204" pitchFamily="49" charset="0"/>
               </a:rPr>
-              <a:t>&lt;/html</a:t>
+              <a:t>&lt;/html&gt;</a:t>
             </a:r>
-            <a:r>
-              <a:rPr lang="en-US" dirty="0" smtClean="0">
-                <a:solidFill>
-                  <a:srgbClr val="800000">
-                    <a:alpha val="50000"/>
-                  </a:srgbClr>
-                </a:solidFill>
-                <a:latin typeface="Consolas" panose="020B0609020204030204" pitchFamily="49" charset="0"/>
-              </a:rPr>
-              <a:t>&gt;</a:t>
-            </a:r>
-            <a:endParaRPr lang="en-US" dirty="0">
-              <a:solidFill>
-                <a:srgbClr val="800000">
-                  <a:alpha val="50000"/>
-                </a:srgbClr>
-              </a:solidFill>
-              <a:latin typeface="Consolas" panose="020B0609020204030204" pitchFamily="49" charset="0"/>
-            </a:endParaRPr>
           </a:p>
         </p:txBody>
       </p:sp>
@@ -36681,13 +36336,6 @@
   <p:transition>
     <p:fade/>
   </p:transition>
-  <p:timing>
-    <p:tnLst>
-      <p:par>
-        <p:cTn id="1" dur="indefinite" restart="never" nodeType="tmRoot"/>
-      </p:par>
-    </p:tnLst>
-  </p:timing>
 </p:sld>
 </file>
 
@@ -36724,10 +36372,9 @@
           <a:lstStyle/>
           <a:p>
             <a:r>
-              <a:rPr lang="en-US" dirty="0" smtClean="0"/>
+              <a:rPr lang="en-US" dirty="0"/>
               <a:t>Unpacking the example</a:t>
             </a:r>
-            <a:endParaRPr lang="en-US" dirty="0"/>
           </a:p>
         </p:txBody>
       </p:sp>
@@ -36759,13 +36406,8 @@
             </a:r>
             <a:r>
               <a:rPr lang="en-US" sz="3600" dirty="0"/>
-              <a:t> </a:t>
+              <a:t> element</a:t>
             </a:r>
-            <a:r>
-              <a:rPr lang="en-US" sz="3600" dirty="0" smtClean="0"/>
-              <a:t>element</a:t>
-            </a:r>
-            <a:endParaRPr lang="en-US" sz="3600" dirty="0"/>
           </a:p>
           <a:p>
             <a:pPr lvl="1"/>
@@ -36775,21 +36417,8 @@
                   <a:schemeClr val="tx2"/>
                 </a:solidFill>
               </a:rPr>
-              <a:t>This is </a:t>
+              <a:t>This is contains JavaScript code</a:t>
             </a:r>
-            <a:r>
-              <a:rPr lang="en-US" sz="3067" dirty="0" smtClean="0">
-                <a:solidFill>
-                  <a:schemeClr val="tx2"/>
-                </a:solidFill>
-              </a:rPr>
-              <a:t>contains JavaScript code</a:t>
-            </a:r>
-            <a:endParaRPr lang="en-US" sz="3067" dirty="0">
-              <a:solidFill>
-                <a:schemeClr val="tx2"/>
-              </a:solidFill>
-            </a:endParaRPr>
           </a:p>
           <a:p>
             <a:pPr lvl="1"/>
@@ -36807,13 +36436,8 @@
             </a:r>
             <a:r>
               <a:rPr lang="en-US" sz="3600" dirty="0"/>
-              <a:t> </a:t>
+              <a:t> element</a:t>
             </a:r>
-            <a:r>
-              <a:rPr lang="en-US" sz="3600" dirty="0" smtClean="0"/>
-              <a:t>element</a:t>
-            </a:r>
-            <a:endParaRPr lang="en-US" sz="3600" dirty="0"/>
           </a:p>
           <a:p>
             <a:pPr lvl="1"/>
@@ -36823,15 +36447,7 @@
                   <a:schemeClr val="tx2"/>
                 </a:solidFill>
               </a:rPr>
-              <a:t>This is where </a:t>
-            </a:r>
-            <a:r>
-              <a:rPr lang="en-US" sz="3067" dirty="0" smtClean="0">
-                <a:solidFill>
-                  <a:schemeClr val="tx2"/>
-                </a:solidFill>
-              </a:rPr>
-              <a:t>the </a:t>
+              <a:t>This is where the </a:t>
             </a:r>
             <a:r>
               <a:rPr lang="en-US" sz="3067" dirty="0">
@@ -36851,20 +36467,12 @@
               <a:t> </a:t>
             </a:r>
             <a:r>
-              <a:rPr lang="en-US" sz="3067" dirty="0" smtClean="0">
-                <a:solidFill>
-                  <a:schemeClr val="tx2"/>
-                </a:solidFill>
-              </a:rPr>
-              <a:t>element </a:t>
-            </a:r>
-            <a:r>
               <a:rPr lang="en-US" sz="3067" dirty="0">
                 <a:solidFill>
                   <a:schemeClr val="tx2"/>
                 </a:solidFill>
               </a:rPr>
-              <a:t>goes</a:t>
+              <a:t>element goes</a:t>
             </a:r>
           </a:p>
           <a:p>
@@ -36924,23 +36532,7 @@
                   <a:schemeClr val="tx2"/>
                 </a:solidFill>
               </a:rPr>
-              <a:t> in JavaScript. This one tells the computer to </a:t>
-            </a:r>
-            <a:r>
-              <a:rPr lang="en-US" sz="3067" dirty="0" smtClean="0">
-                <a:solidFill>
-                  <a:schemeClr val="tx2"/>
-                </a:solidFill>
-              </a:rPr>
-              <a:t>display a message of </a:t>
-            </a:r>
-            <a:r>
-              <a:rPr lang="en-US" sz="3067" dirty="0">
-                <a:solidFill>
-                  <a:schemeClr val="tx2"/>
-                </a:solidFill>
-              </a:rPr>
-              <a:t>“Hello, world!”</a:t>
+              <a:t> in JavaScript. This one tells the computer to display a message of “Hello, world!”</a:t>
             </a:r>
           </a:p>
           <a:p>
@@ -37345,10 +36937,9 @@
           <a:lstStyle/>
           <a:p>
             <a:r>
-              <a:rPr lang="en-US" dirty="0" smtClean="0"/>
+              <a:rPr lang="en-US" dirty="0"/>
               <a:t>Unpacking the statement</a:t>
             </a:r>
-            <a:endParaRPr lang="en-US" dirty="0"/>
           </a:p>
         </p:txBody>
       </p:sp>
@@ -37416,12 +37007,8 @@
               <a:t>alert</a:t>
             </a:r>
             <a:r>
-              <a:rPr lang="en-US" dirty="0" smtClean="0"/>
-              <a:t> </a:t>
-            </a:r>
-            <a:r>
               <a:rPr lang="en-US" dirty="0"/>
-              <a:t>keyword</a:t>
+              <a:t> keyword</a:t>
             </a:r>
           </a:p>
           <a:p>
@@ -38062,10 +37649,9 @@
           <a:lstStyle/>
           <a:p>
             <a:r>
-              <a:rPr lang="en-US" dirty="0" smtClean="0"/>
+              <a:rPr lang="en-US" dirty="0"/>
               <a:t>Mini-challenge</a:t>
             </a:r>
-            <a:endParaRPr lang="en-US" dirty="0"/>
           </a:p>
         </p:txBody>
       </p:sp>
@@ -38088,7 +37674,7 @@
               <a:buNone/>
             </a:pPr>
             <a:r>
-              <a:rPr lang="en-US" sz="6000" dirty="0" smtClean="0"/>
+              <a:rPr lang="en-US" sz="6000" dirty="0"/>
               <a:t>Write your own program that will say hello to you by name.</a:t>
             </a:r>
           </a:p>
@@ -38103,7 +37689,7 @@
               <a:buNone/>
             </a:pPr>
             <a:r>
-              <a:rPr lang="en-US" sz="4400" dirty="0" smtClean="0">
+              <a:rPr lang="en-US" sz="4400" dirty="0">
                 <a:solidFill>
                   <a:schemeClr val="accent1">
                     <a:lumMod val="50000"/>
@@ -38112,13 +37698,6 @@
               </a:rPr>
               <a:t>For example, if your name were Drake, it should say “Hello, Drake!”</a:t>
             </a:r>
-            <a:endParaRPr lang="en-US" sz="4400" dirty="0">
-              <a:solidFill>
-                <a:schemeClr val="accent1">
-                  <a:lumMod val="50000"/>
-                </a:schemeClr>
-              </a:solidFill>
-            </a:endParaRPr>
           </a:p>
         </p:txBody>
       </p:sp>
@@ -38135,13 +37714,67 @@
   <p:transition>
     <p:fade/>
   </p:transition>
-  <p:timing>
-    <p:tnLst>
-      <p:par>
-        <p:cTn id="1" dur="indefinite" restart="never" nodeType="tmRoot"/>
-      </p:par>
-    </p:tnLst>
-  </p:timing>
+</p:sld>
+</file>
+
+<file path=ppt/slides/slide9.xml><?xml version="1.0" encoding="utf-8"?>
+<p:sld xmlns:a="http://schemas.openxmlformats.org/drawingml/2006/main" xmlns:r="http://schemas.openxmlformats.org/officeDocument/2006/relationships" xmlns:p="http://schemas.openxmlformats.org/presentationml/2006/main">
+  <p:cSld>
+    <p:spTree>
+      <p:nvGrpSpPr>
+        <p:cNvPr id="1" name=""/>
+        <p:cNvGrpSpPr/>
+        <p:nvPr/>
+      </p:nvGrpSpPr>
+      <p:grpSpPr>
+        <a:xfrm>
+          <a:off x="0" y="0"/>
+          <a:ext cx="0" cy="0"/>
+          <a:chOff x="0" y="0"/>
+          <a:chExt cx="0" cy="0"/>
+        </a:xfrm>
+      </p:grpSpPr>
+      <p:sp>
+        <p:nvSpPr>
+          <p:cNvPr id="2" name="Text Placeholder 1">
+            <a:extLst>
+              <a:ext uri="{FF2B5EF4-FFF2-40B4-BE49-F238E27FC236}">
+                <a16:creationId xmlns:a16="http://schemas.microsoft.com/office/drawing/2014/main" id="{B7A791CB-AA68-4769-B673-C015ECF3D832}"/>
+              </a:ext>
+            </a:extLst>
+          </p:cNvPr>
+          <p:cNvSpPr>
+            <a:spLocks noGrp="1"/>
+          </p:cNvSpPr>
+          <p:nvPr>
+            <p:ph type="body" sz="quarter" idx="10"/>
+          </p:nvPr>
+        </p:nvSpPr>
+        <p:spPr/>
+        <p:txBody>
+          <a:bodyPr/>
+          <a:lstStyle/>
+          <a:p>
+            <a:r>
+              <a:rPr lang="en-US"/>
+              <a:t>Questions?</a:t>
+            </a:r>
+          </a:p>
+        </p:txBody>
+      </p:sp>
+    </p:spTree>
+    <p:extLst>
+      <p:ext uri="{BB962C8B-B14F-4D97-AF65-F5344CB8AC3E}">
+        <p14:creationId xmlns:p14="http://schemas.microsoft.com/office/powerpoint/2010/main" val="2492034236"/>
+      </p:ext>
+    </p:extLst>
+  </p:cSld>
+  <p:clrMapOvr>
+    <a:masterClrMapping/>
+  </p:clrMapOvr>
+  <p:transition>
+    <p:fade/>
+  </p:transition>
 </p:sld>
 </file>
 

</xml_diff>

<commit_message>
Fall 2022: Week 2 revamp
</commit_message>
<xml_diff>
--- a/Week02/IntroductionToJavaScript.pptx
+++ b/Week02/IntroductionToJavaScript.pptx
@@ -5,7 +5,7 @@
     <p:sldMasterId id="2147483648" r:id="rId1"/>
   </p:sldMasterIdLst>
   <p:notesMasterIdLst>
-    <p:notesMasterId r:id="rId11"/>
+    <p:notesMasterId r:id="rId12"/>
   </p:notesMasterIdLst>
   <p:sldIdLst>
     <p:sldId id="258" r:id="rId2"/>
@@ -16,7 +16,8 @@
     <p:sldId id="311" r:id="rId7"/>
     <p:sldId id="312" r:id="rId8"/>
     <p:sldId id="313" r:id="rId9"/>
-    <p:sldId id="314" r:id="rId10"/>
+    <p:sldId id="315" r:id="rId10"/>
+    <p:sldId id="314" r:id="rId11"/>
   </p:sldIdLst>
   <p:sldSz cx="12192000" cy="6858000"/>
   <p:notesSz cx="6858000" cy="9144000"/>
@@ -216,7 +217,7 @@
           <a:p>
             <a:fld id="{19104133-B5B0-4351-8158-4F0E5EB1E2BF}" type="datetimeFigureOut">
               <a:rPr lang="en-US" smtClean="0"/>
-              <a:t>9/1/2022</a:t>
+              <a:t>9/2/2022</a:t>
             </a:fld>
             <a:endParaRPr lang="en-US"/>
           </a:p>
@@ -727,15 +728,52 @@
           <a:bodyPr/>
           <a:lstStyle/>
           <a:p>
+            <a:pPr marL="171450" indent="-171450">
+              <a:buFont typeface="Arial" panose="020B0604020202020204" pitchFamily="34" charset="0"/>
+              <a:buChar char="•"/>
+            </a:pPr>
             <a:r>
               <a:rPr lang="en-US" dirty="0"/>
-              <a:t>Ask the</a:t>
+              <a:t>Here there is an HTML file with a new HTML element… but a familiar attribute. The </a:t>
             </a:r>
             <a:r>
-              <a:rPr lang="en-US" baseline="0" dirty="0"/>
-              <a:t> students to guess what this does</a:t>
+              <a:rPr lang="en-US" dirty="0" err="1"/>
+              <a:t>src</a:t>
             </a:r>
-            <a:endParaRPr lang="en-US" dirty="0"/>
+            <a:r>
+              <a:rPr lang="en-US" dirty="0"/>
+              <a:t> points to another file…</a:t>
+            </a:r>
+          </a:p>
+          <a:p>
+            <a:pPr marL="171450" indent="-171450">
+              <a:buFont typeface="Arial" panose="020B0604020202020204" pitchFamily="34" charset="0"/>
+              <a:buChar char="•"/>
+            </a:pPr>
+            <a:r>
+              <a:rPr lang="en-US" dirty="0"/>
+              <a:t>script.js that has this one line of code. Like CSS, this is a new language, NOT HTML! It’s JavaScript!</a:t>
+            </a:r>
+          </a:p>
+          <a:p>
+            <a:pPr marL="171450" indent="-171450">
+              <a:buFont typeface="Arial" panose="020B0604020202020204" pitchFamily="34" charset="0"/>
+              <a:buChar char="•"/>
+            </a:pPr>
+            <a:r>
+              <a:rPr lang="en-US" dirty="0"/>
+              <a:t>So, what will happen when this page loads? Any guesses?</a:t>
+            </a:r>
+          </a:p>
+          <a:p>
+            <a:pPr marL="171450" indent="-171450">
+              <a:buFont typeface="Arial" panose="020B0604020202020204" pitchFamily="34" charset="0"/>
+              <a:buChar char="•"/>
+            </a:pPr>
+            <a:r>
+              <a:rPr lang="en-US" dirty="0"/>
+              <a:t>A pop-up appears that says Hello World!</a:t>
+            </a:r>
           </a:p>
         </p:txBody>
       </p:sp>
@@ -1158,7 +1196,7 @@
             <a:fld id="{1C2D31DE-C454-491C-B5C3-F097855E3DF7}" type="datetime4">
               <a:rPr lang="en-US" smtClean="0"/>
               <a:pPr/>
-              <a:t>September 1, 2022</a:t>
+              <a:t>September 2, 2022</a:t>
             </a:fld>
             <a:endParaRPr lang="en-US" dirty="0"/>
           </a:p>
@@ -4550,7 +4588,7 @@
           <a:p>
             <a:fld id="{5958763E-B898-436D-883D-03711491D54A}" type="datetimeFigureOut">
               <a:rPr lang="en-US" smtClean="0"/>
-              <a:t>9/1/2022</a:t>
+              <a:t>9/2/2022</a:t>
             </a:fld>
             <a:endParaRPr lang="en-US"/>
           </a:p>
@@ -4743,7 +4781,7 @@
           <a:p>
             <a:fld id="{5958763E-B898-436D-883D-03711491D54A}" type="datetimeFigureOut">
               <a:rPr lang="en-US" smtClean="0"/>
-              <a:t>9/1/2022</a:t>
+              <a:t>9/2/2022</a:t>
             </a:fld>
             <a:endParaRPr lang="en-US"/>
           </a:p>
@@ -4993,7 +5031,7 @@
           <a:p>
             <a:fld id="{5958763E-B898-436D-883D-03711491D54A}" type="datetimeFigureOut">
               <a:rPr lang="en-US" smtClean="0"/>
-              <a:t>9/1/2022</a:t>
+              <a:t>9/2/2022</a:t>
             </a:fld>
             <a:endParaRPr lang="en-US"/>
           </a:p>
@@ -5341,7 +5379,7 @@
           <a:p>
             <a:fld id="{5958763E-B898-436D-883D-03711491D54A}" type="datetimeFigureOut">
               <a:rPr lang="en-US" smtClean="0"/>
-              <a:t>9/1/2022</a:t>
+              <a:t>9/2/2022</a:t>
             </a:fld>
             <a:endParaRPr lang="en-US"/>
           </a:p>
@@ -5757,7 +5795,7 @@
           <a:p>
             <a:fld id="{5958763E-B898-436D-883D-03711491D54A}" type="datetimeFigureOut">
               <a:rPr lang="en-US" smtClean="0"/>
-              <a:t>9/1/2022</a:t>
+              <a:t>9/2/2022</a:t>
             </a:fld>
             <a:endParaRPr lang="en-US"/>
           </a:p>
@@ -6258,7 +6296,7 @@
           <a:p>
             <a:fld id="{5958763E-B898-436D-883D-03711491D54A}" type="datetimeFigureOut">
               <a:rPr lang="en-US" smtClean="0"/>
-              <a:t>9/1/2022</a:t>
+              <a:t>9/2/2022</a:t>
             </a:fld>
             <a:endParaRPr lang="en-US"/>
           </a:p>
@@ -6709,7 +6747,7 @@
           <a:p>
             <a:fld id="{5958763E-B898-436D-883D-03711491D54A}" type="datetimeFigureOut">
               <a:rPr lang="en-US" smtClean="0"/>
-              <a:t>9/1/2022</a:t>
+              <a:t>9/2/2022</a:t>
             </a:fld>
             <a:endParaRPr lang="en-US"/>
           </a:p>
@@ -7320,7 +7358,7 @@
           <a:p>
             <a:fld id="{5958763E-B898-436D-883D-03711491D54A}" type="datetimeFigureOut">
               <a:rPr lang="en-US" smtClean="0"/>
-              <a:t>9/1/2022</a:t>
+              <a:t>9/2/2022</a:t>
             </a:fld>
             <a:endParaRPr lang="en-US"/>
           </a:p>
@@ -8091,7 +8129,7 @@
           <a:p>
             <a:fld id="{5958763E-B898-436D-883D-03711491D54A}" type="datetimeFigureOut">
               <a:rPr lang="en-US" smtClean="0"/>
-              <a:t>9/1/2022</a:t>
+              <a:t>9/2/2022</a:t>
             </a:fld>
             <a:endParaRPr lang="en-US"/>
           </a:p>
@@ -8195,7 +8233,7 @@
           <a:p>
             <a:fld id="{5958763E-B898-436D-883D-03711491D54A}" type="datetimeFigureOut">
               <a:rPr lang="en-US" smtClean="0"/>
-              <a:t>9/1/2022</a:t>
+              <a:t>9/2/2022</a:t>
             </a:fld>
             <a:endParaRPr lang="en-US"/>
           </a:p>
@@ -8522,7 +8560,7 @@
             <a:fld id="{1C2D31DE-C454-491C-B5C3-F097855E3DF7}" type="datetime4">
               <a:rPr lang="en-US" smtClean="0"/>
               <a:pPr/>
-              <a:t>September 1, 2022</a:t>
+              <a:t>September 2, 2022</a:t>
             </a:fld>
             <a:endParaRPr lang="en-US" dirty="0"/>
           </a:p>
@@ -11674,7 +11712,7 @@
           <a:p>
             <a:fld id="{5958763E-B898-436D-883D-03711491D54A}" type="datetimeFigureOut">
               <a:rPr lang="en-US" smtClean="0"/>
-              <a:t>9/1/2022</a:t>
+              <a:t>9/2/2022</a:t>
             </a:fld>
             <a:endParaRPr lang="en-US"/>
           </a:p>
@@ -11798,7 +11836,7 @@
           <a:p>
             <a:fld id="{5958763E-B898-436D-883D-03711491D54A}" type="datetimeFigureOut">
               <a:rPr lang="en-US" smtClean="0"/>
-              <a:t>9/1/2022</a:t>
+              <a:t>9/2/2022</a:t>
             </a:fld>
             <a:endParaRPr lang="en-US"/>
           </a:p>
@@ -11922,7 +11960,7 @@
           <a:p>
             <a:fld id="{5958763E-B898-436D-883D-03711491D54A}" type="datetimeFigureOut">
               <a:rPr lang="en-US" smtClean="0"/>
-              <a:t>9/1/2022</a:t>
+              <a:t>9/2/2022</a:t>
             </a:fld>
             <a:endParaRPr lang="en-US"/>
           </a:p>
@@ -12046,7 +12084,7 @@
           <a:p>
             <a:fld id="{5958763E-B898-436D-883D-03711491D54A}" type="datetimeFigureOut">
               <a:rPr lang="en-US" smtClean="0"/>
-              <a:t>9/1/2022</a:t>
+              <a:t>9/2/2022</a:t>
             </a:fld>
             <a:endParaRPr lang="en-US"/>
           </a:p>
@@ -12170,7 +12208,7 @@
           <a:p>
             <a:fld id="{5958763E-B898-436D-883D-03711491D54A}" type="datetimeFigureOut">
               <a:rPr lang="en-US" smtClean="0"/>
-              <a:t>9/1/2022</a:t>
+              <a:t>9/2/2022</a:t>
             </a:fld>
             <a:endParaRPr lang="en-US"/>
           </a:p>
@@ -12294,7 +12332,7 @@
           <a:p>
             <a:fld id="{5958763E-B898-436D-883D-03711491D54A}" type="datetimeFigureOut">
               <a:rPr lang="en-US" smtClean="0"/>
-              <a:t>9/1/2022</a:t>
+              <a:t>9/2/2022</a:t>
             </a:fld>
             <a:endParaRPr lang="en-US"/>
           </a:p>
@@ -12418,7 +12456,7 @@
           <a:p>
             <a:fld id="{5958763E-B898-436D-883D-03711491D54A}" type="datetimeFigureOut">
               <a:rPr lang="en-US" smtClean="0"/>
-              <a:t>9/1/2022</a:t>
+              <a:t>9/2/2022</a:t>
             </a:fld>
             <a:endParaRPr lang="en-US"/>
           </a:p>
@@ -12542,7 +12580,7 @@
           <a:p>
             <a:fld id="{5958763E-B898-436D-883D-03711491D54A}" type="datetimeFigureOut">
               <a:rPr lang="en-US" smtClean="0"/>
-              <a:t>9/1/2022</a:t>
+              <a:t>9/2/2022</a:t>
             </a:fld>
             <a:endParaRPr lang="en-US"/>
           </a:p>
@@ -12675,7 +12713,7 @@
           <a:p>
             <a:fld id="{5958763E-B898-436D-883D-03711491D54A}" type="datetimeFigureOut">
               <a:rPr lang="en-US" smtClean="0"/>
-              <a:t>9/1/2022</a:t>
+              <a:t>9/2/2022</a:t>
             </a:fld>
             <a:endParaRPr lang="en-US"/>
           </a:p>
@@ -16014,7 +16052,7 @@
             <a:fld id="{1C2D31DE-C454-491C-B5C3-F097855E3DF7}" type="datetime4">
               <a:rPr lang="en-US" smtClean="0"/>
               <a:pPr/>
-              <a:t>September 1, 2022</a:t>
+              <a:t>September 2, 2022</a:t>
             </a:fld>
             <a:endParaRPr lang="en-US" dirty="0"/>
           </a:p>
@@ -28250,7 +28288,7 @@
           <a:p>
             <a:fld id="{5958763E-B898-436D-883D-03711491D54A}" type="datetimeFigureOut">
               <a:rPr lang="en-US" smtClean="0"/>
-              <a:t>9/1/2022</a:t>
+              <a:t>9/2/2022</a:t>
             </a:fld>
             <a:endParaRPr lang="en-US"/>
           </a:p>
@@ -28652,7 +28690,7 @@
           <a:p>
             <a:fld id="{5958763E-B898-436D-883D-03711491D54A}" type="datetimeFigureOut">
               <a:rPr lang="en-US" smtClean="0"/>
-              <a:t>9/1/2022</a:t>
+              <a:t>9/2/2022</a:t>
             </a:fld>
             <a:endParaRPr lang="en-US"/>
           </a:p>
@@ -28946,7 +28984,7 @@
           <a:p>
             <a:fld id="{5958763E-B898-436D-883D-03711491D54A}" type="datetimeFigureOut">
               <a:rPr lang="en-US" smtClean="0"/>
-              <a:t>9/1/2022</a:t>
+              <a:t>9/2/2022</a:t>
             </a:fld>
             <a:endParaRPr lang="en-US"/>
           </a:p>
@@ -29147,7 +29185,7 @@
           <a:p>
             <a:fld id="{5958763E-B898-436D-883D-03711491D54A}" type="datetimeFigureOut">
               <a:rPr lang="en-US" smtClean="0"/>
-              <a:t>9/1/2022</a:t>
+              <a:t>9/2/2022</a:t>
             </a:fld>
             <a:endParaRPr lang="en-US"/>
           </a:p>
@@ -29408,7 +29446,7 @@
           <a:p>
             <a:fld id="{5958763E-B898-436D-883D-03711491D54A}" type="datetimeFigureOut">
               <a:rPr lang="en-US" smtClean="0"/>
-              <a:t>9/1/2022</a:t>
+              <a:t>9/2/2022</a:t>
             </a:fld>
             <a:endParaRPr lang="en-US"/>
           </a:p>
@@ -29916,7 +29954,7 @@
           <a:p>
             <a:fld id="{5958763E-B898-436D-883D-03711491D54A}" type="datetimeFigureOut">
               <a:rPr lang="en-US" smtClean="0"/>
-              <a:t>9/1/2022</a:t>
+              <a:t>9/2/2022</a:t>
             </a:fld>
             <a:endParaRPr lang="en-US"/>
           </a:p>
@@ -30395,7 +30433,7 @@
           <a:p>
             <a:fld id="{5958763E-B898-436D-883D-03711491D54A}" type="datetimeFigureOut">
               <a:rPr lang="en-US" smtClean="0"/>
-              <a:t>9/1/2022</a:t>
+              <a:t>9/2/2022</a:t>
             </a:fld>
             <a:endParaRPr lang="en-US"/>
           </a:p>
@@ -31214,7 +31252,7 @@
           <a:p>
             <a:fld id="{5958763E-B898-436D-883D-03711491D54A}" type="datetimeFigureOut">
               <a:rPr lang="en-US" smtClean="0"/>
-              <a:t>9/1/2022</a:t>
+              <a:t>9/2/2022</a:t>
             </a:fld>
             <a:endParaRPr lang="en-US"/>
           </a:p>
@@ -31415,7 +31453,7 @@
           <a:p>
             <a:fld id="{5958763E-B898-436D-883D-03711491D54A}" type="datetimeFigureOut">
               <a:rPr lang="en-US" smtClean="0"/>
-              <a:t>9/1/2022</a:t>
+              <a:t>9/2/2022</a:t>
             </a:fld>
             <a:endParaRPr lang="en-US"/>
           </a:p>
@@ -31750,7 +31788,7 @@
           <a:p>
             <a:fld id="{5958763E-B898-436D-883D-03711491D54A}" type="datetimeFigureOut">
               <a:rPr lang="en-US" smtClean="0"/>
-              <a:t>9/1/2022</a:t>
+              <a:t>9/2/2022</a:t>
             </a:fld>
             <a:endParaRPr lang="en-US"/>
           </a:p>
@@ -31980,7 +32018,7 @@
           <a:p>
             <a:fld id="{5958763E-B898-436D-883D-03711491D54A}" type="datetimeFigureOut">
               <a:rPr lang="en-US" smtClean="0"/>
-              <a:t>9/1/2022</a:t>
+              <a:t>9/2/2022</a:t>
             </a:fld>
             <a:endParaRPr lang="en-US"/>
           </a:p>
@@ -32224,7 +32262,7 @@
           <a:p>
             <a:fld id="{5958763E-B898-436D-883D-03711491D54A}" type="datetimeFigureOut">
               <a:rPr lang="en-US" smtClean="0"/>
-              <a:t>9/1/2022</a:t>
+              <a:t>9/2/2022</a:t>
             </a:fld>
             <a:endParaRPr lang="en-US"/>
           </a:p>
@@ -35770,6 +35808,67 @@
 </p:sld>
 </file>
 
+<file path=ppt/slides/slide10.xml><?xml version="1.0" encoding="utf-8"?>
+<p:sld xmlns:a="http://schemas.openxmlformats.org/drawingml/2006/main" xmlns:r="http://schemas.openxmlformats.org/officeDocument/2006/relationships" xmlns:p="http://schemas.openxmlformats.org/presentationml/2006/main">
+  <p:cSld>
+    <p:spTree>
+      <p:nvGrpSpPr>
+        <p:cNvPr id="1" name=""/>
+        <p:cNvGrpSpPr/>
+        <p:nvPr/>
+      </p:nvGrpSpPr>
+      <p:grpSpPr>
+        <a:xfrm>
+          <a:off x="0" y="0"/>
+          <a:ext cx="0" cy="0"/>
+          <a:chOff x="0" y="0"/>
+          <a:chExt cx="0" cy="0"/>
+        </a:xfrm>
+      </p:grpSpPr>
+      <p:sp>
+        <p:nvSpPr>
+          <p:cNvPr id="2" name="Text Placeholder 1">
+            <a:extLst>
+              <a:ext uri="{FF2B5EF4-FFF2-40B4-BE49-F238E27FC236}">
+                <a16:creationId xmlns:a16="http://schemas.microsoft.com/office/drawing/2014/main" id="{B7A791CB-AA68-4769-B673-C015ECF3D832}"/>
+              </a:ext>
+            </a:extLst>
+          </p:cNvPr>
+          <p:cNvSpPr>
+            <a:spLocks noGrp="1"/>
+          </p:cNvSpPr>
+          <p:nvPr>
+            <p:ph type="body" sz="quarter" idx="10"/>
+          </p:nvPr>
+        </p:nvSpPr>
+        <p:spPr/>
+        <p:txBody>
+          <a:bodyPr/>
+          <a:lstStyle/>
+          <a:p>
+            <a:r>
+              <a:rPr lang="en-US"/>
+              <a:t>Questions?</a:t>
+            </a:r>
+          </a:p>
+        </p:txBody>
+      </p:sp>
+    </p:spTree>
+    <p:extLst>
+      <p:ext uri="{BB962C8B-B14F-4D97-AF65-F5344CB8AC3E}">
+        <p14:creationId xmlns:p14="http://schemas.microsoft.com/office/powerpoint/2010/main" val="2492034236"/>
+      </p:ext>
+    </p:extLst>
+  </p:cSld>
+  <p:clrMapOvr>
+    <a:masterClrMapping/>
+  </p:clrMapOvr>
+  <p:transition>
+    <p:fade/>
+  </p:transition>
+</p:sld>
+</file>
+
 <file path=ppt/slides/slide2.xml><?xml version="1.0" encoding="utf-8"?>
 <p:sld xmlns:a="http://schemas.openxmlformats.org/drawingml/2006/main" xmlns:r="http://schemas.openxmlformats.org/officeDocument/2006/relationships" xmlns:p="http://schemas.openxmlformats.org/presentationml/2006/main">
   <p:cSld>
@@ -35813,7 +35912,15 @@
             </a:r>
             <a:r>
               <a:rPr lang="en-US" b="0" cap="none" dirty="0"/>
-              <a:t> is the programming language of the web.</a:t>
+              <a:t> is the </a:t>
+            </a:r>
+            <a:r>
+              <a:rPr lang="en-US" b="0" i="1" cap="none" dirty="0"/>
+              <a:t>programming language </a:t>
+            </a:r>
+            <a:r>
+              <a:rPr lang="en-US" b="0" cap="none" dirty="0"/>
+              <a:t>of the web.</a:t>
             </a:r>
             <a:br>
               <a:rPr lang="en-US" b="0" cap="none" dirty="0"/>
@@ -36120,6 +36227,179 @@
       </p:grpSpPr>
       <p:sp>
         <p:nvSpPr>
+          <p:cNvPr id="9" name="Rectangle 8">
+            <a:extLst>
+              <a:ext uri="{FF2B5EF4-FFF2-40B4-BE49-F238E27FC236}">
+                <a16:creationId xmlns:a16="http://schemas.microsoft.com/office/drawing/2014/main" id="{33B4CCEC-FDAD-4D1E-8BB3-5A40A6735A1F}"/>
+              </a:ext>
+            </a:extLst>
+          </p:cNvPr>
+          <p:cNvSpPr/>
+          <p:nvPr/>
+        </p:nvSpPr>
+        <p:spPr bwMode="auto">
+          <a:xfrm>
+            <a:off x="6292493" y="1353764"/>
+            <a:ext cx="5518507" cy="1846636"/>
+          </a:xfrm>
+          <a:prstGeom prst="rect">
+            <a:avLst/>
+          </a:prstGeom>
+          <a:solidFill>
+            <a:schemeClr val="accent2">
+              <a:lumMod val="20000"/>
+              <a:lumOff val="80000"/>
+            </a:schemeClr>
+          </a:solidFill>
+          <a:ln w="12700">
+            <a:solidFill>
+              <a:schemeClr val="tx2"/>
+            </a:solidFill>
+            <a:miter lim="800000"/>
+            <a:headEnd type="none" w="med" len="med"/>
+            <a:tailEnd type="none" w="med" len="med"/>
+          </a:ln>
+          <a:effectLst/>
+        </p:spPr>
+        <p:style>
+          <a:lnRef idx="1">
+            <a:schemeClr val="accent2"/>
+          </a:lnRef>
+          <a:fillRef idx="3">
+            <a:schemeClr val="accent2"/>
+          </a:fillRef>
+          <a:effectRef idx="2">
+            <a:schemeClr val="accent2"/>
+          </a:effectRef>
+          <a:fontRef idx="minor">
+            <a:schemeClr val="lt1"/>
+          </a:fontRef>
+        </p:style>
+        <p:txBody>
+          <a:bodyPr rot="0" spcFirstLastPara="0" vertOverflow="overflow" horzOverflow="overflow" vert="horz" wrap="square" lIns="182880" tIns="146304" rIns="182880" bIns="146304" numCol="1" spcCol="0" rtlCol="0" fromWordArt="0" anchor="t" anchorCtr="0" forceAA="0" compatLnSpc="1">
+            <a:prstTxWarp prst="textNoShape">
+              <a:avLst/>
+            </a:prstTxWarp>
+            <a:noAutofit/>
+          </a:bodyPr>
+          <a:lstStyle/>
+          <a:p>
+            <a:pPr algn="ctr" defTabSz="932472" fontAlgn="base">
+              <a:lnSpc>
+                <a:spcPct val="90000"/>
+              </a:lnSpc>
+              <a:spcBef>
+                <a:spcPct val="0"/>
+              </a:spcBef>
+              <a:spcAft>
+                <a:spcPct val="0"/>
+              </a:spcAft>
+            </a:pPr>
+            <a:endParaRPr lang="en-US" sz="2400" dirty="0" err="1">
+              <a:gradFill>
+                <a:gsLst>
+                  <a:gs pos="0">
+                    <a:srgbClr val="FFFFFF"/>
+                  </a:gs>
+                  <a:gs pos="100000">
+                    <a:srgbClr val="FFFFFF"/>
+                  </a:gs>
+                </a:gsLst>
+                <a:lin ang="5400000" scaled="0"/>
+              </a:gradFill>
+              <a:ea typeface="Segoe UI" pitchFamily="34" charset="0"/>
+              <a:cs typeface="Segoe UI" pitchFamily="34" charset="0"/>
+            </a:endParaRPr>
+          </a:p>
+        </p:txBody>
+      </p:sp>
+      <p:sp>
+        <p:nvSpPr>
+          <p:cNvPr id="8" name="Rectangle 7">
+            <a:extLst>
+              <a:ext uri="{FF2B5EF4-FFF2-40B4-BE49-F238E27FC236}">
+                <a16:creationId xmlns:a16="http://schemas.microsoft.com/office/drawing/2014/main" id="{5D3FE4F1-F928-41BC-9225-613490A3C3C8}"/>
+              </a:ext>
+            </a:extLst>
+          </p:cNvPr>
+          <p:cNvSpPr/>
+          <p:nvPr/>
+        </p:nvSpPr>
+        <p:spPr bwMode="auto">
+          <a:xfrm>
+            <a:off x="266700" y="1353764"/>
+            <a:ext cx="5829300" cy="5161336"/>
+          </a:xfrm>
+          <a:prstGeom prst="rect">
+            <a:avLst/>
+          </a:prstGeom>
+          <a:solidFill>
+            <a:schemeClr val="accent5"/>
+          </a:solidFill>
+          <a:ln w="12700">
+            <a:solidFill>
+              <a:schemeClr val="tx2"/>
+            </a:solidFill>
+            <a:miter lim="800000"/>
+            <a:headEnd type="none" w="med" len="med"/>
+            <a:tailEnd type="none" w="med" len="med"/>
+          </a:ln>
+          <a:effectLst/>
+        </p:spPr>
+        <p:style>
+          <a:lnRef idx="1">
+            <a:schemeClr val="accent2"/>
+          </a:lnRef>
+          <a:fillRef idx="3">
+            <a:schemeClr val="accent2"/>
+          </a:fillRef>
+          <a:effectRef idx="2">
+            <a:schemeClr val="accent2"/>
+          </a:effectRef>
+          <a:fontRef idx="minor">
+            <a:schemeClr val="lt1"/>
+          </a:fontRef>
+        </p:style>
+        <p:txBody>
+          <a:bodyPr rot="0" spcFirstLastPara="0" vertOverflow="overflow" horzOverflow="overflow" vert="horz" wrap="square" lIns="182880" tIns="146304" rIns="182880" bIns="146304" numCol="1" spcCol="0" rtlCol="0" fromWordArt="0" anchor="t" anchorCtr="0" forceAA="0" compatLnSpc="1">
+            <a:prstTxWarp prst="textNoShape">
+              <a:avLst/>
+            </a:prstTxWarp>
+            <a:noAutofit/>
+          </a:bodyPr>
+          <a:lstStyle/>
+          <a:p>
+            <a:pPr algn="ctr" defTabSz="932472" fontAlgn="base">
+              <a:lnSpc>
+                <a:spcPct val="90000"/>
+              </a:lnSpc>
+              <a:spcBef>
+                <a:spcPct val="0"/>
+              </a:spcBef>
+              <a:spcAft>
+                <a:spcPct val="0"/>
+              </a:spcAft>
+            </a:pPr>
+            <a:endParaRPr lang="en-US" sz="2400" dirty="0" err="1">
+              <a:gradFill>
+                <a:gsLst>
+                  <a:gs pos="0">
+                    <a:srgbClr val="FFFFFF"/>
+                  </a:gs>
+                  <a:gs pos="100000">
+                    <a:srgbClr val="FFFFFF"/>
+                  </a:gs>
+                </a:gsLst>
+                <a:lin ang="5400000" scaled="0"/>
+              </a:gradFill>
+              <a:ea typeface="Segoe UI" pitchFamily="34" charset="0"/>
+              <a:cs typeface="Segoe UI" pitchFamily="34" charset="0"/>
+            </a:endParaRPr>
+          </a:p>
+        </p:txBody>
+      </p:sp>
+      <p:sp>
+        <p:nvSpPr>
           <p:cNvPr id="2" name="Title 1"/>
           <p:cNvSpPr>
             <a:spLocks noGrp="1"/>
@@ -36150,9 +36430,16 @@
             <p:ph idx="1"/>
           </p:nvPr>
         </p:nvSpPr>
-        <p:spPr/>
+        <p:spPr>
+          <a:xfrm>
+            <a:off x="381000" y="1943100"/>
+            <a:ext cx="5829300" cy="4572000"/>
+          </a:xfrm>
+        </p:spPr>
         <p:txBody>
-          <a:bodyPr/>
+          <a:bodyPr>
+            <a:normAutofit/>
+          </a:bodyPr>
           <a:lstStyle/>
           <a:p>
             <a:pPr marL="0" indent="0">
@@ -36183,7 +36470,131 @@
                 </a:solidFill>
                 <a:latin typeface="Consolas" panose="020B0609020204030204" pitchFamily="49" charset="0"/>
               </a:rPr>
-              <a:t>	&lt;head&gt;</a:t>
+              <a:t>  &lt;head&gt;</a:t>
+            </a:r>
+          </a:p>
+          <a:p>
+            <a:pPr marL="57150" indent="0">
+              <a:buNone/>
+            </a:pPr>
+            <a:r>
+              <a:rPr lang="en-US" b="0" dirty="0">
+                <a:solidFill>
+                  <a:srgbClr val="800000">
+                    <a:alpha val="50000"/>
+                  </a:srgbClr>
+                </a:solidFill>
+                <a:effectLst/>
+                <a:latin typeface="Consolas" panose="020B0609020204030204" pitchFamily="49" charset="0"/>
+              </a:rPr>
+              <a:t>    </a:t>
+            </a:r>
+            <a:r>
+              <a:rPr lang="en-US" b="0" dirty="0">
+                <a:solidFill>
+                  <a:srgbClr val="800000"/>
+                </a:solidFill>
+                <a:effectLst/>
+                <a:latin typeface="Consolas" panose="020B0609020204030204" pitchFamily="49" charset="0"/>
+              </a:rPr>
+              <a:t>&lt;script</a:t>
+            </a:r>
+            <a:r>
+              <a:rPr lang="en-US" b="0" dirty="0">
+                <a:solidFill>
+                  <a:srgbClr val="000000"/>
+                </a:solidFill>
+                <a:effectLst/>
+                <a:latin typeface="Consolas" panose="020B0609020204030204" pitchFamily="49" charset="0"/>
+              </a:rPr>
+              <a:t> </a:t>
+            </a:r>
+            <a:r>
+              <a:rPr lang="en-US" b="0" dirty="0" err="1">
+                <a:solidFill>
+                  <a:srgbClr val="FF0000"/>
+                </a:solidFill>
+                <a:effectLst/>
+                <a:latin typeface="Consolas" panose="020B0609020204030204" pitchFamily="49" charset="0"/>
+              </a:rPr>
+              <a:t>src</a:t>
+            </a:r>
+            <a:r>
+              <a:rPr lang="en-US" b="0" dirty="0">
+                <a:solidFill>
+                  <a:srgbClr val="000000"/>
+                </a:solidFill>
+                <a:effectLst/>
+                <a:latin typeface="Consolas" panose="020B0609020204030204" pitchFamily="49" charset="0"/>
+              </a:rPr>
+              <a:t>=</a:t>
+            </a:r>
+            <a:r>
+              <a:rPr lang="en-US" b="0" dirty="0">
+                <a:solidFill>
+                  <a:srgbClr val="0000FF"/>
+                </a:solidFill>
+                <a:effectLst/>
+                <a:latin typeface="Consolas" panose="020B0609020204030204" pitchFamily="49" charset="0"/>
+              </a:rPr>
+              <a:t>"script.js"</a:t>
+            </a:r>
+            <a:r>
+              <a:rPr lang="en-US" b="0" dirty="0">
+                <a:solidFill>
+                  <a:srgbClr val="800000"/>
+                </a:solidFill>
+                <a:effectLst/>
+                <a:latin typeface="Consolas" panose="020B0609020204030204" pitchFamily="49" charset="0"/>
+              </a:rPr>
+              <a:t>&gt;</a:t>
+            </a:r>
+          </a:p>
+          <a:p>
+            <a:pPr marL="57150" indent="0">
+              <a:buNone/>
+            </a:pPr>
+            <a:r>
+              <a:rPr lang="en-US" dirty="0">
+                <a:solidFill>
+                  <a:srgbClr val="800000"/>
+                </a:solidFill>
+                <a:latin typeface="Consolas" panose="020B0609020204030204" pitchFamily="49" charset="0"/>
+              </a:rPr>
+              <a:t>    </a:t>
+            </a:r>
+            <a:r>
+              <a:rPr lang="en-US" b="0" dirty="0">
+                <a:solidFill>
+                  <a:srgbClr val="800000"/>
+                </a:solidFill>
+                <a:effectLst/>
+                <a:latin typeface="Consolas" panose="020B0609020204030204" pitchFamily="49" charset="0"/>
+              </a:rPr>
+              <a:t>&lt;/script&gt;</a:t>
+            </a:r>
+            <a:endParaRPr lang="en-US" b="0" dirty="0">
+              <a:solidFill>
+                <a:srgbClr val="000000"/>
+              </a:solidFill>
+              <a:effectLst/>
+              <a:latin typeface="Consolas" panose="020B0609020204030204" pitchFamily="49" charset="0"/>
+            </a:endParaRPr>
+          </a:p>
+          <a:p>
+            <a:pPr marL="0" indent="0">
+              <a:buNone/>
+            </a:pPr>
+            <a:r>
+              <a:rPr lang="en-US" dirty="0">
+                <a:solidFill>
+                  <a:srgbClr val="800000">
+                    <a:alpha val="50000"/>
+                  </a:srgbClr>
+                </a:solidFill>
+                <a:latin typeface="Consolas" panose="020B0609020204030204" pitchFamily="49" charset="0"/>
+              </a:rPr>
+              <a:t>  &lt;/head&gt;</a:t>
             </a:r>
           </a:p>
           <a:p>
@@ -36199,62 +36610,7 @@
                 </a:solidFill>
                 <a:latin typeface="Consolas" panose="020B0609020204030204" pitchFamily="49" charset="0"/>
               </a:rPr>
-              <a:t>		</a:t>
-            </a:r>
-            <a:r>
-              <a:rPr lang="en-US" dirty="0">
-                <a:solidFill>
-                  <a:srgbClr val="800000"/>
-                </a:solidFill>
-                <a:latin typeface="Consolas" panose="020B0609020204030204" pitchFamily="49" charset="0"/>
-              </a:rPr>
-              <a:t>&lt;script&gt;</a:t>
-            </a:r>
-          </a:p>
-          <a:p>
-            <a:pPr marL="0" indent="0">
-              <a:buNone/>
-            </a:pPr>
-            <a:r>
-              <a:rPr lang="en-US" dirty="0">
-                <a:solidFill>
-                  <a:srgbClr val="000000"/>
-                </a:solidFill>
-                <a:latin typeface="Consolas" panose="020B0609020204030204" pitchFamily="49" charset="0"/>
-              </a:rPr>
-              <a:t>			alert(</a:t>
-            </a:r>
-            <a:r>
-              <a:rPr lang="en-US" dirty="0">
-                <a:solidFill>
-                  <a:srgbClr val="A31515"/>
-                </a:solidFill>
-                <a:latin typeface="Consolas" panose="020B0609020204030204" pitchFamily="49" charset="0"/>
-              </a:rPr>
-              <a:t>"Hello, world!"</a:t>
-            </a:r>
-            <a:r>
-              <a:rPr lang="en-US" dirty="0">
-                <a:solidFill>
-                  <a:srgbClr val="000000"/>
-                </a:solidFill>
-                <a:latin typeface="Consolas" panose="020B0609020204030204" pitchFamily="49" charset="0"/>
-              </a:rPr>
-              <a:t>);</a:t>
-            </a:r>
-          </a:p>
-          <a:p>
-            <a:pPr marL="0" indent="0">
-              <a:buNone/>
-            </a:pPr>
-            <a:r>
-              <a:rPr lang="en-US" dirty="0">
-                <a:solidFill>
-                  <a:srgbClr val="800000"/>
-                </a:solidFill>
-                <a:latin typeface="Consolas" panose="020B0609020204030204" pitchFamily="49" charset="0"/>
-              </a:rPr>
-              <a:t>		&lt;/script&gt;</a:t>
+              <a:t>  &lt;body&gt;</a:t>
             </a:r>
           </a:p>
           <a:p>
@@ -36270,39 +36626,7 @@
                 </a:solidFill>
                 <a:latin typeface="Consolas" panose="020B0609020204030204" pitchFamily="49" charset="0"/>
               </a:rPr>
-              <a:t>	&lt;/head&gt;</a:t>
-            </a:r>
-          </a:p>
-          <a:p>
-            <a:pPr marL="0" indent="0">
-              <a:buNone/>
-            </a:pPr>
-            <a:r>
-              <a:rPr lang="en-US" dirty="0">
-                <a:solidFill>
-                  <a:srgbClr val="800000">
-                    <a:alpha val="50000"/>
-                  </a:srgbClr>
-                </a:solidFill>
-                <a:latin typeface="Consolas" panose="020B0609020204030204" pitchFamily="49" charset="0"/>
-              </a:rPr>
-              <a:t>	&lt;body&gt;</a:t>
-            </a:r>
-          </a:p>
-          <a:p>
-            <a:pPr marL="0" indent="0">
-              <a:buNone/>
-            </a:pPr>
-            <a:r>
-              <a:rPr lang="en-US" dirty="0">
-                <a:solidFill>
-                  <a:srgbClr val="800000">
-                    <a:alpha val="50000"/>
-                  </a:srgbClr>
-                </a:solidFill>
-                <a:latin typeface="Consolas" panose="020B0609020204030204" pitchFamily="49" charset="0"/>
-              </a:rPr>
-              <a:t>	&lt;/body&gt;</a:t>
+              <a:t>  &lt;/body&gt;</a:t>
             </a:r>
           </a:p>
           <a:p>
@@ -36323,6 +36647,390 @@
           </a:p>
         </p:txBody>
       </p:sp>
+      <p:sp>
+        <p:nvSpPr>
+          <p:cNvPr id="4" name="TextBox 3">
+            <a:extLst>
+              <a:ext uri="{FF2B5EF4-FFF2-40B4-BE49-F238E27FC236}">
+                <a16:creationId xmlns:a16="http://schemas.microsoft.com/office/drawing/2014/main" id="{06877F12-8B7E-466D-A493-D659916BBA69}"/>
+              </a:ext>
+            </a:extLst>
+          </p:cNvPr>
+          <p:cNvSpPr txBox="1"/>
+          <p:nvPr/>
+        </p:nvSpPr>
+        <p:spPr>
+          <a:xfrm>
+            <a:off x="266700" y="1353764"/>
+            <a:ext cx="1906612" cy="627864"/>
+          </a:xfrm>
+          <a:prstGeom prst="rect">
+            <a:avLst/>
+          </a:prstGeom>
+          <a:noFill/>
+        </p:spPr>
+        <p:txBody>
+          <a:bodyPr wrap="none" lIns="182880" tIns="146304" rIns="182880" bIns="146304" rtlCol="0">
+            <a:spAutoFit/>
+          </a:bodyPr>
+          <a:lstStyle/>
+          <a:p>
+            <a:pPr>
+              <a:lnSpc>
+                <a:spcPct val="90000"/>
+              </a:lnSpc>
+              <a:spcAft>
+                <a:spcPts val="600"/>
+              </a:spcAft>
+            </a:pPr>
+            <a:r>
+              <a:rPr lang="en-US" sz="2400" b="1" dirty="0">
+                <a:gradFill>
+                  <a:gsLst>
+                    <a:gs pos="2917">
+                      <a:schemeClr val="tx1"/>
+                    </a:gs>
+                    <a:gs pos="30000">
+                      <a:schemeClr val="tx1"/>
+                    </a:gs>
+                  </a:gsLst>
+                  <a:lin ang="5400000" scaled="0"/>
+                </a:gradFill>
+              </a:rPr>
+              <a:t>index.html</a:t>
+            </a:r>
+          </a:p>
+        </p:txBody>
+      </p:sp>
+      <p:sp>
+        <p:nvSpPr>
+          <p:cNvPr id="6" name="TextBox 5">
+            <a:extLst>
+              <a:ext uri="{FF2B5EF4-FFF2-40B4-BE49-F238E27FC236}">
+                <a16:creationId xmlns:a16="http://schemas.microsoft.com/office/drawing/2014/main" id="{E487B0F7-946A-4CFC-9C01-2C37E0660970}"/>
+              </a:ext>
+            </a:extLst>
+          </p:cNvPr>
+          <p:cNvSpPr txBox="1"/>
+          <p:nvPr/>
+        </p:nvSpPr>
+        <p:spPr>
+          <a:xfrm>
+            <a:off x="6324600" y="2171700"/>
+            <a:ext cx="5392220" cy="584775"/>
+          </a:xfrm>
+          <a:prstGeom prst="rect">
+            <a:avLst/>
+          </a:prstGeom>
+          <a:noFill/>
+        </p:spPr>
+        <p:txBody>
+          <a:bodyPr wrap="square">
+            <a:spAutoFit/>
+          </a:bodyPr>
+          <a:lstStyle/>
+          <a:p>
+            <a:r>
+              <a:rPr lang="en-US" sz="3200" b="0" dirty="0">
+                <a:solidFill>
+                  <a:srgbClr val="795E26"/>
+                </a:solidFill>
+                <a:effectLst/>
+                <a:latin typeface="Consolas" panose="020B0609020204030204" pitchFamily="49" charset="0"/>
+              </a:rPr>
+              <a:t>alert</a:t>
+            </a:r>
+            <a:r>
+              <a:rPr lang="en-US" sz="3200" b="0" dirty="0">
+                <a:solidFill>
+                  <a:srgbClr val="000000"/>
+                </a:solidFill>
+                <a:effectLst/>
+                <a:latin typeface="Consolas" panose="020B0609020204030204" pitchFamily="49" charset="0"/>
+              </a:rPr>
+              <a:t>(</a:t>
+            </a:r>
+            <a:r>
+              <a:rPr lang="en-US" sz="3200" b="0" dirty="0">
+                <a:solidFill>
+                  <a:srgbClr val="A31515"/>
+                </a:solidFill>
+                <a:effectLst/>
+                <a:latin typeface="Consolas" panose="020B0609020204030204" pitchFamily="49" charset="0"/>
+              </a:rPr>
+              <a:t>"Hello, world!"</a:t>
+            </a:r>
+            <a:r>
+              <a:rPr lang="en-US" sz="3200" b="0" dirty="0">
+                <a:solidFill>
+                  <a:srgbClr val="000000"/>
+                </a:solidFill>
+                <a:effectLst/>
+                <a:latin typeface="Consolas" panose="020B0609020204030204" pitchFamily="49" charset="0"/>
+              </a:rPr>
+              <a:t>);</a:t>
+            </a:r>
+          </a:p>
+        </p:txBody>
+      </p:sp>
+      <p:sp>
+        <p:nvSpPr>
+          <p:cNvPr id="7" name="TextBox 6">
+            <a:extLst>
+              <a:ext uri="{FF2B5EF4-FFF2-40B4-BE49-F238E27FC236}">
+                <a16:creationId xmlns:a16="http://schemas.microsoft.com/office/drawing/2014/main" id="{94662BDC-4F73-48A3-8566-F73166FC0FFB}"/>
+              </a:ext>
+            </a:extLst>
+          </p:cNvPr>
+          <p:cNvSpPr txBox="1"/>
+          <p:nvPr/>
+        </p:nvSpPr>
+        <p:spPr>
+          <a:xfrm>
+            <a:off x="6210300" y="1353764"/>
+            <a:ext cx="1549142" cy="627864"/>
+          </a:xfrm>
+          <a:prstGeom prst="rect">
+            <a:avLst/>
+          </a:prstGeom>
+          <a:noFill/>
+        </p:spPr>
+        <p:txBody>
+          <a:bodyPr wrap="none" lIns="182880" tIns="146304" rIns="182880" bIns="146304" rtlCol="0">
+            <a:spAutoFit/>
+          </a:bodyPr>
+          <a:lstStyle/>
+          <a:p>
+            <a:pPr>
+              <a:lnSpc>
+                <a:spcPct val="90000"/>
+              </a:lnSpc>
+              <a:spcAft>
+                <a:spcPts val="600"/>
+              </a:spcAft>
+            </a:pPr>
+            <a:r>
+              <a:rPr lang="en-US" sz="2400" b="1" dirty="0">
+                <a:gradFill>
+                  <a:gsLst>
+                    <a:gs pos="2917">
+                      <a:schemeClr val="tx1"/>
+                    </a:gs>
+                    <a:gs pos="30000">
+                      <a:schemeClr val="tx1"/>
+                    </a:gs>
+                  </a:gsLst>
+                  <a:lin ang="5400000" scaled="0"/>
+                </a:gradFill>
+              </a:rPr>
+              <a:t>script.js</a:t>
+            </a:r>
+          </a:p>
+        </p:txBody>
+      </p:sp>
+      <p:cxnSp>
+        <p:nvCxnSpPr>
+          <p:cNvPr id="11" name="Connector: Elbow 10">
+            <a:extLst>
+              <a:ext uri="{FF2B5EF4-FFF2-40B4-BE49-F238E27FC236}">
+                <a16:creationId xmlns:a16="http://schemas.microsoft.com/office/drawing/2014/main" id="{D2CCF584-EF29-4529-B034-56AA8938EBE6}"/>
+              </a:ext>
+            </a:extLst>
+          </p:cNvPr>
+          <p:cNvCxnSpPr>
+            <a:cxnSpLocks/>
+            <a:endCxn id="7" idx="1"/>
+          </p:cNvCxnSpPr>
+          <p:nvPr/>
+        </p:nvCxnSpPr>
+        <p:spPr>
+          <a:xfrm rot="5400000" flipH="1" flipV="1">
+            <a:off x="4957780" y="1777216"/>
+            <a:ext cx="1362040" cy="1143000"/>
+          </a:xfrm>
+          <a:prstGeom prst="bentConnector2">
+            <a:avLst/>
+          </a:prstGeom>
+          <a:ln w="76200">
+            <a:miter lim="800000"/>
+            <a:headEnd type="none"/>
+            <a:tailEnd type="triangle"/>
+          </a:ln>
+        </p:spPr>
+        <p:style>
+          <a:lnRef idx="1">
+            <a:schemeClr val="dk1"/>
+          </a:lnRef>
+          <a:fillRef idx="0">
+            <a:schemeClr val="dk1"/>
+          </a:fillRef>
+          <a:effectRef idx="0">
+            <a:schemeClr val="dk1"/>
+          </a:effectRef>
+          <a:fontRef idx="minor">
+            <a:schemeClr val="tx1"/>
+          </a:fontRef>
+        </p:style>
+      </p:cxnSp>
+      <p:sp>
+        <p:nvSpPr>
+          <p:cNvPr id="17" name="Rectangle 16">
+            <a:extLst>
+              <a:ext uri="{FF2B5EF4-FFF2-40B4-BE49-F238E27FC236}">
+                <a16:creationId xmlns:a16="http://schemas.microsoft.com/office/drawing/2014/main" id="{1A5D11BA-E33F-4420-B43A-E05EA6BD62DD}"/>
+              </a:ext>
+            </a:extLst>
+          </p:cNvPr>
+          <p:cNvSpPr/>
+          <p:nvPr/>
+        </p:nvSpPr>
+        <p:spPr bwMode="auto">
+          <a:xfrm>
+            <a:off x="6292493" y="3429000"/>
+            <a:ext cx="5518507" cy="3086100"/>
+          </a:xfrm>
+          <a:prstGeom prst="rect">
+            <a:avLst/>
+          </a:prstGeom>
+          <a:solidFill>
+            <a:schemeClr val="accent2">
+              <a:lumMod val="75000"/>
+            </a:schemeClr>
+          </a:solidFill>
+          <a:ln w="12700">
+            <a:solidFill>
+              <a:schemeClr val="tx2"/>
+            </a:solidFill>
+            <a:miter lim="800000"/>
+            <a:headEnd type="none" w="med" len="med"/>
+            <a:tailEnd type="none" w="med" len="med"/>
+          </a:ln>
+          <a:effectLst/>
+        </p:spPr>
+        <p:style>
+          <a:lnRef idx="1">
+            <a:schemeClr val="accent2"/>
+          </a:lnRef>
+          <a:fillRef idx="3">
+            <a:schemeClr val="accent2"/>
+          </a:fillRef>
+          <a:effectRef idx="2">
+            <a:schemeClr val="accent2"/>
+          </a:effectRef>
+          <a:fontRef idx="minor">
+            <a:schemeClr val="lt1"/>
+          </a:fontRef>
+        </p:style>
+        <p:txBody>
+          <a:bodyPr rot="0" spcFirstLastPara="0" vertOverflow="overflow" horzOverflow="overflow" vert="horz" wrap="square" lIns="182880" tIns="146304" rIns="182880" bIns="146304" numCol="1" spcCol="0" rtlCol="0" fromWordArt="0" anchor="t" anchorCtr="0" forceAA="0" compatLnSpc="1">
+            <a:prstTxWarp prst="textNoShape">
+              <a:avLst/>
+            </a:prstTxWarp>
+            <a:noAutofit/>
+          </a:bodyPr>
+          <a:lstStyle/>
+          <a:p>
+            <a:pPr algn="ctr" defTabSz="932472" fontAlgn="base">
+              <a:lnSpc>
+                <a:spcPct val="90000"/>
+              </a:lnSpc>
+              <a:spcBef>
+                <a:spcPct val="0"/>
+              </a:spcBef>
+              <a:spcAft>
+                <a:spcPct val="0"/>
+              </a:spcAft>
+            </a:pPr>
+            <a:r>
+              <a:rPr lang="en-US" sz="3600" b="1" i="1" dirty="0">
+                <a:gradFill>
+                  <a:gsLst>
+                    <a:gs pos="0">
+                      <a:srgbClr val="FFFFFF"/>
+                    </a:gs>
+                    <a:gs pos="100000">
+                      <a:srgbClr val="FFFFFF"/>
+                    </a:gs>
+                  </a:gsLst>
+                  <a:lin ang="5400000" scaled="0"/>
+                </a:gradFill>
+                <a:ea typeface="Segoe UI" pitchFamily="34" charset="0"/>
+                <a:cs typeface="Segoe UI" pitchFamily="34" charset="0"/>
+              </a:rPr>
+              <a:t>What happens when this page loads?</a:t>
+            </a:r>
+          </a:p>
+          <a:p>
+            <a:pPr algn="ctr" defTabSz="932472" fontAlgn="base">
+              <a:lnSpc>
+                <a:spcPct val="90000"/>
+              </a:lnSpc>
+              <a:spcBef>
+                <a:spcPct val="0"/>
+              </a:spcBef>
+              <a:spcAft>
+                <a:spcPct val="0"/>
+              </a:spcAft>
+            </a:pPr>
+            <a:endParaRPr lang="en-US" sz="3600" b="1" i="1" dirty="0">
+              <a:gradFill>
+                <a:gsLst>
+                  <a:gs pos="0">
+                    <a:srgbClr val="FFFFFF"/>
+                  </a:gs>
+                  <a:gs pos="100000">
+                    <a:srgbClr val="FFFFFF"/>
+                  </a:gs>
+                </a:gsLst>
+                <a:lin ang="5400000" scaled="0"/>
+              </a:gradFill>
+              <a:ea typeface="Segoe UI" pitchFamily="34" charset="0"/>
+              <a:cs typeface="Segoe UI" pitchFamily="34" charset="0"/>
+            </a:endParaRPr>
+          </a:p>
+          <a:p>
+            <a:pPr algn="ctr" defTabSz="932472" fontAlgn="base">
+              <a:lnSpc>
+                <a:spcPct val="90000"/>
+              </a:lnSpc>
+              <a:spcBef>
+                <a:spcPct val="0"/>
+              </a:spcBef>
+              <a:spcAft>
+                <a:spcPct val="0"/>
+              </a:spcAft>
+            </a:pPr>
+            <a:r>
+              <a:rPr lang="en-US" sz="3600" b="1" dirty="0">
+                <a:solidFill>
+                  <a:srgbClr val="FFC000"/>
+                </a:solidFill>
+                <a:ea typeface="Segoe UI" pitchFamily="34" charset="0"/>
+                <a:cs typeface="Segoe UI" pitchFamily="34" charset="0"/>
+              </a:rPr>
+              <a:t>Hello, world!</a:t>
+            </a:r>
+            <a:r>
+              <a:rPr lang="en-US" sz="3600" dirty="0">
+                <a:gradFill>
+                  <a:gsLst>
+                    <a:gs pos="0">
+                      <a:srgbClr val="FFFFFF"/>
+                    </a:gs>
+                    <a:gs pos="100000">
+                      <a:srgbClr val="FFFFFF"/>
+                    </a:gs>
+                  </a:gsLst>
+                  <a:lin ang="5400000" scaled="0"/>
+                </a:gradFill>
+                <a:ea typeface="Segoe UI" pitchFamily="34" charset="0"/>
+                <a:cs typeface="Segoe UI" pitchFamily="34" charset="0"/>
+              </a:rPr>
+              <a:t> appears in a pop-up message</a:t>
+            </a:r>
+          </a:p>
+        </p:txBody>
+      </p:sp>
     </p:spTree>
     <p:extLst>
       <p:ext uri="{BB962C8B-B14F-4D97-AF65-F5344CB8AC3E}">
@@ -36336,6 +37044,749 @@
   <p:transition>
     <p:fade/>
   </p:transition>
+  <p:timing>
+    <p:tnLst>
+      <p:par>
+        <p:cTn id="1" dur="indefinite" restart="never" nodeType="tmRoot">
+          <p:childTnLst>
+            <p:seq concurrent="1" nextAc="seek">
+              <p:cTn id="2" dur="indefinite" nodeType="mainSeq">
+                <p:childTnLst>
+                  <p:par>
+                    <p:cTn id="3" fill="hold">
+                      <p:stCondLst>
+                        <p:cond delay="indefinite"/>
+                      </p:stCondLst>
+                      <p:childTnLst>
+                        <p:par>
+                          <p:cTn id="4" fill="hold">
+                            <p:stCondLst>
+                              <p:cond delay="0"/>
+                            </p:stCondLst>
+                            <p:childTnLst>
+                              <p:par>
+                                <p:cTn id="5" presetID="10" presetClass="entr" presetSubtype="0" fill="hold" grpId="0" nodeType="clickEffect">
+                                  <p:stCondLst>
+                                    <p:cond delay="0"/>
+                                  </p:stCondLst>
+                                  <p:childTnLst>
+                                    <p:set>
+                                      <p:cBhvr>
+                                        <p:cTn id="6" dur="1" fill="hold">
+                                          <p:stCondLst>
+                                            <p:cond delay="0"/>
+                                          </p:stCondLst>
+                                        </p:cTn>
+                                        <p:tgtEl>
+                                          <p:spTgt spid="8"/>
+                                        </p:tgtEl>
+                                        <p:attrNameLst>
+                                          <p:attrName>style.visibility</p:attrName>
+                                        </p:attrNameLst>
+                                      </p:cBhvr>
+                                      <p:to>
+                                        <p:strVal val="visible"/>
+                                      </p:to>
+                                    </p:set>
+                                    <p:animEffect transition="in" filter="fade">
+                                      <p:cBhvr>
+                                        <p:cTn id="7" dur="500"/>
+                                        <p:tgtEl>
+                                          <p:spTgt spid="8"/>
+                                        </p:tgtEl>
+                                      </p:cBhvr>
+                                    </p:animEffect>
+                                  </p:childTnLst>
+                                </p:cTn>
+                              </p:par>
+                              <p:par>
+                                <p:cTn id="8" presetID="10" presetClass="entr" presetSubtype="0" fill="hold" grpId="0" nodeType="withEffect">
+                                  <p:stCondLst>
+                                    <p:cond delay="0"/>
+                                  </p:stCondLst>
+                                  <p:childTnLst>
+                                    <p:set>
+                                      <p:cBhvr>
+                                        <p:cTn id="9" dur="1" fill="hold">
+                                          <p:stCondLst>
+                                            <p:cond delay="0"/>
+                                          </p:stCondLst>
+                                        </p:cTn>
+                                        <p:tgtEl>
+                                          <p:spTgt spid="4"/>
+                                        </p:tgtEl>
+                                        <p:attrNameLst>
+                                          <p:attrName>style.visibility</p:attrName>
+                                        </p:attrNameLst>
+                                      </p:cBhvr>
+                                      <p:to>
+                                        <p:strVal val="visible"/>
+                                      </p:to>
+                                    </p:set>
+                                    <p:animEffect transition="in" filter="fade">
+                                      <p:cBhvr>
+                                        <p:cTn id="10" dur="500"/>
+                                        <p:tgtEl>
+                                          <p:spTgt spid="4"/>
+                                        </p:tgtEl>
+                                      </p:cBhvr>
+                                    </p:animEffect>
+                                  </p:childTnLst>
+                                </p:cTn>
+                              </p:par>
+                              <p:par>
+                                <p:cTn id="11" presetID="10" presetClass="entr" presetSubtype="0" fill="hold" grpId="0" nodeType="withEffect">
+                                  <p:stCondLst>
+                                    <p:cond delay="0"/>
+                                  </p:stCondLst>
+                                  <p:childTnLst>
+                                    <p:set>
+                                      <p:cBhvr>
+                                        <p:cTn id="12" dur="1" fill="hold">
+                                          <p:stCondLst>
+                                            <p:cond delay="0"/>
+                                          </p:stCondLst>
+                                        </p:cTn>
+                                        <p:tgtEl>
+                                          <p:spTgt spid="3">
+                                            <p:txEl>
+                                              <p:pRg st="0" end="0"/>
+                                            </p:txEl>
+                                          </p:spTgt>
+                                        </p:tgtEl>
+                                        <p:attrNameLst>
+                                          <p:attrName>style.visibility</p:attrName>
+                                        </p:attrNameLst>
+                                      </p:cBhvr>
+                                      <p:to>
+                                        <p:strVal val="visible"/>
+                                      </p:to>
+                                    </p:set>
+                                    <p:animEffect transition="in" filter="fade">
+                                      <p:cBhvr>
+                                        <p:cTn id="13" dur="500"/>
+                                        <p:tgtEl>
+                                          <p:spTgt spid="3">
+                                            <p:txEl>
+                                              <p:pRg st="0" end="0"/>
+                                            </p:txEl>
+                                          </p:spTgt>
+                                        </p:tgtEl>
+                                      </p:cBhvr>
+                                    </p:animEffect>
+                                  </p:childTnLst>
+                                </p:cTn>
+                              </p:par>
+                              <p:par>
+                                <p:cTn id="14" presetID="10" presetClass="entr" presetSubtype="0" fill="hold" grpId="0" nodeType="withEffect">
+                                  <p:stCondLst>
+                                    <p:cond delay="0"/>
+                                  </p:stCondLst>
+                                  <p:childTnLst>
+                                    <p:set>
+                                      <p:cBhvr>
+                                        <p:cTn id="15" dur="1" fill="hold">
+                                          <p:stCondLst>
+                                            <p:cond delay="0"/>
+                                          </p:stCondLst>
+                                        </p:cTn>
+                                        <p:tgtEl>
+                                          <p:spTgt spid="3">
+                                            <p:txEl>
+                                              <p:pRg st="1" end="1"/>
+                                            </p:txEl>
+                                          </p:spTgt>
+                                        </p:tgtEl>
+                                        <p:attrNameLst>
+                                          <p:attrName>style.visibility</p:attrName>
+                                        </p:attrNameLst>
+                                      </p:cBhvr>
+                                      <p:to>
+                                        <p:strVal val="visible"/>
+                                      </p:to>
+                                    </p:set>
+                                    <p:animEffect transition="in" filter="fade">
+                                      <p:cBhvr>
+                                        <p:cTn id="16" dur="500"/>
+                                        <p:tgtEl>
+                                          <p:spTgt spid="3">
+                                            <p:txEl>
+                                              <p:pRg st="1" end="1"/>
+                                            </p:txEl>
+                                          </p:spTgt>
+                                        </p:tgtEl>
+                                      </p:cBhvr>
+                                    </p:animEffect>
+                                  </p:childTnLst>
+                                </p:cTn>
+                              </p:par>
+                              <p:par>
+                                <p:cTn id="17" presetID="10" presetClass="entr" presetSubtype="0" fill="hold" grpId="0" nodeType="withEffect">
+                                  <p:stCondLst>
+                                    <p:cond delay="0"/>
+                                  </p:stCondLst>
+                                  <p:childTnLst>
+                                    <p:set>
+                                      <p:cBhvr>
+                                        <p:cTn id="18" dur="1" fill="hold">
+                                          <p:stCondLst>
+                                            <p:cond delay="0"/>
+                                          </p:stCondLst>
+                                        </p:cTn>
+                                        <p:tgtEl>
+                                          <p:spTgt spid="3">
+                                            <p:txEl>
+                                              <p:pRg st="2" end="2"/>
+                                            </p:txEl>
+                                          </p:spTgt>
+                                        </p:tgtEl>
+                                        <p:attrNameLst>
+                                          <p:attrName>style.visibility</p:attrName>
+                                        </p:attrNameLst>
+                                      </p:cBhvr>
+                                      <p:to>
+                                        <p:strVal val="visible"/>
+                                      </p:to>
+                                    </p:set>
+                                    <p:animEffect transition="in" filter="fade">
+                                      <p:cBhvr>
+                                        <p:cTn id="19" dur="500"/>
+                                        <p:tgtEl>
+                                          <p:spTgt spid="3">
+                                            <p:txEl>
+                                              <p:pRg st="2" end="2"/>
+                                            </p:txEl>
+                                          </p:spTgt>
+                                        </p:tgtEl>
+                                      </p:cBhvr>
+                                    </p:animEffect>
+                                  </p:childTnLst>
+                                </p:cTn>
+                              </p:par>
+                              <p:par>
+                                <p:cTn id="20" presetID="10" presetClass="entr" presetSubtype="0" fill="hold" grpId="0" nodeType="withEffect">
+                                  <p:stCondLst>
+                                    <p:cond delay="0"/>
+                                  </p:stCondLst>
+                                  <p:childTnLst>
+                                    <p:set>
+                                      <p:cBhvr>
+                                        <p:cTn id="21" dur="1" fill="hold">
+                                          <p:stCondLst>
+                                            <p:cond delay="0"/>
+                                          </p:stCondLst>
+                                        </p:cTn>
+                                        <p:tgtEl>
+                                          <p:spTgt spid="3">
+                                            <p:txEl>
+                                              <p:pRg st="3" end="3"/>
+                                            </p:txEl>
+                                          </p:spTgt>
+                                        </p:tgtEl>
+                                        <p:attrNameLst>
+                                          <p:attrName>style.visibility</p:attrName>
+                                        </p:attrNameLst>
+                                      </p:cBhvr>
+                                      <p:to>
+                                        <p:strVal val="visible"/>
+                                      </p:to>
+                                    </p:set>
+                                    <p:animEffect transition="in" filter="fade">
+                                      <p:cBhvr>
+                                        <p:cTn id="22" dur="500"/>
+                                        <p:tgtEl>
+                                          <p:spTgt spid="3">
+                                            <p:txEl>
+                                              <p:pRg st="3" end="3"/>
+                                            </p:txEl>
+                                          </p:spTgt>
+                                        </p:tgtEl>
+                                      </p:cBhvr>
+                                    </p:animEffect>
+                                  </p:childTnLst>
+                                </p:cTn>
+                              </p:par>
+                              <p:par>
+                                <p:cTn id="23" presetID="10" presetClass="entr" presetSubtype="0" fill="hold" grpId="0" nodeType="withEffect">
+                                  <p:stCondLst>
+                                    <p:cond delay="0"/>
+                                  </p:stCondLst>
+                                  <p:childTnLst>
+                                    <p:set>
+                                      <p:cBhvr>
+                                        <p:cTn id="24" dur="1" fill="hold">
+                                          <p:stCondLst>
+                                            <p:cond delay="0"/>
+                                          </p:stCondLst>
+                                        </p:cTn>
+                                        <p:tgtEl>
+                                          <p:spTgt spid="3">
+                                            <p:txEl>
+                                              <p:pRg st="4" end="4"/>
+                                            </p:txEl>
+                                          </p:spTgt>
+                                        </p:tgtEl>
+                                        <p:attrNameLst>
+                                          <p:attrName>style.visibility</p:attrName>
+                                        </p:attrNameLst>
+                                      </p:cBhvr>
+                                      <p:to>
+                                        <p:strVal val="visible"/>
+                                      </p:to>
+                                    </p:set>
+                                    <p:animEffect transition="in" filter="fade">
+                                      <p:cBhvr>
+                                        <p:cTn id="25" dur="500"/>
+                                        <p:tgtEl>
+                                          <p:spTgt spid="3">
+                                            <p:txEl>
+                                              <p:pRg st="4" end="4"/>
+                                            </p:txEl>
+                                          </p:spTgt>
+                                        </p:tgtEl>
+                                      </p:cBhvr>
+                                    </p:animEffect>
+                                  </p:childTnLst>
+                                </p:cTn>
+                              </p:par>
+                              <p:par>
+                                <p:cTn id="26" presetID="10" presetClass="entr" presetSubtype="0" fill="hold" grpId="0" nodeType="withEffect">
+                                  <p:stCondLst>
+                                    <p:cond delay="0"/>
+                                  </p:stCondLst>
+                                  <p:childTnLst>
+                                    <p:set>
+                                      <p:cBhvr>
+                                        <p:cTn id="27" dur="1" fill="hold">
+                                          <p:stCondLst>
+                                            <p:cond delay="0"/>
+                                          </p:stCondLst>
+                                        </p:cTn>
+                                        <p:tgtEl>
+                                          <p:spTgt spid="3">
+                                            <p:txEl>
+                                              <p:pRg st="5" end="5"/>
+                                            </p:txEl>
+                                          </p:spTgt>
+                                        </p:tgtEl>
+                                        <p:attrNameLst>
+                                          <p:attrName>style.visibility</p:attrName>
+                                        </p:attrNameLst>
+                                      </p:cBhvr>
+                                      <p:to>
+                                        <p:strVal val="visible"/>
+                                      </p:to>
+                                    </p:set>
+                                    <p:animEffect transition="in" filter="fade">
+                                      <p:cBhvr>
+                                        <p:cTn id="28" dur="500"/>
+                                        <p:tgtEl>
+                                          <p:spTgt spid="3">
+                                            <p:txEl>
+                                              <p:pRg st="5" end="5"/>
+                                            </p:txEl>
+                                          </p:spTgt>
+                                        </p:tgtEl>
+                                      </p:cBhvr>
+                                    </p:animEffect>
+                                  </p:childTnLst>
+                                </p:cTn>
+                              </p:par>
+                              <p:par>
+                                <p:cTn id="29" presetID="10" presetClass="entr" presetSubtype="0" fill="hold" grpId="0" nodeType="withEffect">
+                                  <p:stCondLst>
+                                    <p:cond delay="0"/>
+                                  </p:stCondLst>
+                                  <p:childTnLst>
+                                    <p:set>
+                                      <p:cBhvr>
+                                        <p:cTn id="30" dur="1" fill="hold">
+                                          <p:stCondLst>
+                                            <p:cond delay="0"/>
+                                          </p:stCondLst>
+                                        </p:cTn>
+                                        <p:tgtEl>
+                                          <p:spTgt spid="3">
+                                            <p:txEl>
+                                              <p:pRg st="6" end="6"/>
+                                            </p:txEl>
+                                          </p:spTgt>
+                                        </p:tgtEl>
+                                        <p:attrNameLst>
+                                          <p:attrName>style.visibility</p:attrName>
+                                        </p:attrNameLst>
+                                      </p:cBhvr>
+                                      <p:to>
+                                        <p:strVal val="visible"/>
+                                      </p:to>
+                                    </p:set>
+                                    <p:animEffect transition="in" filter="fade">
+                                      <p:cBhvr>
+                                        <p:cTn id="31" dur="500"/>
+                                        <p:tgtEl>
+                                          <p:spTgt spid="3">
+                                            <p:txEl>
+                                              <p:pRg st="6" end="6"/>
+                                            </p:txEl>
+                                          </p:spTgt>
+                                        </p:tgtEl>
+                                      </p:cBhvr>
+                                    </p:animEffect>
+                                  </p:childTnLst>
+                                </p:cTn>
+                              </p:par>
+                              <p:par>
+                                <p:cTn id="32" presetID="10" presetClass="entr" presetSubtype="0" fill="hold" grpId="0" nodeType="withEffect">
+                                  <p:stCondLst>
+                                    <p:cond delay="0"/>
+                                  </p:stCondLst>
+                                  <p:childTnLst>
+                                    <p:set>
+                                      <p:cBhvr>
+                                        <p:cTn id="33" dur="1" fill="hold">
+                                          <p:stCondLst>
+                                            <p:cond delay="0"/>
+                                          </p:stCondLst>
+                                        </p:cTn>
+                                        <p:tgtEl>
+                                          <p:spTgt spid="3">
+                                            <p:txEl>
+                                              <p:pRg st="7" end="7"/>
+                                            </p:txEl>
+                                          </p:spTgt>
+                                        </p:tgtEl>
+                                        <p:attrNameLst>
+                                          <p:attrName>style.visibility</p:attrName>
+                                        </p:attrNameLst>
+                                      </p:cBhvr>
+                                      <p:to>
+                                        <p:strVal val="visible"/>
+                                      </p:to>
+                                    </p:set>
+                                    <p:animEffect transition="in" filter="fade">
+                                      <p:cBhvr>
+                                        <p:cTn id="34" dur="500"/>
+                                        <p:tgtEl>
+                                          <p:spTgt spid="3">
+                                            <p:txEl>
+                                              <p:pRg st="7" end="7"/>
+                                            </p:txEl>
+                                          </p:spTgt>
+                                        </p:tgtEl>
+                                      </p:cBhvr>
+                                    </p:animEffect>
+                                  </p:childTnLst>
+                                </p:cTn>
+                              </p:par>
+                            </p:childTnLst>
+                          </p:cTn>
+                        </p:par>
+                      </p:childTnLst>
+                    </p:cTn>
+                  </p:par>
+                  <p:par>
+                    <p:cTn id="35" fill="hold">
+                      <p:stCondLst>
+                        <p:cond delay="indefinite"/>
+                      </p:stCondLst>
+                      <p:childTnLst>
+                        <p:par>
+                          <p:cTn id="36" fill="hold">
+                            <p:stCondLst>
+                              <p:cond delay="0"/>
+                            </p:stCondLst>
+                            <p:childTnLst>
+                              <p:par>
+                                <p:cTn id="37" presetID="10" presetClass="entr" presetSubtype="0" fill="hold" nodeType="clickEffect">
+                                  <p:stCondLst>
+                                    <p:cond delay="0"/>
+                                  </p:stCondLst>
+                                  <p:childTnLst>
+                                    <p:set>
+                                      <p:cBhvr>
+                                        <p:cTn id="38" dur="1" fill="hold">
+                                          <p:stCondLst>
+                                            <p:cond delay="0"/>
+                                          </p:stCondLst>
+                                        </p:cTn>
+                                        <p:tgtEl>
+                                          <p:spTgt spid="11"/>
+                                        </p:tgtEl>
+                                        <p:attrNameLst>
+                                          <p:attrName>style.visibility</p:attrName>
+                                        </p:attrNameLst>
+                                      </p:cBhvr>
+                                      <p:to>
+                                        <p:strVal val="visible"/>
+                                      </p:to>
+                                    </p:set>
+                                    <p:animEffect transition="in" filter="fade">
+                                      <p:cBhvr>
+                                        <p:cTn id="39" dur="500"/>
+                                        <p:tgtEl>
+                                          <p:spTgt spid="11"/>
+                                        </p:tgtEl>
+                                      </p:cBhvr>
+                                    </p:animEffect>
+                                  </p:childTnLst>
+                                </p:cTn>
+                              </p:par>
+                              <p:par>
+                                <p:cTn id="40" presetID="10" presetClass="entr" presetSubtype="0" fill="hold" grpId="0" nodeType="withEffect">
+                                  <p:stCondLst>
+                                    <p:cond delay="0"/>
+                                  </p:stCondLst>
+                                  <p:childTnLst>
+                                    <p:set>
+                                      <p:cBhvr>
+                                        <p:cTn id="41" dur="1" fill="hold">
+                                          <p:stCondLst>
+                                            <p:cond delay="0"/>
+                                          </p:stCondLst>
+                                        </p:cTn>
+                                        <p:tgtEl>
+                                          <p:spTgt spid="7"/>
+                                        </p:tgtEl>
+                                        <p:attrNameLst>
+                                          <p:attrName>style.visibility</p:attrName>
+                                        </p:attrNameLst>
+                                      </p:cBhvr>
+                                      <p:to>
+                                        <p:strVal val="visible"/>
+                                      </p:to>
+                                    </p:set>
+                                    <p:animEffect transition="in" filter="fade">
+                                      <p:cBhvr>
+                                        <p:cTn id="42" dur="500"/>
+                                        <p:tgtEl>
+                                          <p:spTgt spid="7"/>
+                                        </p:tgtEl>
+                                      </p:cBhvr>
+                                    </p:animEffect>
+                                  </p:childTnLst>
+                                </p:cTn>
+                              </p:par>
+                              <p:par>
+                                <p:cTn id="43" presetID="10" presetClass="entr" presetSubtype="0" fill="hold" grpId="0" nodeType="withEffect">
+                                  <p:stCondLst>
+                                    <p:cond delay="0"/>
+                                  </p:stCondLst>
+                                  <p:childTnLst>
+                                    <p:set>
+                                      <p:cBhvr>
+                                        <p:cTn id="44" dur="1" fill="hold">
+                                          <p:stCondLst>
+                                            <p:cond delay="0"/>
+                                          </p:stCondLst>
+                                        </p:cTn>
+                                        <p:tgtEl>
+                                          <p:spTgt spid="9"/>
+                                        </p:tgtEl>
+                                        <p:attrNameLst>
+                                          <p:attrName>style.visibility</p:attrName>
+                                        </p:attrNameLst>
+                                      </p:cBhvr>
+                                      <p:to>
+                                        <p:strVal val="visible"/>
+                                      </p:to>
+                                    </p:set>
+                                    <p:animEffect transition="in" filter="fade">
+                                      <p:cBhvr>
+                                        <p:cTn id="45" dur="500"/>
+                                        <p:tgtEl>
+                                          <p:spTgt spid="9"/>
+                                        </p:tgtEl>
+                                      </p:cBhvr>
+                                    </p:animEffect>
+                                  </p:childTnLst>
+                                </p:cTn>
+                              </p:par>
+                              <p:par>
+                                <p:cTn id="46" presetID="10" presetClass="entr" presetSubtype="0" fill="hold" grpId="0" nodeType="withEffect">
+                                  <p:stCondLst>
+                                    <p:cond delay="0"/>
+                                  </p:stCondLst>
+                                  <p:childTnLst>
+                                    <p:set>
+                                      <p:cBhvr>
+                                        <p:cTn id="47" dur="1" fill="hold">
+                                          <p:stCondLst>
+                                            <p:cond delay="0"/>
+                                          </p:stCondLst>
+                                        </p:cTn>
+                                        <p:tgtEl>
+                                          <p:spTgt spid="6"/>
+                                        </p:tgtEl>
+                                        <p:attrNameLst>
+                                          <p:attrName>style.visibility</p:attrName>
+                                        </p:attrNameLst>
+                                      </p:cBhvr>
+                                      <p:to>
+                                        <p:strVal val="visible"/>
+                                      </p:to>
+                                    </p:set>
+                                    <p:animEffect transition="in" filter="fade">
+                                      <p:cBhvr>
+                                        <p:cTn id="48" dur="500"/>
+                                        <p:tgtEl>
+                                          <p:spTgt spid="6"/>
+                                        </p:tgtEl>
+                                      </p:cBhvr>
+                                    </p:animEffect>
+                                  </p:childTnLst>
+                                </p:cTn>
+                              </p:par>
+                            </p:childTnLst>
+                          </p:cTn>
+                        </p:par>
+                      </p:childTnLst>
+                    </p:cTn>
+                  </p:par>
+                  <p:par>
+                    <p:cTn id="49" fill="hold">
+                      <p:stCondLst>
+                        <p:cond delay="indefinite"/>
+                      </p:stCondLst>
+                      <p:childTnLst>
+                        <p:par>
+                          <p:cTn id="50" fill="hold">
+                            <p:stCondLst>
+                              <p:cond delay="0"/>
+                            </p:stCondLst>
+                            <p:childTnLst>
+                              <p:par>
+                                <p:cTn id="51" presetID="10" presetClass="entr" presetSubtype="0" fill="hold" grpId="0" nodeType="clickEffect">
+                                  <p:stCondLst>
+                                    <p:cond delay="0"/>
+                                  </p:stCondLst>
+                                  <p:childTnLst>
+                                    <p:set>
+                                      <p:cBhvr>
+                                        <p:cTn id="52" dur="1" fill="hold">
+                                          <p:stCondLst>
+                                            <p:cond delay="0"/>
+                                          </p:stCondLst>
+                                        </p:cTn>
+                                        <p:tgtEl>
+                                          <p:spTgt spid="17"/>
+                                        </p:tgtEl>
+                                        <p:attrNameLst>
+                                          <p:attrName>style.visibility</p:attrName>
+                                        </p:attrNameLst>
+                                      </p:cBhvr>
+                                      <p:to>
+                                        <p:strVal val="visible"/>
+                                      </p:to>
+                                    </p:set>
+                                    <p:animEffect transition="in" filter="fade">
+                                      <p:cBhvr>
+                                        <p:cTn id="53" dur="500"/>
+                                        <p:tgtEl>
+                                          <p:spTgt spid="17"/>
+                                        </p:tgtEl>
+                                      </p:cBhvr>
+                                    </p:animEffect>
+                                  </p:childTnLst>
+                                </p:cTn>
+                              </p:par>
+                            </p:childTnLst>
+                          </p:cTn>
+                        </p:par>
+                      </p:childTnLst>
+                    </p:cTn>
+                  </p:par>
+                  <p:par>
+                    <p:cTn id="54" fill="hold">
+                      <p:stCondLst>
+                        <p:cond delay="indefinite"/>
+                      </p:stCondLst>
+                      <p:childTnLst>
+                        <p:par>
+                          <p:cTn id="55" fill="hold">
+                            <p:stCondLst>
+                              <p:cond delay="0"/>
+                            </p:stCondLst>
+                            <p:childTnLst>
+                              <p:par>
+                                <p:cTn id="56" presetID="10" presetClass="entr" presetSubtype="0" fill="hold" nodeType="clickEffect">
+                                  <p:stCondLst>
+                                    <p:cond delay="0"/>
+                                  </p:stCondLst>
+                                  <p:childTnLst>
+                                    <p:set>
+                                      <p:cBhvr>
+                                        <p:cTn id="57" dur="1" fill="hold">
+                                          <p:stCondLst>
+                                            <p:cond delay="0"/>
+                                          </p:stCondLst>
+                                        </p:cTn>
+                                        <p:tgtEl>
+                                          <p:spTgt spid="17">
+                                            <p:txEl>
+                                              <p:pRg st="2" end="2"/>
+                                            </p:txEl>
+                                          </p:spTgt>
+                                        </p:tgtEl>
+                                        <p:attrNameLst>
+                                          <p:attrName>style.visibility</p:attrName>
+                                        </p:attrNameLst>
+                                      </p:cBhvr>
+                                      <p:to>
+                                        <p:strVal val="visible"/>
+                                      </p:to>
+                                    </p:set>
+                                    <p:animEffect transition="in" filter="fade">
+                                      <p:cBhvr>
+                                        <p:cTn id="58" dur="500"/>
+                                        <p:tgtEl>
+                                          <p:spTgt spid="17">
+                                            <p:txEl>
+                                              <p:pRg st="2" end="2"/>
+                                            </p:txEl>
+                                          </p:spTgt>
+                                        </p:tgtEl>
+                                      </p:cBhvr>
+                                    </p:animEffect>
+                                  </p:childTnLst>
+                                </p:cTn>
+                              </p:par>
+                            </p:childTnLst>
+                          </p:cTn>
+                        </p:par>
+                      </p:childTnLst>
+                    </p:cTn>
+                  </p:par>
+                </p:childTnLst>
+              </p:cTn>
+              <p:prevCondLst>
+                <p:cond evt="onPrev" delay="0">
+                  <p:tgtEl>
+                    <p:sldTgt/>
+                  </p:tgtEl>
+                </p:cond>
+              </p:prevCondLst>
+              <p:nextCondLst>
+                <p:cond evt="onNext" delay="0">
+                  <p:tgtEl>
+                    <p:sldTgt/>
+                  </p:tgtEl>
+                </p:cond>
+              </p:nextCondLst>
+            </p:seq>
+          </p:childTnLst>
+        </p:cTn>
+      </p:par>
+    </p:tnLst>
+    <p:bldLst>
+      <p:bldP spid="9" grpId="0" animBg="1"/>
+      <p:bldP spid="8" grpId="0" animBg="1"/>
+      <p:bldP spid="3" grpId="0" build="p"/>
+      <p:bldP spid="4" grpId="0"/>
+      <p:bldP spid="6" grpId="0"/>
+      <p:bldP spid="7" grpId="0"/>
+      <p:bldP spid="17" grpId="0" animBg="1"/>
+    </p:bldLst>
+  </p:timing>
 </p:sld>
 </file>
 
@@ -36417,7 +37868,7 @@
                   <a:schemeClr val="tx2"/>
                 </a:solidFill>
               </a:rPr>
-              <a:t>This is contains JavaScript code</a:t>
+              <a:t>This adds some JavaScript to the HTML page</a:t>
             </a:r>
           </a:p>
           <a:p>
@@ -36977,7 +38428,7 @@
                 </a:solidFill>
                 <a:latin typeface="Consolas" panose="020B0609020204030204" pitchFamily="49" charset="0"/>
               </a:rPr>
-              <a:t>"Hello, world!"</a:t>
+              <a:t>"Hello, World!"</a:t>
             </a:r>
             <a:r>
               <a:rPr lang="en-US" dirty="0">
@@ -37008,7 +38459,7 @@
             </a:r>
             <a:r>
               <a:rPr lang="en-US" dirty="0"/>
-              <a:t> keyword</a:t>
+              <a:t> keyword (must be lowercase)</a:t>
             </a:r>
           </a:p>
           <a:p>
@@ -37079,7 +38530,7 @@
         </p:blipFill>
         <p:spPr>
           <a:xfrm>
-            <a:off x="5181600" y="2835431"/>
+            <a:off x="5181600" y="3314700"/>
             <a:ext cx="6257003" cy="1872938"/>
           </a:xfrm>
           <a:prstGeom prst="rect">
@@ -37087,6 +38538,148 @@
           </a:prstGeom>
         </p:spPr>
       </p:pic>
+      <p:sp>
+        <p:nvSpPr>
+          <p:cNvPr id="5" name="Rectangle 4">
+            <a:extLst>
+              <a:ext uri="{FF2B5EF4-FFF2-40B4-BE49-F238E27FC236}">
+                <a16:creationId xmlns:a16="http://schemas.microsoft.com/office/drawing/2014/main" id="{A4313198-B839-4138-B755-F6EDCF5F2811}"/>
+              </a:ext>
+            </a:extLst>
+          </p:cNvPr>
+          <p:cNvSpPr/>
+          <p:nvPr/>
+        </p:nvSpPr>
+        <p:spPr bwMode="auto">
+          <a:xfrm>
+            <a:off x="6896100" y="1415738"/>
+            <a:ext cx="4686300" cy="1371600"/>
+          </a:xfrm>
+          <a:prstGeom prst="rect">
+            <a:avLst/>
+          </a:prstGeom>
+          <a:solidFill>
+            <a:schemeClr val="tx1"/>
+          </a:solidFill>
+          <a:ln w="12700">
+            <a:solidFill>
+              <a:schemeClr val="tx2"/>
+            </a:solidFill>
+            <a:miter lim="800000"/>
+            <a:headEnd type="none" w="med" len="med"/>
+            <a:tailEnd type="none" w="med" len="med"/>
+          </a:ln>
+          <a:effectLst/>
+        </p:spPr>
+        <p:style>
+          <a:lnRef idx="1">
+            <a:schemeClr val="accent2"/>
+          </a:lnRef>
+          <a:fillRef idx="3">
+            <a:schemeClr val="accent2"/>
+          </a:fillRef>
+          <a:effectRef idx="2">
+            <a:schemeClr val="accent2"/>
+          </a:effectRef>
+          <a:fontRef idx="minor">
+            <a:schemeClr val="lt1"/>
+          </a:fontRef>
+        </p:style>
+        <p:txBody>
+          <a:bodyPr rot="0" spcFirstLastPara="0" vertOverflow="overflow" horzOverflow="overflow" vert="horz" wrap="square" lIns="182880" tIns="146304" rIns="182880" bIns="146304" numCol="1" spcCol="0" rtlCol="0" fromWordArt="0" anchor="t" anchorCtr="0" forceAA="0" compatLnSpc="1">
+            <a:prstTxWarp prst="textNoShape">
+              <a:avLst/>
+            </a:prstTxWarp>
+            <a:noAutofit/>
+          </a:bodyPr>
+          <a:lstStyle/>
+          <a:p>
+            <a:pPr algn="ctr" defTabSz="932472" fontAlgn="base">
+              <a:lnSpc>
+                <a:spcPct val="90000"/>
+              </a:lnSpc>
+              <a:spcBef>
+                <a:spcPct val="0"/>
+              </a:spcBef>
+              <a:spcAft>
+                <a:spcPct val="0"/>
+              </a:spcAft>
+            </a:pPr>
+            <a:r>
+              <a:rPr lang="en-US" sz="2400" b="1" i="1" dirty="0">
+                <a:gradFill>
+                  <a:gsLst>
+                    <a:gs pos="0">
+                      <a:srgbClr val="FFFFFF"/>
+                    </a:gs>
+                    <a:gs pos="100000">
+                      <a:srgbClr val="FFFFFF"/>
+                    </a:gs>
+                  </a:gsLst>
+                  <a:lin ang="5400000" scaled="0"/>
+                </a:gradFill>
+                <a:ea typeface="Segoe UI" pitchFamily="34" charset="0"/>
+                <a:cs typeface="Segoe UI" pitchFamily="34" charset="0"/>
+              </a:rPr>
+              <a:t>Keywords</a:t>
+            </a:r>
+            <a:r>
+              <a:rPr lang="en-US" sz="2400" dirty="0">
+                <a:gradFill>
+                  <a:gsLst>
+                    <a:gs pos="0">
+                      <a:srgbClr val="FFFFFF"/>
+                    </a:gs>
+                    <a:gs pos="100000">
+                      <a:srgbClr val="FFFFFF"/>
+                    </a:gs>
+                  </a:gsLst>
+                  <a:lin ang="5400000" scaled="0"/>
+                </a:gradFill>
+                <a:ea typeface="Segoe UI" pitchFamily="34" charset="0"/>
+                <a:cs typeface="Segoe UI" pitchFamily="34" charset="0"/>
+              </a:rPr>
+              <a:t>, or </a:t>
+            </a:r>
+            <a:r>
+              <a:rPr lang="en-US" sz="2400" b="1" i="1" dirty="0">
+                <a:gradFill>
+                  <a:gsLst>
+                    <a:gs pos="0">
+                      <a:srgbClr val="FFFFFF"/>
+                    </a:gs>
+                    <a:gs pos="100000">
+                      <a:srgbClr val="FFFFFF"/>
+                    </a:gs>
+                  </a:gsLst>
+                  <a:lin ang="5400000" scaled="0"/>
+                </a:gradFill>
+                <a:ea typeface="Segoe UI" pitchFamily="34" charset="0"/>
+                <a:cs typeface="Segoe UI" pitchFamily="34" charset="0"/>
+              </a:rPr>
+              <a:t>reserved words</a:t>
+            </a:r>
+            <a:r>
+              <a:rPr lang="en-US" sz="2400" dirty="0">
+                <a:gradFill>
+                  <a:gsLst>
+                    <a:gs pos="0">
+                      <a:srgbClr val="FFFFFF"/>
+                    </a:gs>
+                    <a:gs pos="100000">
+                      <a:srgbClr val="FFFFFF"/>
+                    </a:gs>
+                  </a:gsLst>
+                  <a:lin ang="5400000" scaled="0"/>
+                </a:gradFill>
+                <a:ea typeface="Segoe UI" pitchFamily="34" charset="0"/>
+                <a:cs typeface="Segoe UI" pitchFamily="34" charset="0"/>
+              </a:rPr>
+              <a:t>, are pieces of text that have a special meaning in JavaScript</a:t>
+            </a:r>
+          </a:p>
+        </p:txBody>
+      </p:sp>
     </p:spTree>
     <p:extLst>
       <p:ext uri="{BB962C8B-B14F-4D97-AF65-F5344CB8AC3E}">
@@ -37195,11 +38788,7 @@
                                           </p:stCondLst>
                                         </p:cTn>
                                         <p:tgtEl>
-                                          <p:spTgt spid="3">
-                                            <p:txEl>
-                                              <p:pRg st="3" end="3"/>
-                                            </p:txEl>
-                                          </p:spTgt>
+                                          <p:spTgt spid="5"/>
                                         </p:tgtEl>
                                         <p:attrNameLst>
                                           <p:attrName>style.visibility</p:attrName>
@@ -37213,11 +38802,7 @@
                                       <p:cBhvr>
                                         <p:cTn id="12" dur="500"/>
                                         <p:tgtEl>
-                                          <p:spTgt spid="3">
-                                            <p:txEl>
-                                              <p:pRg st="3" end="3"/>
-                                            </p:txEl>
-                                          </p:spTgt>
+                                          <p:spTgt spid="5"/>
                                         </p:tgtEl>
                                       </p:cBhvr>
                                     </p:animEffect>
@@ -37258,7 +38843,7 @@
                                         <p:tgtEl>
                                           <p:spTgt spid="3">
                                             <p:txEl>
-                                              <p:pRg st="4" end="4"/>
+                                              <p:pRg st="3" end="3"/>
                                             </p:txEl>
                                           </p:spTgt>
                                         </p:tgtEl>
@@ -37276,7 +38861,7 @@
                                         <p:tgtEl>
                                           <p:spTgt spid="3">
                                             <p:txEl>
-                                              <p:pRg st="4" end="4"/>
+                                              <p:pRg st="3" end="3"/>
                                             </p:txEl>
                                           </p:spTgt>
                                         </p:tgtEl>
@@ -37319,7 +38904,7 @@
                                         <p:tgtEl>
                                           <p:spTgt spid="3">
                                             <p:txEl>
-                                              <p:pRg st="5" end="5"/>
+                                              <p:pRg st="4" end="4"/>
                                             </p:txEl>
                                           </p:spTgt>
                                         </p:tgtEl>
@@ -37337,7 +38922,7 @@
                                         <p:tgtEl>
                                           <p:spTgt spid="3">
                                             <p:txEl>
-                                              <p:pRg st="5" end="5"/>
+                                              <p:pRg st="4" end="4"/>
                                             </p:txEl>
                                           </p:spTgt>
                                         </p:tgtEl>
@@ -37380,7 +38965,7 @@
                                         <p:tgtEl>
                                           <p:spTgt spid="3">
                                             <p:txEl>
-                                              <p:pRg st="6" end="6"/>
+                                              <p:pRg st="5" end="5"/>
                                             </p:txEl>
                                           </p:spTgt>
                                         </p:tgtEl>
@@ -37398,7 +38983,7 @@
                                         <p:tgtEl>
                                           <p:spTgt spid="3">
                                             <p:txEl>
-                                              <p:pRg st="6" end="6"/>
+                                              <p:pRg st="5" end="5"/>
                                             </p:txEl>
                                           </p:spTgt>
                                         </p:tgtEl>
@@ -37441,7 +39026,7 @@
                                         <p:tgtEl>
                                           <p:spTgt spid="3">
                                             <p:txEl>
-                                              <p:pRg st="7" end="7"/>
+                                              <p:pRg st="6" end="6"/>
                                             </p:txEl>
                                           </p:spTgt>
                                         </p:tgtEl>
@@ -37459,7 +39044,7 @@
                                         <p:tgtEl>
                                           <p:spTgt spid="3">
                                             <p:txEl>
-                                              <p:pRg st="7" end="7"/>
+                                              <p:pRg st="6" end="6"/>
                                             </p:txEl>
                                           </p:spTgt>
                                         </p:tgtEl>
@@ -37502,7 +39087,7 @@
                                         <p:tgtEl>
                                           <p:spTgt spid="3">
                                             <p:txEl>
-                                              <p:pRg st="8" end="8"/>
+                                              <p:pRg st="7" end="7"/>
                                             </p:txEl>
                                           </p:spTgt>
                                         </p:tgtEl>
@@ -37520,7 +39105,7 @@
                                         <p:tgtEl>
                                           <p:spTgt spid="3">
                                             <p:txEl>
-                                              <p:pRg st="8" end="8"/>
+                                              <p:pRg st="7" end="7"/>
                                             </p:txEl>
                                           </p:spTgt>
                                         </p:tgtEl>
@@ -37548,7 +39133,7 @@
                             </p:stCondLst>
                             <p:childTnLst>
                               <p:par>
-                                <p:cTn id="40" presetID="10" presetClass="entr" presetSubtype="0" fill="hold" nodeType="clickEffect">
+                                <p:cTn id="40" presetID="10" presetClass="entr" presetSubtype="0" fill="hold" grpId="0" nodeType="clickEffect">
                                   <p:stCondLst>
                                     <p:cond delay="0"/>
                                   </p:stCondLst>
@@ -37556,6 +39141,67 @@
                                     <p:set>
                                       <p:cBhvr>
                                         <p:cTn id="41" dur="1" fill="hold">
+                                          <p:stCondLst>
+                                            <p:cond delay="0"/>
+                                          </p:stCondLst>
+                                        </p:cTn>
+                                        <p:tgtEl>
+                                          <p:spTgt spid="3">
+                                            <p:txEl>
+                                              <p:pRg st="8" end="8"/>
+                                            </p:txEl>
+                                          </p:spTgt>
+                                        </p:tgtEl>
+                                        <p:attrNameLst>
+                                          <p:attrName>style.visibility</p:attrName>
+                                        </p:attrNameLst>
+                                      </p:cBhvr>
+                                      <p:to>
+                                        <p:strVal val="visible"/>
+                                      </p:to>
+                                    </p:set>
+                                    <p:animEffect transition="in" filter="fade">
+                                      <p:cBhvr>
+                                        <p:cTn id="42" dur="500"/>
+                                        <p:tgtEl>
+                                          <p:spTgt spid="3">
+                                            <p:txEl>
+                                              <p:pRg st="8" end="8"/>
+                                            </p:txEl>
+                                          </p:spTgt>
+                                        </p:tgtEl>
+                                      </p:cBhvr>
+                                    </p:animEffect>
+                                  </p:childTnLst>
+                                </p:cTn>
+                              </p:par>
+                            </p:childTnLst>
+                          </p:cTn>
+                        </p:par>
+                      </p:childTnLst>
+                    </p:cTn>
+                  </p:par>
+                  <p:par>
+                    <p:cTn id="43" fill="hold">
+                      <p:stCondLst>
+                        <p:cond delay="indefinite"/>
+                      </p:stCondLst>
+                      <p:childTnLst>
+                        <p:par>
+                          <p:cTn id="44" fill="hold">
+                            <p:stCondLst>
+                              <p:cond delay="0"/>
+                            </p:stCondLst>
+                            <p:childTnLst>
+                              <p:par>
+                                <p:cTn id="45" presetID="10" presetClass="entr" presetSubtype="0" fill="hold" nodeType="clickEffect">
+                                  <p:stCondLst>
+                                    <p:cond delay="0"/>
+                                  </p:stCondLst>
+                                  <p:childTnLst>
+                                    <p:set>
+                                      <p:cBhvr>
+                                        <p:cTn id="46" dur="1" fill="hold">
                                           <p:stCondLst>
                                             <p:cond delay="0"/>
                                           </p:stCondLst>
@@ -37573,7 +39219,7 @@
                                     </p:set>
                                     <p:animEffect transition="in" filter="fade">
                                       <p:cBhvr>
-                                        <p:cTn id="42" dur="500"/>
+                                        <p:cTn id="47" dur="500"/>
                                         <p:tgtEl>
                                           <p:spTgt spid="4"/>
                                         </p:tgtEl>
@@ -37611,6 +39257,7 @@
     </p:tnLst>
     <p:bldLst>
       <p:bldP spid="3" grpId="0" uiExpand="1" build="p"/>
+      <p:bldP spid="5" grpId="0" animBg="1"/>
     </p:bldLst>
   </p:timing>
 </p:sld>
@@ -37736,10 +39383,10 @@
       </p:grpSpPr>
       <p:sp>
         <p:nvSpPr>
-          <p:cNvPr id="2" name="Text Placeholder 1">
+          <p:cNvPr id="2" name="Title 1">
             <a:extLst>
               <a:ext uri="{FF2B5EF4-FFF2-40B4-BE49-F238E27FC236}">
-                <a16:creationId xmlns:a16="http://schemas.microsoft.com/office/drawing/2014/main" id="{B7A791CB-AA68-4769-B673-C015ECF3D832}"/>
+                <a16:creationId xmlns:a16="http://schemas.microsoft.com/office/drawing/2014/main" id="{1AAE2480-6EC5-4F82-A8AF-E7F04F14C1DC}"/>
               </a:ext>
             </a:extLst>
           </p:cNvPr>
@@ -37747,7 +39394,7 @@
             <a:spLocks noGrp="1"/>
           </p:cNvSpPr>
           <p:nvPr>
-            <p:ph type="body" sz="quarter" idx="10"/>
+            <p:ph type="title"/>
           </p:nvPr>
         </p:nvSpPr>
         <p:spPr/>
@@ -37756,8 +39403,69 @@
           <a:lstStyle/>
           <a:p>
             <a:r>
-              <a:rPr lang="en-US"/>
-              <a:t>Questions?</a:t>
+              <a:rPr lang="en-US" dirty="0"/>
+              <a:t>Hello, Drake!</a:t>
+            </a:r>
+          </a:p>
+        </p:txBody>
+      </p:sp>
+      <p:sp>
+        <p:nvSpPr>
+          <p:cNvPr id="5" name="TextBox 4">
+            <a:extLst>
+              <a:ext uri="{FF2B5EF4-FFF2-40B4-BE49-F238E27FC236}">
+                <a16:creationId xmlns:a16="http://schemas.microsoft.com/office/drawing/2014/main" id="{57951CC6-2030-45B1-873D-920D27F40FFC}"/>
+              </a:ext>
+            </a:extLst>
+          </p:cNvPr>
+          <p:cNvSpPr txBox="1"/>
+          <p:nvPr/>
+        </p:nvSpPr>
+        <p:spPr>
+          <a:xfrm>
+            <a:off x="391668" y="2875002"/>
+            <a:ext cx="11430000" cy="1107996"/>
+          </a:xfrm>
+          <a:prstGeom prst="rect">
+            <a:avLst/>
+          </a:prstGeom>
+          <a:noFill/>
+        </p:spPr>
+        <p:txBody>
+          <a:bodyPr wrap="square">
+            <a:spAutoFit/>
+          </a:bodyPr>
+          <a:lstStyle/>
+          <a:p>
+            <a:pPr marL="0" indent="0" algn="ctr">
+              <a:buNone/>
+            </a:pPr>
+            <a:r>
+              <a:rPr lang="en-US" sz="6600" dirty="0">
+                <a:solidFill>
+                  <a:srgbClr val="000000"/>
+                </a:solidFill>
+                <a:latin typeface="Consolas" panose="020B0609020204030204" pitchFamily="49" charset="0"/>
+              </a:rPr>
+              <a:t>alert(</a:t>
+            </a:r>
+            <a:r>
+              <a:rPr lang="en-US" sz="6600" dirty="0">
+                <a:solidFill>
+                  <a:srgbClr val="A31515"/>
+                </a:solidFill>
+                <a:latin typeface="Consolas" panose="020B0609020204030204" pitchFamily="49" charset="0"/>
+              </a:rPr>
+              <a:t>"Hello, Drake!"</a:t>
+            </a:r>
+            <a:r>
+              <a:rPr lang="en-US" sz="6600" dirty="0">
+                <a:solidFill>
+                  <a:srgbClr val="000000"/>
+                </a:solidFill>
+                <a:latin typeface="Consolas" panose="020B0609020204030204" pitchFamily="49" charset="0"/>
+              </a:rPr>
+              <a:t>);</a:t>
             </a:r>
           </a:p>
         </p:txBody>
@@ -37765,7 +39473,7 @@
     </p:spTree>
     <p:extLst>
       <p:ext uri="{BB962C8B-B14F-4D97-AF65-F5344CB8AC3E}">
-        <p14:creationId xmlns:p14="http://schemas.microsoft.com/office/powerpoint/2010/main" val="2492034236"/>
+        <p14:creationId xmlns:p14="http://schemas.microsoft.com/office/powerpoint/2010/main" val="3270118950"/>
       </p:ext>
     </p:extLst>
   </p:cSld>

</xml_diff>

<commit_message>
Update gitbook 2022-09-02 17:11:59
</commit_message>
<xml_diff>
--- a/Week02/IntroductionToJavaScript.pptx
+++ b/Week02/IntroductionToJavaScript.pptx
@@ -5,7 +5,7 @@
     <p:sldMasterId id="2147483648" r:id="rId1"/>
   </p:sldMasterIdLst>
   <p:notesMasterIdLst>
-    <p:notesMasterId r:id="rId11"/>
+    <p:notesMasterId r:id="rId12"/>
   </p:notesMasterIdLst>
   <p:sldIdLst>
     <p:sldId id="258" r:id="rId2"/>
@@ -16,7 +16,8 @@
     <p:sldId id="311" r:id="rId7"/>
     <p:sldId id="312" r:id="rId8"/>
     <p:sldId id="313" r:id="rId9"/>
-    <p:sldId id="314" r:id="rId10"/>
+    <p:sldId id="315" r:id="rId10"/>
+    <p:sldId id="314" r:id="rId11"/>
   </p:sldIdLst>
   <p:sldSz cx="12192000" cy="6858000"/>
   <p:notesSz cx="6858000" cy="9144000"/>
@@ -216,7 +217,7 @@
           <a:p>
             <a:fld id="{19104133-B5B0-4351-8158-4F0E5EB1E2BF}" type="datetimeFigureOut">
               <a:rPr lang="en-US" smtClean="0"/>
-              <a:t>9/1/2022</a:t>
+              <a:t>9/2/2022</a:t>
             </a:fld>
             <a:endParaRPr lang="en-US"/>
           </a:p>
@@ -727,15 +728,52 @@
           <a:bodyPr/>
           <a:lstStyle/>
           <a:p>
+            <a:pPr marL="171450" indent="-171450">
+              <a:buFont typeface="Arial" panose="020B0604020202020204" pitchFamily="34" charset="0"/>
+              <a:buChar char="•"/>
+            </a:pPr>
             <a:r>
               <a:rPr lang="en-US" dirty="0"/>
-              <a:t>Ask the</a:t>
+              <a:t>Here there is an HTML file with a new HTML element… but a familiar attribute. The </a:t>
             </a:r>
             <a:r>
-              <a:rPr lang="en-US" baseline="0" dirty="0"/>
-              <a:t> students to guess what this does</a:t>
+              <a:rPr lang="en-US" dirty="0" err="1"/>
+              <a:t>src</a:t>
             </a:r>
-            <a:endParaRPr lang="en-US" dirty="0"/>
+            <a:r>
+              <a:rPr lang="en-US" dirty="0"/>
+              <a:t> points to another file…</a:t>
+            </a:r>
+          </a:p>
+          <a:p>
+            <a:pPr marL="171450" indent="-171450">
+              <a:buFont typeface="Arial" panose="020B0604020202020204" pitchFamily="34" charset="0"/>
+              <a:buChar char="•"/>
+            </a:pPr>
+            <a:r>
+              <a:rPr lang="en-US" dirty="0"/>
+              <a:t>script.js that has this one line of code. Like CSS, this is a new language, NOT HTML! It’s JavaScript!</a:t>
+            </a:r>
+          </a:p>
+          <a:p>
+            <a:pPr marL="171450" indent="-171450">
+              <a:buFont typeface="Arial" panose="020B0604020202020204" pitchFamily="34" charset="0"/>
+              <a:buChar char="•"/>
+            </a:pPr>
+            <a:r>
+              <a:rPr lang="en-US" dirty="0"/>
+              <a:t>So, what will happen when this page loads? Any guesses?</a:t>
+            </a:r>
+          </a:p>
+          <a:p>
+            <a:pPr marL="171450" indent="-171450">
+              <a:buFont typeface="Arial" panose="020B0604020202020204" pitchFamily="34" charset="0"/>
+              <a:buChar char="•"/>
+            </a:pPr>
+            <a:r>
+              <a:rPr lang="en-US" dirty="0"/>
+              <a:t>A pop-up appears that says Hello World!</a:t>
+            </a:r>
           </a:p>
         </p:txBody>
       </p:sp>
@@ -1158,7 +1196,7 @@
             <a:fld id="{1C2D31DE-C454-491C-B5C3-F097855E3DF7}" type="datetime4">
               <a:rPr lang="en-US" smtClean="0"/>
               <a:pPr/>
-              <a:t>September 1, 2022</a:t>
+              <a:t>September 2, 2022</a:t>
             </a:fld>
             <a:endParaRPr lang="en-US" dirty="0"/>
           </a:p>
@@ -4550,7 +4588,7 @@
           <a:p>
             <a:fld id="{5958763E-B898-436D-883D-03711491D54A}" type="datetimeFigureOut">
               <a:rPr lang="en-US" smtClean="0"/>
-              <a:t>9/1/2022</a:t>
+              <a:t>9/2/2022</a:t>
             </a:fld>
             <a:endParaRPr lang="en-US"/>
           </a:p>
@@ -4743,7 +4781,7 @@
           <a:p>
             <a:fld id="{5958763E-B898-436D-883D-03711491D54A}" type="datetimeFigureOut">
               <a:rPr lang="en-US" smtClean="0"/>
-              <a:t>9/1/2022</a:t>
+              <a:t>9/2/2022</a:t>
             </a:fld>
             <a:endParaRPr lang="en-US"/>
           </a:p>
@@ -4993,7 +5031,7 @@
           <a:p>
             <a:fld id="{5958763E-B898-436D-883D-03711491D54A}" type="datetimeFigureOut">
               <a:rPr lang="en-US" smtClean="0"/>
-              <a:t>9/1/2022</a:t>
+              <a:t>9/2/2022</a:t>
             </a:fld>
             <a:endParaRPr lang="en-US"/>
           </a:p>
@@ -5341,7 +5379,7 @@
           <a:p>
             <a:fld id="{5958763E-B898-436D-883D-03711491D54A}" type="datetimeFigureOut">
               <a:rPr lang="en-US" smtClean="0"/>
-              <a:t>9/1/2022</a:t>
+              <a:t>9/2/2022</a:t>
             </a:fld>
             <a:endParaRPr lang="en-US"/>
           </a:p>
@@ -5757,7 +5795,7 @@
           <a:p>
             <a:fld id="{5958763E-B898-436D-883D-03711491D54A}" type="datetimeFigureOut">
               <a:rPr lang="en-US" smtClean="0"/>
-              <a:t>9/1/2022</a:t>
+              <a:t>9/2/2022</a:t>
             </a:fld>
             <a:endParaRPr lang="en-US"/>
           </a:p>
@@ -6258,7 +6296,7 @@
           <a:p>
             <a:fld id="{5958763E-B898-436D-883D-03711491D54A}" type="datetimeFigureOut">
               <a:rPr lang="en-US" smtClean="0"/>
-              <a:t>9/1/2022</a:t>
+              <a:t>9/2/2022</a:t>
             </a:fld>
             <a:endParaRPr lang="en-US"/>
           </a:p>
@@ -6709,7 +6747,7 @@
           <a:p>
             <a:fld id="{5958763E-B898-436D-883D-03711491D54A}" type="datetimeFigureOut">
               <a:rPr lang="en-US" smtClean="0"/>
-              <a:t>9/1/2022</a:t>
+              <a:t>9/2/2022</a:t>
             </a:fld>
             <a:endParaRPr lang="en-US"/>
           </a:p>
@@ -7320,7 +7358,7 @@
           <a:p>
             <a:fld id="{5958763E-B898-436D-883D-03711491D54A}" type="datetimeFigureOut">
               <a:rPr lang="en-US" smtClean="0"/>
-              <a:t>9/1/2022</a:t>
+              <a:t>9/2/2022</a:t>
             </a:fld>
             <a:endParaRPr lang="en-US"/>
           </a:p>
@@ -8091,7 +8129,7 @@
           <a:p>
             <a:fld id="{5958763E-B898-436D-883D-03711491D54A}" type="datetimeFigureOut">
               <a:rPr lang="en-US" smtClean="0"/>
-              <a:t>9/1/2022</a:t>
+              <a:t>9/2/2022</a:t>
             </a:fld>
             <a:endParaRPr lang="en-US"/>
           </a:p>
@@ -8195,7 +8233,7 @@
           <a:p>
             <a:fld id="{5958763E-B898-436D-883D-03711491D54A}" type="datetimeFigureOut">
               <a:rPr lang="en-US" smtClean="0"/>
-              <a:t>9/1/2022</a:t>
+              <a:t>9/2/2022</a:t>
             </a:fld>
             <a:endParaRPr lang="en-US"/>
           </a:p>
@@ -8522,7 +8560,7 @@
             <a:fld id="{1C2D31DE-C454-491C-B5C3-F097855E3DF7}" type="datetime4">
               <a:rPr lang="en-US" smtClean="0"/>
               <a:pPr/>
-              <a:t>September 1, 2022</a:t>
+              <a:t>September 2, 2022</a:t>
             </a:fld>
             <a:endParaRPr lang="en-US" dirty="0"/>
           </a:p>
@@ -11674,7 +11712,7 @@
           <a:p>
             <a:fld id="{5958763E-B898-436D-883D-03711491D54A}" type="datetimeFigureOut">
               <a:rPr lang="en-US" smtClean="0"/>
-              <a:t>9/1/2022</a:t>
+              <a:t>9/2/2022</a:t>
             </a:fld>
             <a:endParaRPr lang="en-US"/>
           </a:p>
@@ -11798,7 +11836,7 @@
           <a:p>
             <a:fld id="{5958763E-B898-436D-883D-03711491D54A}" type="datetimeFigureOut">
               <a:rPr lang="en-US" smtClean="0"/>
-              <a:t>9/1/2022</a:t>
+              <a:t>9/2/2022</a:t>
             </a:fld>
             <a:endParaRPr lang="en-US"/>
           </a:p>
@@ -11922,7 +11960,7 @@
           <a:p>
             <a:fld id="{5958763E-B898-436D-883D-03711491D54A}" type="datetimeFigureOut">
               <a:rPr lang="en-US" smtClean="0"/>
-              <a:t>9/1/2022</a:t>
+              <a:t>9/2/2022</a:t>
             </a:fld>
             <a:endParaRPr lang="en-US"/>
           </a:p>
@@ -12046,7 +12084,7 @@
           <a:p>
             <a:fld id="{5958763E-B898-436D-883D-03711491D54A}" type="datetimeFigureOut">
               <a:rPr lang="en-US" smtClean="0"/>
-              <a:t>9/1/2022</a:t>
+              <a:t>9/2/2022</a:t>
             </a:fld>
             <a:endParaRPr lang="en-US"/>
           </a:p>
@@ -12170,7 +12208,7 @@
           <a:p>
             <a:fld id="{5958763E-B898-436D-883D-03711491D54A}" type="datetimeFigureOut">
               <a:rPr lang="en-US" smtClean="0"/>
-              <a:t>9/1/2022</a:t>
+              <a:t>9/2/2022</a:t>
             </a:fld>
             <a:endParaRPr lang="en-US"/>
           </a:p>
@@ -12294,7 +12332,7 @@
           <a:p>
             <a:fld id="{5958763E-B898-436D-883D-03711491D54A}" type="datetimeFigureOut">
               <a:rPr lang="en-US" smtClean="0"/>
-              <a:t>9/1/2022</a:t>
+              <a:t>9/2/2022</a:t>
             </a:fld>
             <a:endParaRPr lang="en-US"/>
           </a:p>
@@ -12418,7 +12456,7 @@
           <a:p>
             <a:fld id="{5958763E-B898-436D-883D-03711491D54A}" type="datetimeFigureOut">
               <a:rPr lang="en-US" smtClean="0"/>
-              <a:t>9/1/2022</a:t>
+              <a:t>9/2/2022</a:t>
             </a:fld>
             <a:endParaRPr lang="en-US"/>
           </a:p>
@@ -12542,7 +12580,7 @@
           <a:p>
             <a:fld id="{5958763E-B898-436D-883D-03711491D54A}" type="datetimeFigureOut">
               <a:rPr lang="en-US" smtClean="0"/>
-              <a:t>9/1/2022</a:t>
+              <a:t>9/2/2022</a:t>
             </a:fld>
             <a:endParaRPr lang="en-US"/>
           </a:p>
@@ -12675,7 +12713,7 @@
           <a:p>
             <a:fld id="{5958763E-B898-436D-883D-03711491D54A}" type="datetimeFigureOut">
               <a:rPr lang="en-US" smtClean="0"/>
-              <a:t>9/1/2022</a:t>
+              <a:t>9/2/2022</a:t>
             </a:fld>
             <a:endParaRPr lang="en-US"/>
           </a:p>
@@ -16014,7 +16052,7 @@
             <a:fld id="{1C2D31DE-C454-491C-B5C3-F097855E3DF7}" type="datetime4">
               <a:rPr lang="en-US" smtClean="0"/>
               <a:pPr/>
-              <a:t>September 1, 2022</a:t>
+              <a:t>September 2, 2022</a:t>
             </a:fld>
             <a:endParaRPr lang="en-US" dirty="0"/>
           </a:p>
@@ -28250,7 +28288,7 @@
           <a:p>
             <a:fld id="{5958763E-B898-436D-883D-03711491D54A}" type="datetimeFigureOut">
               <a:rPr lang="en-US" smtClean="0"/>
-              <a:t>9/1/2022</a:t>
+              <a:t>9/2/2022</a:t>
             </a:fld>
             <a:endParaRPr lang="en-US"/>
           </a:p>
@@ -28652,7 +28690,7 @@
           <a:p>
             <a:fld id="{5958763E-B898-436D-883D-03711491D54A}" type="datetimeFigureOut">
               <a:rPr lang="en-US" smtClean="0"/>
-              <a:t>9/1/2022</a:t>
+              <a:t>9/2/2022</a:t>
             </a:fld>
             <a:endParaRPr lang="en-US"/>
           </a:p>
@@ -28946,7 +28984,7 @@
           <a:p>
             <a:fld id="{5958763E-B898-436D-883D-03711491D54A}" type="datetimeFigureOut">
               <a:rPr lang="en-US" smtClean="0"/>
-              <a:t>9/1/2022</a:t>
+              <a:t>9/2/2022</a:t>
             </a:fld>
             <a:endParaRPr lang="en-US"/>
           </a:p>
@@ -29147,7 +29185,7 @@
           <a:p>
             <a:fld id="{5958763E-B898-436D-883D-03711491D54A}" type="datetimeFigureOut">
               <a:rPr lang="en-US" smtClean="0"/>
-              <a:t>9/1/2022</a:t>
+              <a:t>9/2/2022</a:t>
             </a:fld>
             <a:endParaRPr lang="en-US"/>
           </a:p>
@@ -29408,7 +29446,7 @@
           <a:p>
             <a:fld id="{5958763E-B898-436D-883D-03711491D54A}" type="datetimeFigureOut">
               <a:rPr lang="en-US" smtClean="0"/>
-              <a:t>9/1/2022</a:t>
+              <a:t>9/2/2022</a:t>
             </a:fld>
             <a:endParaRPr lang="en-US"/>
           </a:p>
@@ -29916,7 +29954,7 @@
           <a:p>
             <a:fld id="{5958763E-B898-436D-883D-03711491D54A}" type="datetimeFigureOut">
               <a:rPr lang="en-US" smtClean="0"/>
-              <a:t>9/1/2022</a:t>
+              <a:t>9/2/2022</a:t>
             </a:fld>
             <a:endParaRPr lang="en-US"/>
           </a:p>
@@ -30395,7 +30433,7 @@
           <a:p>
             <a:fld id="{5958763E-B898-436D-883D-03711491D54A}" type="datetimeFigureOut">
               <a:rPr lang="en-US" smtClean="0"/>
-              <a:t>9/1/2022</a:t>
+              <a:t>9/2/2022</a:t>
             </a:fld>
             <a:endParaRPr lang="en-US"/>
           </a:p>
@@ -31214,7 +31252,7 @@
           <a:p>
             <a:fld id="{5958763E-B898-436D-883D-03711491D54A}" type="datetimeFigureOut">
               <a:rPr lang="en-US" smtClean="0"/>
-              <a:t>9/1/2022</a:t>
+              <a:t>9/2/2022</a:t>
             </a:fld>
             <a:endParaRPr lang="en-US"/>
           </a:p>
@@ -31415,7 +31453,7 @@
           <a:p>
             <a:fld id="{5958763E-B898-436D-883D-03711491D54A}" type="datetimeFigureOut">
               <a:rPr lang="en-US" smtClean="0"/>
-              <a:t>9/1/2022</a:t>
+              <a:t>9/2/2022</a:t>
             </a:fld>
             <a:endParaRPr lang="en-US"/>
           </a:p>
@@ -31750,7 +31788,7 @@
           <a:p>
             <a:fld id="{5958763E-B898-436D-883D-03711491D54A}" type="datetimeFigureOut">
               <a:rPr lang="en-US" smtClean="0"/>
-              <a:t>9/1/2022</a:t>
+              <a:t>9/2/2022</a:t>
             </a:fld>
             <a:endParaRPr lang="en-US"/>
           </a:p>
@@ -31980,7 +32018,7 @@
           <a:p>
             <a:fld id="{5958763E-B898-436D-883D-03711491D54A}" type="datetimeFigureOut">
               <a:rPr lang="en-US" smtClean="0"/>
-              <a:t>9/1/2022</a:t>
+              <a:t>9/2/2022</a:t>
             </a:fld>
             <a:endParaRPr lang="en-US"/>
           </a:p>
@@ -32224,7 +32262,7 @@
           <a:p>
             <a:fld id="{5958763E-B898-436D-883D-03711491D54A}" type="datetimeFigureOut">
               <a:rPr lang="en-US" smtClean="0"/>
-              <a:t>9/1/2022</a:t>
+              <a:t>9/2/2022</a:t>
             </a:fld>
             <a:endParaRPr lang="en-US"/>
           </a:p>
@@ -35770,6 +35808,67 @@
 </p:sld>
 </file>
 
+<file path=ppt/slides/slide10.xml><?xml version="1.0" encoding="utf-8"?>
+<p:sld xmlns:a="http://schemas.openxmlformats.org/drawingml/2006/main" xmlns:r="http://schemas.openxmlformats.org/officeDocument/2006/relationships" xmlns:p="http://schemas.openxmlformats.org/presentationml/2006/main">
+  <p:cSld>
+    <p:spTree>
+      <p:nvGrpSpPr>
+        <p:cNvPr id="1" name=""/>
+        <p:cNvGrpSpPr/>
+        <p:nvPr/>
+      </p:nvGrpSpPr>
+      <p:grpSpPr>
+        <a:xfrm>
+          <a:off x="0" y="0"/>
+          <a:ext cx="0" cy="0"/>
+          <a:chOff x="0" y="0"/>
+          <a:chExt cx="0" cy="0"/>
+        </a:xfrm>
+      </p:grpSpPr>
+      <p:sp>
+        <p:nvSpPr>
+          <p:cNvPr id="2" name="Text Placeholder 1">
+            <a:extLst>
+              <a:ext uri="{FF2B5EF4-FFF2-40B4-BE49-F238E27FC236}">
+                <a16:creationId xmlns:a16="http://schemas.microsoft.com/office/drawing/2014/main" id="{B7A791CB-AA68-4769-B673-C015ECF3D832}"/>
+              </a:ext>
+            </a:extLst>
+          </p:cNvPr>
+          <p:cNvSpPr>
+            <a:spLocks noGrp="1"/>
+          </p:cNvSpPr>
+          <p:nvPr>
+            <p:ph type="body" sz="quarter" idx="10"/>
+          </p:nvPr>
+        </p:nvSpPr>
+        <p:spPr/>
+        <p:txBody>
+          <a:bodyPr/>
+          <a:lstStyle/>
+          <a:p>
+            <a:r>
+              <a:rPr lang="en-US"/>
+              <a:t>Questions?</a:t>
+            </a:r>
+          </a:p>
+        </p:txBody>
+      </p:sp>
+    </p:spTree>
+    <p:extLst>
+      <p:ext uri="{BB962C8B-B14F-4D97-AF65-F5344CB8AC3E}">
+        <p14:creationId xmlns:p14="http://schemas.microsoft.com/office/powerpoint/2010/main" val="2492034236"/>
+      </p:ext>
+    </p:extLst>
+  </p:cSld>
+  <p:clrMapOvr>
+    <a:masterClrMapping/>
+  </p:clrMapOvr>
+  <p:transition>
+    <p:fade/>
+  </p:transition>
+</p:sld>
+</file>
+
 <file path=ppt/slides/slide2.xml><?xml version="1.0" encoding="utf-8"?>
 <p:sld xmlns:a="http://schemas.openxmlformats.org/drawingml/2006/main" xmlns:r="http://schemas.openxmlformats.org/officeDocument/2006/relationships" xmlns:p="http://schemas.openxmlformats.org/presentationml/2006/main">
   <p:cSld>
@@ -35813,7 +35912,15 @@
             </a:r>
             <a:r>
               <a:rPr lang="en-US" b="0" cap="none" dirty="0"/>
-              <a:t> is the programming language of the web.</a:t>
+              <a:t> is the </a:t>
+            </a:r>
+            <a:r>
+              <a:rPr lang="en-US" b="0" i="1" cap="none" dirty="0"/>
+              <a:t>programming language </a:t>
+            </a:r>
+            <a:r>
+              <a:rPr lang="en-US" b="0" cap="none" dirty="0"/>
+              <a:t>of the web.</a:t>
             </a:r>
             <a:br>
               <a:rPr lang="en-US" b="0" cap="none" dirty="0"/>
@@ -36120,6 +36227,179 @@
       </p:grpSpPr>
       <p:sp>
         <p:nvSpPr>
+          <p:cNvPr id="9" name="Rectangle 8">
+            <a:extLst>
+              <a:ext uri="{FF2B5EF4-FFF2-40B4-BE49-F238E27FC236}">
+                <a16:creationId xmlns:a16="http://schemas.microsoft.com/office/drawing/2014/main" id="{33B4CCEC-FDAD-4D1E-8BB3-5A40A6735A1F}"/>
+              </a:ext>
+            </a:extLst>
+          </p:cNvPr>
+          <p:cNvSpPr/>
+          <p:nvPr/>
+        </p:nvSpPr>
+        <p:spPr bwMode="auto">
+          <a:xfrm>
+            <a:off x="6292493" y="1353764"/>
+            <a:ext cx="5518507" cy="1846636"/>
+          </a:xfrm>
+          <a:prstGeom prst="rect">
+            <a:avLst/>
+          </a:prstGeom>
+          <a:solidFill>
+            <a:schemeClr val="accent2">
+              <a:lumMod val="20000"/>
+              <a:lumOff val="80000"/>
+            </a:schemeClr>
+          </a:solidFill>
+          <a:ln w="12700">
+            <a:solidFill>
+              <a:schemeClr val="tx2"/>
+            </a:solidFill>
+            <a:miter lim="800000"/>
+            <a:headEnd type="none" w="med" len="med"/>
+            <a:tailEnd type="none" w="med" len="med"/>
+          </a:ln>
+          <a:effectLst/>
+        </p:spPr>
+        <p:style>
+          <a:lnRef idx="1">
+            <a:schemeClr val="accent2"/>
+          </a:lnRef>
+          <a:fillRef idx="3">
+            <a:schemeClr val="accent2"/>
+          </a:fillRef>
+          <a:effectRef idx="2">
+            <a:schemeClr val="accent2"/>
+          </a:effectRef>
+          <a:fontRef idx="minor">
+            <a:schemeClr val="lt1"/>
+          </a:fontRef>
+        </p:style>
+        <p:txBody>
+          <a:bodyPr rot="0" spcFirstLastPara="0" vertOverflow="overflow" horzOverflow="overflow" vert="horz" wrap="square" lIns="182880" tIns="146304" rIns="182880" bIns="146304" numCol="1" spcCol="0" rtlCol="0" fromWordArt="0" anchor="t" anchorCtr="0" forceAA="0" compatLnSpc="1">
+            <a:prstTxWarp prst="textNoShape">
+              <a:avLst/>
+            </a:prstTxWarp>
+            <a:noAutofit/>
+          </a:bodyPr>
+          <a:lstStyle/>
+          <a:p>
+            <a:pPr algn="ctr" defTabSz="932472" fontAlgn="base">
+              <a:lnSpc>
+                <a:spcPct val="90000"/>
+              </a:lnSpc>
+              <a:spcBef>
+                <a:spcPct val="0"/>
+              </a:spcBef>
+              <a:spcAft>
+                <a:spcPct val="0"/>
+              </a:spcAft>
+            </a:pPr>
+            <a:endParaRPr lang="en-US" sz="2400" dirty="0" err="1">
+              <a:gradFill>
+                <a:gsLst>
+                  <a:gs pos="0">
+                    <a:srgbClr val="FFFFFF"/>
+                  </a:gs>
+                  <a:gs pos="100000">
+                    <a:srgbClr val="FFFFFF"/>
+                  </a:gs>
+                </a:gsLst>
+                <a:lin ang="5400000" scaled="0"/>
+              </a:gradFill>
+              <a:ea typeface="Segoe UI" pitchFamily="34" charset="0"/>
+              <a:cs typeface="Segoe UI" pitchFamily="34" charset="0"/>
+            </a:endParaRPr>
+          </a:p>
+        </p:txBody>
+      </p:sp>
+      <p:sp>
+        <p:nvSpPr>
+          <p:cNvPr id="8" name="Rectangle 7">
+            <a:extLst>
+              <a:ext uri="{FF2B5EF4-FFF2-40B4-BE49-F238E27FC236}">
+                <a16:creationId xmlns:a16="http://schemas.microsoft.com/office/drawing/2014/main" id="{5D3FE4F1-F928-41BC-9225-613490A3C3C8}"/>
+              </a:ext>
+            </a:extLst>
+          </p:cNvPr>
+          <p:cNvSpPr/>
+          <p:nvPr/>
+        </p:nvSpPr>
+        <p:spPr bwMode="auto">
+          <a:xfrm>
+            <a:off x="266700" y="1353764"/>
+            <a:ext cx="5829300" cy="5161336"/>
+          </a:xfrm>
+          <a:prstGeom prst="rect">
+            <a:avLst/>
+          </a:prstGeom>
+          <a:solidFill>
+            <a:schemeClr val="accent5"/>
+          </a:solidFill>
+          <a:ln w="12700">
+            <a:solidFill>
+              <a:schemeClr val="tx2"/>
+            </a:solidFill>
+            <a:miter lim="800000"/>
+            <a:headEnd type="none" w="med" len="med"/>
+            <a:tailEnd type="none" w="med" len="med"/>
+          </a:ln>
+          <a:effectLst/>
+        </p:spPr>
+        <p:style>
+          <a:lnRef idx="1">
+            <a:schemeClr val="accent2"/>
+          </a:lnRef>
+          <a:fillRef idx="3">
+            <a:schemeClr val="accent2"/>
+          </a:fillRef>
+          <a:effectRef idx="2">
+            <a:schemeClr val="accent2"/>
+          </a:effectRef>
+          <a:fontRef idx="minor">
+            <a:schemeClr val="lt1"/>
+          </a:fontRef>
+        </p:style>
+        <p:txBody>
+          <a:bodyPr rot="0" spcFirstLastPara="0" vertOverflow="overflow" horzOverflow="overflow" vert="horz" wrap="square" lIns="182880" tIns="146304" rIns="182880" bIns="146304" numCol="1" spcCol="0" rtlCol="0" fromWordArt="0" anchor="t" anchorCtr="0" forceAA="0" compatLnSpc="1">
+            <a:prstTxWarp prst="textNoShape">
+              <a:avLst/>
+            </a:prstTxWarp>
+            <a:noAutofit/>
+          </a:bodyPr>
+          <a:lstStyle/>
+          <a:p>
+            <a:pPr algn="ctr" defTabSz="932472" fontAlgn="base">
+              <a:lnSpc>
+                <a:spcPct val="90000"/>
+              </a:lnSpc>
+              <a:spcBef>
+                <a:spcPct val="0"/>
+              </a:spcBef>
+              <a:spcAft>
+                <a:spcPct val="0"/>
+              </a:spcAft>
+            </a:pPr>
+            <a:endParaRPr lang="en-US" sz="2400" dirty="0" err="1">
+              <a:gradFill>
+                <a:gsLst>
+                  <a:gs pos="0">
+                    <a:srgbClr val="FFFFFF"/>
+                  </a:gs>
+                  <a:gs pos="100000">
+                    <a:srgbClr val="FFFFFF"/>
+                  </a:gs>
+                </a:gsLst>
+                <a:lin ang="5400000" scaled="0"/>
+              </a:gradFill>
+              <a:ea typeface="Segoe UI" pitchFamily="34" charset="0"/>
+              <a:cs typeface="Segoe UI" pitchFamily="34" charset="0"/>
+            </a:endParaRPr>
+          </a:p>
+        </p:txBody>
+      </p:sp>
+      <p:sp>
+        <p:nvSpPr>
           <p:cNvPr id="2" name="Title 1"/>
           <p:cNvSpPr>
             <a:spLocks noGrp="1"/>
@@ -36150,9 +36430,16 @@
             <p:ph idx="1"/>
           </p:nvPr>
         </p:nvSpPr>
-        <p:spPr/>
+        <p:spPr>
+          <a:xfrm>
+            <a:off x="381000" y="1943100"/>
+            <a:ext cx="5829300" cy="4572000"/>
+          </a:xfrm>
+        </p:spPr>
         <p:txBody>
-          <a:bodyPr/>
+          <a:bodyPr>
+            <a:normAutofit/>
+          </a:bodyPr>
           <a:lstStyle/>
           <a:p>
             <a:pPr marL="0" indent="0">
@@ -36183,7 +36470,131 @@
                 </a:solidFill>
                 <a:latin typeface="Consolas" panose="020B0609020204030204" pitchFamily="49" charset="0"/>
               </a:rPr>
-              <a:t>	&lt;head&gt;</a:t>
+              <a:t>  &lt;head&gt;</a:t>
+            </a:r>
+          </a:p>
+          <a:p>
+            <a:pPr marL="57150" indent="0">
+              <a:buNone/>
+            </a:pPr>
+            <a:r>
+              <a:rPr lang="en-US" b="0" dirty="0">
+                <a:solidFill>
+                  <a:srgbClr val="800000">
+                    <a:alpha val="50000"/>
+                  </a:srgbClr>
+                </a:solidFill>
+                <a:effectLst/>
+                <a:latin typeface="Consolas" panose="020B0609020204030204" pitchFamily="49" charset="0"/>
+              </a:rPr>
+              <a:t>    </a:t>
+            </a:r>
+            <a:r>
+              <a:rPr lang="en-US" b="0" dirty="0">
+                <a:solidFill>
+                  <a:srgbClr val="800000"/>
+                </a:solidFill>
+                <a:effectLst/>
+                <a:latin typeface="Consolas" panose="020B0609020204030204" pitchFamily="49" charset="0"/>
+              </a:rPr>
+              <a:t>&lt;script</a:t>
+            </a:r>
+            <a:r>
+              <a:rPr lang="en-US" b="0" dirty="0">
+                <a:solidFill>
+                  <a:srgbClr val="000000"/>
+                </a:solidFill>
+                <a:effectLst/>
+                <a:latin typeface="Consolas" panose="020B0609020204030204" pitchFamily="49" charset="0"/>
+              </a:rPr>
+              <a:t> </a:t>
+            </a:r>
+            <a:r>
+              <a:rPr lang="en-US" b="0" dirty="0" err="1">
+                <a:solidFill>
+                  <a:srgbClr val="FF0000"/>
+                </a:solidFill>
+                <a:effectLst/>
+                <a:latin typeface="Consolas" panose="020B0609020204030204" pitchFamily="49" charset="0"/>
+              </a:rPr>
+              <a:t>src</a:t>
+            </a:r>
+            <a:r>
+              <a:rPr lang="en-US" b="0" dirty="0">
+                <a:solidFill>
+                  <a:srgbClr val="000000"/>
+                </a:solidFill>
+                <a:effectLst/>
+                <a:latin typeface="Consolas" panose="020B0609020204030204" pitchFamily="49" charset="0"/>
+              </a:rPr>
+              <a:t>=</a:t>
+            </a:r>
+            <a:r>
+              <a:rPr lang="en-US" b="0" dirty="0">
+                <a:solidFill>
+                  <a:srgbClr val="0000FF"/>
+                </a:solidFill>
+                <a:effectLst/>
+                <a:latin typeface="Consolas" panose="020B0609020204030204" pitchFamily="49" charset="0"/>
+              </a:rPr>
+              <a:t>"script.js"</a:t>
+            </a:r>
+            <a:r>
+              <a:rPr lang="en-US" b="0" dirty="0">
+                <a:solidFill>
+                  <a:srgbClr val="800000"/>
+                </a:solidFill>
+                <a:effectLst/>
+                <a:latin typeface="Consolas" panose="020B0609020204030204" pitchFamily="49" charset="0"/>
+              </a:rPr>
+              <a:t>&gt;</a:t>
+            </a:r>
+          </a:p>
+          <a:p>
+            <a:pPr marL="57150" indent="0">
+              <a:buNone/>
+            </a:pPr>
+            <a:r>
+              <a:rPr lang="en-US" dirty="0">
+                <a:solidFill>
+                  <a:srgbClr val="800000"/>
+                </a:solidFill>
+                <a:latin typeface="Consolas" panose="020B0609020204030204" pitchFamily="49" charset="0"/>
+              </a:rPr>
+              <a:t>    </a:t>
+            </a:r>
+            <a:r>
+              <a:rPr lang="en-US" b="0" dirty="0">
+                <a:solidFill>
+                  <a:srgbClr val="800000"/>
+                </a:solidFill>
+                <a:effectLst/>
+                <a:latin typeface="Consolas" panose="020B0609020204030204" pitchFamily="49" charset="0"/>
+              </a:rPr>
+              <a:t>&lt;/script&gt;</a:t>
+            </a:r>
+            <a:endParaRPr lang="en-US" b="0" dirty="0">
+              <a:solidFill>
+                <a:srgbClr val="000000"/>
+              </a:solidFill>
+              <a:effectLst/>
+              <a:latin typeface="Consolas" panose="020B0609020204030204" pitchFamily="49" charset="0"/>
+            </a:endParaRPr>
+          </a:p>
+          <a:p>
+            <a:pPr marL="0" indent="0">
+              <a:buNone/>
+            </a:pPr>
+            <a:r>
+              <a:rPr lang="en-US" dirty="0">
+                <a:solidFill>
+                  <a:srgbClr val="800000">
+                    <a:alpha val="50000"/>
+                  </a:srgbClr>
+                </a:solidFill>
+                <a:latin typeface="Consolas" panose="020B0609020204030204" pitchFamily="49" charset="0"/>
+              </a:rPr>
+              <a:t>  &lt;/head&gt;</a:t>
             </a:r>
           </a:p>
           <a:p>
@@ -36199,62 +36610,7 @@
                 </a:solidFill>
                 <a:latin typeface="Consolas" panose="020B0609020204030204" pitchFamily="49" charset="0"/>
               </a:rPr>
-              <a:t>		</a:t>
-            </a:r>
-            <a:r>
-              <a:rPr lang="en-US" dirty="0">
-                <a:solidFill>
-                  <a:srgbClr val="800000"/>
-                </a:solidFill>
-                <a:latin typeface="Consolas" panose="020B0609020204030204" pitchFamily="49" charset="0"/>
-              </a:rPr>
-              <a:t>&lt;script&gt;</a:t>
-            </a:r>
-          </a:p>
-          <a:p>
-            <a:pPr marL="0" indent="0">
-              <a:buNone/>
-            </a:pPr>
-            <a:r>
-              <a:rPr lang="en-US" dirty="0">
-                <a:solidFill>
-                  <a:srgbClr val="000000"/>
-                </a:solidFill>
-                <a:latin typeface="Consolas" panose="020B0609020204030204" pitchFamily="49" charset="0"/>
-              </a:rPr>
-              <a:t>			alert(</a:t>
-            </a:r>
-            <a:r>
-              <a:rPr lang="en-US" dirty="0">
-                <a:solidFill>
-                  <a:srgbClr val="A31515"/>
-                </a:solidFill>
-                <a:latin typeface="Consolas" panose="020B0609020204030204" pitchFamily="49" charset="0"/>
-              </a:rPr>
-              <a:t>"Hello, world!"</a:t>
-            </a:r>
-            <a:r>
-              <a:rPr lang="en-US" dirty="0">
-                <a:solidFill>
-                  <a:srgbClr val="000000"/>
-                </a:solidFill>
-                <a:latin typeface="Consolas" panose="020B0609020204030204" pitchFamily="49" charset="0"/>
-              </a:rPr>
-              <a:t>);</a:t>
-            </a:r>
-          </a:p>
-          <a:p>
-            <a:pPr marL="0" indent="0">
-              <a:buNone/>
-            </a:pPr>
-            <a:r>
-              <a:rPr lang="en-US" dirty="0">
-                <a:solidFill>
-                  <a:srgbClr val="800000"/>
-                </a:solidFill>
-                <a:latin typeface="Consolas" panose="020B0609020204030204" pitchFamily="49" charset="0"/>
-              </a:rPr>
-              <a:t>		&lt;/script&gt;</a:t>
+              <a:t>  &lt;body&gt;</a:t>
             </a:r>
           </a:p>
           <a:p>
@@ -36270,39 +36626,7 @@
                 </a:solidFill>
                 <a:latin typeface="Consolas" panose="020B0609020204030204" pitchFamily="49" charset="0"/>
               </a:rPr>
-              <a:t>	&lt;/head&gt;</a:t>
-            </a:r>
-          </a:p>
-          <a:p>
-            <a:pPr marL="0" indent="0">
-              <a:buNone/>
-            </a:pPr>
-            <a:r>
-              <a:rPr lang="en-US" dirty="0">
-                <a:solidFill>
-                  <a:srgbClr val="800000">
-                    <a:alpha val="50000"/>
-                  </a:srgbClr>
-                </a:solidFill>
-                <a:latin typeface="Consolas" panose="020B0609020204030204" pitchFamily="49" charset="0"/>
-              </a:rPr>
-              <a:t>	&lt;body&gt;</a:t>
-            </a:r>
-          </a:p>
-          <a:p>
-            <a:pPr marL="0" indent="0">
-              <a:buNone/>
-            </a:pPr>
-            <a:r>
-              <a:rPr lang="en-US" dirty="0">
-                <a:solidFill>
-                  <a:srgbClr val="800000">
-                    <a:alpha val="50000"/>
-                  </a:srgbClr>
-                </a:solidFill>
-                <a:latin typeface="Consolas" panose="020B0609020204030204" pitchFamily="49" charset="0"/>
-              </a:rPr>
-              <a:t>	&lt;/body&gt;</a:t>
+              <a:t>  &lt;/body&gt;</a:t>
             </a:r>
           </a:p>
           <a:p>
@@ -36323,6 +36647,390 @@
           </a:p>
         </p:txBody>
       </p:sp>
+      <p:sp>
+        <p:nvSpPr>
+          <p:cNvPr id="4" name="TextBox 3">
+            <a:extLst>
+              <a:ext uri="{FF2B5EF4-FFF2-40B4-BE49-F238E27FC236}">
+                <a16:creationId xmlns:a16="http://schemas.microsoft.com/office/drawing/2014/main" id="{06877F12-8B7E-466D-A493-D659916BBA69}"/>
+              </a:ext>
+            </a:extLst>
+          </p:cNvPr>
+          <p:cNvSpPr txBox="1"/>
+          <p:nvPr/>
+        </p:nvSpPr>
+        <p:spPr>
+          <a:xfrm>
+            <a:off x="266700" y="1353764"/>
+            <a:ext cx="1906612" cy="627864"/>
+          </a:xfrm>
+          <a:prstGeom prst="rect">
+            <a:avLst/>
+          </a:prstGeom>
+          <a:noFill/>
+        </p:spPr>
+        <p:txBody>
+          <a:bodyPr wrap="none" lIns="182880" tIns="146304" rIns="182880" bIns="146304" rtlCol="0">
+            <a:spAutoFit/>
+          </a:bodyPr>
+          <a:lstStyle/>
+          <a:p>
+            <a:pPr>
+              <a:lnSpc>
+                <a:spcPct val="90000"/>
+              </a:lnSpc>
+              <a:spcAft>
+                <a:spcPts val="600"/>
+              </a:spcAft>
+            </a:pPr>
+            <a:r>
+              <a:rPr lang="en-US" sz="2400" b="1" dirty="0">
+                <a:gradFill>
+                  <a:gsLst>
+                    <a:gs pos="2917">
+                      <a:schemeClr val="tx1"/>
+                    </a:gs>
+                    <a:gs pos="30000">
+                      <a:schemeClr val="tx1"/>
+                    </a:gs>
+                  </a:gsLst>
+                  <a:lin ang="5400000" scaled="0"/>
+                </a:gradFill>
+              </a:rPr>
+              <a:t>index.html</a:t>
+            </a:r>
+          </a:p>
+        </p:txBody>
+      </p:sp>
+      <p:sp>
+        <p:nvSpPr>
+          <p:cNvPr id="6" name="TextBox 5">
+            <a:extLst>
+              <a:ext uri="{FF2B5EF4-FFF2-40B4-BE49-F238E27FC236}">
+                <a16:creationId xmlns:a16="http://schemas.microsoft.com/office/drawing/2014/main" id="{E487B0F7-946A-4CFC-9C01-2C37E0660970}"/>
+              </a:ext>
+            </a:extLst>
+          </p:cNvPr>
+          <p:cNvSpPr txBox="1"/>
+          <p:nvPr/>
+        </p:nvSpPr>
+        <p:spPr>
+          <a:xfrm>
+            <a:off x="6324600" y="2171700"/>
+            <a:ext cx="5392220" cy="584775"/>
+          </a:xfrm>
+          <a:prstGeom prst="rect">
+            <a:avLst/>
+          </a:prstGeom>
+          <a:noFill/>
+        </p:spPr>
+        <p:txBody>
+          <a:bodyPr wrap="square">
+            <a:spAutoFit/>
+          </a:bodyPr>
+          <a:lstStyle/>
+          <a:p>
+            <a:r>
+              <a:rPr lang="en-US" sz="3200" b="0" dirty="0">
+                <a:solidFill>
+                  <a:srgbClr val="795E26"/>
+                </a:solidFill>
+                <a:effectLst/>
+                <a:latin typeface="Consolas" panose="020B0609020204030204" pitchFamily="49" charset="0"/>
+              </a:rPr>
+              <a:t>alert</a:t>
+            </a:r>
+            <a:r>
+              <a:rPr lang="en-US" sz="3200" b="0" dirty="0">
+                <a:solidFill>
+                  <a:srgbClr val="000000"/>
+                </a:solidFill>
+                <a:effectLst/>
+                <a:latin typeface="Consolas" panose="020B0609020204030204" pitchFamily="49" charset="0"/>
+              </a:rPr>
+              <a:t>(</a:t>
+            </a:r>
+            <a:r>
+              <a:rPr lang="en-US" sz="3200" b="0" dirty="0">
+                <a:solidFill>
+                  <a:srgbClr val="A31515"/>
+                </a:solidFill>
+                <a:effectLst/>
+                <a:latin typeface="Consolas" panose="020B0609020204030204" pitchFamily="49" charset="0"/>
+              </a:rPr>
+              <a:t>"Hello, world!"</a:t>
+            </a:r>
+            <a:r>
+              <a:rPr lang="en-US" sz="3200" b="0" dirty="0">
+                <a:solidFill>
+                  <a:srgbClr val="000000"/>
+                </a:solidFill>
+                <a:effectLst/>
+                <a:latin typeface="Consolas" panose="020B0609020204030204" pitchFamily="49" charset="0"/>
+              </a:rPr>
+              <a:t>);</a:t>
+            </a:r>
+          </a:p>
+        </p:txBody>
+      </p:sp>
+      <p:sp>
+        <p:nvSpPr>
+          <p:cNvPr id="7" name="TextBox 6">
+            <a:extLst>
+              <a:ext uri="{FF2B5EF4-FFF2-40B4-BE49-F238E27FC236}">
+                <a16:creationId xmlns:a16="http://schemas.microsoft.com/office/drawing/2014/main" id="{94662BDC-4F73-48A3-8566-F73166FC0FFB}"/>
+              </a:ext>
+            </a:extLst>
+          </p:cNvPr>
+          <p:cNvSpPr txBox="1"/>
+          <p:nvPr/>
+        </p:nvSpPr>
+        <p:spPr>
+          <a:xfrm>
+            <a:off x="6210300" y="1353764"/>
+            <a:ext cx="1549142" cy="627864"/>
+          </a:xfrm>
+          <a:prstGeom prst="rect">
+            <a:avLst/>
+          </a:prstGeom>
+          <a:noFill/>
+        </p:spPr>
+        <p:txBody>
+          <a:bodyPr wrap="none" lIns="182880" tIns="146304" rIns="182880" bIns="146304" rtlCol="0">
+            <a:spAutoFit/>
+          </a:bodyPr>
+          <a:lstStyle/>
+          <a:p>
+            <a:pPr>
+              <a:lnSpc>
+                <a:spcPct val="90000"/>
+              </a:lnSpc>
+              <a:spcAft>
+                <a:spcPts val="600"/>
+              </a:spcAft>
+            </a:pPr>
+            <a:r>
+              <a:rPr lang="en-US" sz="2400" b="1" dirty="0">
+                <a:gradFill>
+                  <a:gsLst>
+                    <a:gs pos="2917">
+                      <a:schemeClr val="tx1"/>
+                    </a:gs>
+                    <a:gs pos="30000">
+                      <a:schemeClr val="tx1"/>
+                    </a:gs>
+                  </a:gsLst>
+                  <a:lin ang="5400000" scaled="0"/>
+                </a:gradFill>
+              </a:rPr>
+              <a:t>script.js</a:t>
+            </a:r>
+          </a:p>
+        </p:txBody>
+      </p:sp>
+      <p:cxnSp>
+        <p:nvCxnSpPr>
+          <p:cNvPr id="11" name="Connector: Elbow 10">
+            <a:extLst>
+              <a:ext uri="{FF2B5EF4-FFF2-40B4-BE49-F238E27FC236}">
+                <a16:creationId xmlns:a16="http://schemas.microsoft.com/office/drawing/2014/main" id="{D2CCF584-EF29-4529-B034-56AA8938EBE6}"/>
+              </a:ext>
+            </a:extLst>
+          </p:cNvPr>
+          <p:cNvCxnSpPr>
+            <a:cxnSpLocks/>
+            <a:endCxn id="7" idx="1"/>
+          </p:cNvCxnSpPr>
+          <p:nvPr/>
+        </p:nvCxnSpPr>
+        <p:spPr>
+          <a:xfrm rot="5400000" flipH="1" flipV="1">
+            <a:off x="4957780" y="1777216"/>
+            <a:ext cx="1362040" cy="1143000"/>
+          </a:xfrm>
+          <a:prstGeom prst="bentConnector2">
+            <a:avLst/>
+          </a:prstGeom>
+          <a:ln w="76200">
+            <a:miter lim="800000"/>
+            <a:headEnd type="none"/>
+            <a:tailEnd type="triangle"/>
+          </a:ln>
+        </p:spPr>
+        <p:style>
+          <a:lnRef idx="1">
+            <a:schemeClr val="dk1"/>
+          </a:lnRef>
+          <a:fillRef idx="0">
+            <a:schemeClr val="dk1"/>
+          </a:fillRef>
+          <a:effectRef idx="0">
+            <a:schemeClr val="dk1"/>
+          </a:effectRef>
+          <a:fontRef idx="minor">
+            <a:schemeClr val="tx1"/>
+          </a:fontRef>
+        </p:style>
+      </p:cxnSp>
+      <p:sp>
+        <p:nvSpPr>
+          <p:cNvPr id="17" name="Rectangle 16">
+            <a:extLst>
+              <a:ext uri="{FF2B5EF4-FFF2-40B4-BE49-F238E27FC236}">
+                <a16:creationId xmlns:a16="http://schemas.microsoft.com/office/drawing/2014/main" id="{1A5D11BA-E33F-4420-B43A-E05EA6BD62DD}"/>
+              </a:ext>
+            </a:extLst>
+          </p:cNvPr>
+          <p:cNvSpPr/>
+          <p:nvPr/>
+        </p:nvSpPr>
+        <p:spPr bwMode="auto">
+          <a:xfrm>
+            <a:off x="6292493" y="3429000"/>
+            <a:ext cx="5518507" cy="3086100"/>
+          </a:xfrm>
+          <a:prstGeom prst="rect">
+            <a:avLst/>
+          </a:prstGeom>
+          <a:solidFill>
+            <a:schemeClr val="accent2">
+              <a:lumMod val="75000"/>
+            </a:schemeClr>
+          </a:solidFill>
+          <a:ln w="12700">
+            <a:solidFill>
+              <a:schemeClr val="tx2"/>
+            </a:solidFill>
+            <a:miter lim="800000"/>
+            <a:headEnd type="none" w="med" len="med"/>
+            <a:tailEnd type="none" w="med" len="med"/>
+          </a:ln>
+          <a:effectLst/>
+        </p:spPr>
+        <p:style>
+          <a:lnRef idx="1">
+            <a:schemeClr val="accent2"/>
+          </a:lnRef>
+          <a:fillRef idx="3">
+            <a:schemeClr val="accent2"/>
+          </a:fillRef>
+          <a:effectRef idx="2">
+            <a:schemeClr val="accent2"/>
+          </a:effectRef>
+          <a:fontRef idx="minor">
+            <a:schemeClr val="lt1"/>
+          </a:fontRef>
+        </p:style>
+        <p:txBody>
+          <a:bodyPr rot="0" spcFirstLastPara="0" vertOverflow="overflow" horzOverflow="overflow" vert="horz" wrap="square" lIns="182880" tIns="146304" rIns="182880" bIns="146304" numCol="1" spcCol="0" rtlCol="0" fromWordArt="0" anchor="t" anchorCtr="0" forceAA="0" compatLnSpc="1">
+            <a:prstTxWarp prst="textNoShape">
+              <a:avLst/>
+            </a:prstTxWarp>
+            <a:noAutofit/>
+          </a:bodyPr>
+          <a:lstStyle/>
+          <a:p>
+            <a:pPr algn="ctr" defTabSz="932472" fontAlgn="base">
+              <a:lnSpc>
+                <a:spcPct val="90000"/>
+              </a:lnSpc>
+              <a:spcBef>
+                <a:spcPct val="0"/>
+              </a:spcBef>
+              <a:spcAft>
+                <a:spcPct val="0"/>
+              </a:spcAft>
+            </a:pPr>
+            <a:r>
+              <a:rPr lang="en-US" sz="3600" b="1" i="1" dirty="0">
+                <a:gradFill>
+                  <a:gsLst>
+                    <a:gs pos="0">
+                      <a:srgbClr val="FFFFFF"/>
+                    </a:gs>
+                    <a:gs pos="100000">
+                      <a:srgbClr val="FFFFFF"/>
+                    </a:gs>
+                  </a:gsLst>
+                  <a:lin ang="5400000" scaled="0"/>
+                </a:gradFill>
+                <a:ea typeface="Segoe UI" pitchFamily="34" charset="0"/>
+                <a:cs typeface="Segoe UI" pitchFamily="34" charset="0"/>
+              </a:rPr>
+              <a:t>What happens when this page loads?</a:t>
+            </a:r>
+          </a:p>
+          <a:p>
+            <a:pPr algn="ctr" defTabSz="932472" fontAlgn="base">
+              <a:lnSpc>
+                <a:spcPct val="90000"/>
+              </a:lnSpc>
+              <a:spcBef>
+                <a:spcPct val="0"/>
+              </a:spcBef>
+              <a:spcAft>
+                <a:spcPct val="0"/>
+              </a:spcAft>
+            </a:pPr>
+            <a:endParaRPr lang="en-US" sz="3600" b="1" i="1" dirty="0">
+              <a:gradFill>
+                <a:gsLst>
+                  <a:gs pos="0">
+                    <a:srgbClr val="FFFFFF"/>
+                  </a:gs>
+                  <a:gs pos="100000">
+                    <a:srgbClr val="FFFFFF"/>
+                  </a:gs>
+                </a:gsLst>
+                <a:lin ang="5400000" scaled="0"/>
+              </a:gradFill>
+              <a:ea typeface="Segoe UI" pitchFamily="34" charset="0"/>
+              <a:cs typeface="Segoe UI" pitchFamily="34" charset="0"/>
+            </a:endParaRPr>
+          </a:p>
+          <a:p>
+            <a:pPr algn="ctr" defTabSz="932472" fontAlgn="base">
+              <a:lnSpc>
+                <a:spcPct val="90000"/>
+              </a:lnSpc>
+              <a:spcBef>
+                <a:spcPct val="0"/>
+              </a:spcBef>
+              <a:spcAft>
+                <a:spcPct val="0"/>
+              </a:spcAft>
+            </a:pPr>
+            <a:r>
+              <a:rPr lang="en-US" sz="3600" b="1" dirty="0">
+                <a:solidFill>
+                  <a:srgbClr val="FFC000"/>
+                </a:solidFill>
+                <a:ea typeface="Segoe UI" pitchFamily="34" charset="0"/>
+                <a:cs typeface="Segoe UI" pitchFamily="34" charset="0"/>
+              </a:rPr>
+              <a:t>Hello, world!</a:t>
+            </a:r>
+            <a:r>
+              <a:rPr lang="en-US" sz="3600" dirty="0">
+                <a:gradFill>
+                  <a:gsLst>
+                    <a:gs pos="0">
+                      <a:srgbClr val="FFFFFF"/>
+                    </a:gs>
+                    <a:gs pos="100000">
+                      <a:srgbClr val="FFFFFF"/>
+                    </a:gs>
+                  </a:gsLst>
+                  <a:lin ang="5400000" scaled="0"/>
+                </a:gradFill>
+                <a:ea typeface="Segoe UI" pitchFamily="34" charset="0"/>
+                <a:cs typeface="Segoe UI" pitchFamily="34" charset="0"/>
+              </a:rPr>
+              <a:t> appears in a pop-up message</a:t>
+            </a:r>
+          </a:p>
+        </p:txBody>
+      </p:sp>
     </p:spTree>
     <p:extLst>
       <p:ext uri="{BB962C8B-B14F-4D97-AF65-F5344CB8AC3E}">
@@ -36336,6 +37044,749 @@
   <p:transition>
     <p:fade/>
   </p:transition>
+  <p:timing>
+    <p:tnLst>
+      <p:par>
+        <p:cTn id="1" dur="indefinite" restart="never" nodeType="tmRoot">
+          <p:childTnLst>
+            <p:seq concurrent="1" nextAc="seek">
+              <p:cTn id="2" dur="indefinite" nodeType="mainSeq">
+                <p:childTnLst>
+                  <p:par>
+                    <p:cTn id="3" fill="hold">
+                      <p:stCondLst>
+                        <p:cond delay="indefinite"/>
+                      </p:stCondLst>
+                      <p:childTnLst>
+                        <p:par>
+                          <p:cTn id="4" fill="hold">
+                            <p:stCondLst>
+                              <p:cond delay="0"/>
+                            </p:stCondLst>
+                            <p:childTnLst>
+                              <p:par>
+                                <p:cTn id="5" presetID="10" presetClass="entr" presetSubtype="0" fill="hold" grpId="0" nodeType="clickEffect">
+                                  <p:stCondLst>
+                                    <p:cond delay="0"/>
+                                  </p:stCondLst>
+                                  <p:childTnLst>
+                                    <p:set>
+                                      <p:cBhvr>
+                                        <p:cTn id="6" dur="1" fill="hold">
+                                          <p:stCondLst>
+                                            <p:cond delay="0"/>
+                                          </p:stCondLst>
+                                        </p:cTn>
+                                        <p:tgtEl>
+                                          <p:spTgt spid="8"/>
+                                        </p:tgtEl>
+                                        <p:attrNameLst>
+                                          <p:attrName>style.visibility</p:attrName>
+                                        </p:attrNameLst>
+                                      </p:cBhvr>
+                                      <p:to>
+                                        <p:strVal val="visible"/>
+                                      </p:to>
+                                    </p:set>
+                                    <p:animEffect transition="in" filter="fade">
+                                      <p:cBhvr>
+                                        <p:cTn id="7" dur="500"/>
+                                        <p:tgtEl>
+                                          <p:spTgt spid="8"/>
+                                        </p:tgtEl>
+                                      </p:cBhvr>
+                                    </p:animEffect>
+                                  </p:childTnLst>
+                                </p:cTn>
+                              </p:par>
+                              <p:par>
+                                <p:cTn id="8" presetID="10" presetClass="entr" presetSubtype="0" fill="hold" grpId="0" nodeType="withEffect">
+                                  <p:stCondLst>
+                                    <p:cond delay="0"/>
+                                  </p:stCondLst>
+                                  <p:childTnLst>
+                                    <p:set>
+                                      <p:cBhvr>
+                                        <p:cTn id="9" dur="1" fill="hold">
+                                          <p:stCondLst>
+                                            <p:cond delay="0"/>
+                                          </p:stCondLst>
+                                        </p:cTn>
+                                        <p:tgtEl>
+                                          <p:spTgt spid="4"/>
+                                        </p:tgtEl>
+                                        <p:attrNameLst>
+                                          <p:attrName>style.visibility</p:attrName>
+                                        </p:attrNameLst>
+                                      </p:cBhvr>
+                                      <p:to>
+                                        <p:strVal val="visible"/>
+                                      </p:to>
+                                    </p:set>
+                                    <p:animEffect transition="in" filter="fade">
+                                      <p:cBhvr>
+                                        <p:cTn id="10" dur="500"/>
+                                        <p:tgtEl>
+                                          <p:spTgt spid="4"/>
+                                        </p:tgtEl>
+                                      </p:cBhvr>
+                                    </p:animEffect>
+                                  </p:childTnLst>
+                                </p:cTn>
+                              </p:par>
+                              <p:par>
+                                <p:cTn id="11" presetID="10" presetClass="entr" presetSubtype="0" fill="hold" grpId="0" nodeType="withEffect">
+                                  <p:stCondLst>
+                                    <p:cond delay="0"/>
+                                  </p:stCondLst>
+                                  <p:childTnLst>
+                                    <p:set>
+                                      <p:cBhvr>
+                                        <p:cTn id="12" dur="1" fill="hold">
+                                          <p:stCondLst>
+                                            <p:cond delay="0"/>
+                                          </p:stCondLst>
+                                        </p:cTn>
+                                        <p:tgtEl>
+                                          <p:spTgt spid="3">
+                                            <p:txEl>
+                                              <p:pRg st="0" end="0"/>
+                                            </p:txEl>
+                                          </p:spTgt>
+                                        </p:tgtEl>
+                                        <p:attrNameLst>
+                                          <p:attrName>style.visibility</p:attrName>
+                                        </p:attrNameLst>
+                                      </p:cBhvr>
+                                      <p:to>
+                                        <p:strVal val="visible"/>
+                                      </p:to>
+                                    </p:set>
+                                    <p:animEffect transition="in" filter="fade">
+                                      <p:cBhvr>
+                                        <p:cTn id="13" dur="500"/>
+                                        <p:tgtEl>
+                                          <p:spTgt spid="3">
+                                            <p:txEl>
+                                              <p:pRg st="0" end="0"/>
+                                            </p:txEl>
+                                          </p:spTgt>
+                                        </p:tgtEl>
+                                      </p:cBhvr>
+                                    </p:animEffect>
+                                  </p:childTnLst>
+                                </p:cTn>
+                              </p:par>
+                              <p:par>
+                                <p:cTn id="14" presetID="10" presetClass="entr" presetSubtype="0" fill="hold" grpId="0" nodeType="withEffect">
+                                  <p:stCondLst>
+                                    <p:cond delay="0"/>
+                                  </p:stCondLst>
+                                  <p:childTnLst>
+                                    <p:set>
+                                      <p:cBhvr>
+                                        <p:cTn id="15" dur="1" fill="hold">
+                                          <p:stCondLst>
+                                            <p:cond delay="0"/>
+                                          </p:stCondLst>
+                                        </p:cTn>
+                                        <p:tgtEl>
+                                          <p:spTgt spid="3">
+                                            <p:txEl>
+                                              <p:pRg st="1" end="1"/>
+                                            </p:txEl>
+                                          </p:spTgt>
+                                        </p:tgtEl>
+                                        <p:attrNameLst>
+                                          <p:attrName>style.visibility</p:attrName>
+                                        </p:attrNameLst>
+                                      </p:cBhvr>
+                                      <p:to>
+                                        <p:strVal val="visible"/>
+                                      </p:to>
+                                    </p:set>
+                                    <p:animEffect transition="in" filter="fade">
+                                      <p:cBhvr>
+                                        <p:cTn id="16" dur="500"/>
+                                        <p:tgtEl>
+                                          <p:spTgt spid="3">
+                                            <p:txEl>
+                                              <p:pRg st="1" end="1"/>
+                                            </p:txEl>
+                                          </p:spTgt>
+                                        </p:tgtEl>
+                                      </p:cBhvr>
+                                    </p:animEffect>
+                                  </p:childTnLst>
+                                </p:cTn>
+                              </p:par>
+                              <p:par>
+                                <p:cTn id="17" presetID="10" presetClass="entr" presetSubtype="0" fill="hold" grpId="0" nodeType="withEffect">
+                                  <p:stCondLst>
+                                    <p:cond delay="0"/>
+                                  </p:stCondLst>
+                                  <p:childTnLst>
+                                    <p:set>
+                                      <p:cBhvr>
+                                        <p:cTn id="18" dur="1" fill="hold">
+                                          <p:stCondLst>
+                                            <p:cond delay="0"/>
+                                          </p:stCondLst>
+                                        </p:cTn>
+                                        <p:tgtEl>
+                                          <p:spTgt spid="3">
+                                            <p:txEl>
+                                              <p:pRg st="2" end="2"/>
+                                            </p:txEl>
+                                          </p:spTgt>
+                                        </p:tgtEl>
+                                        <p:attrNameLst>
+                                          <p:attrName>style.visibility</p:attrName>
+                                        </p:attrNameLst>
+                                      </p:cBhvr>
+                                      <p:to>
+                                        <p:strVal val="visible"/>
+                                      </p:to>
+                                    </p:set>
+                                    <p:animEffect transition="in" filter="fade">
+                                      <p:cBhvr>
+                                        <p:cTn id="19" dur="500"/>
+                                        <p:tgtEl>
+                                          <p:spTgt spid="3">
+                                            <p:txEl>
+                                              <p:pRg st="2" end="2"/>
+                                            </p:txEl>
+                                          </p:spTgt>
+                                        </p:tgtEl>
+                                      </p:cBhvr>
+                                    </p:animEffect>
+                                  </p:childTnLst>
+                                </p:cTn>
+                              </p:par>
+                              <p:par>
+                                <p:cTn id="20" presetID="10" presetClass="entr" presetSubtype="0" fill="hold" grpId="0" nodeType="withEffect">
+                                  <p:stCondLst>
+                                    <p:cond delay="0"/>
+                                  </p:stCondLst>
+                                  <p:childTnLst>
+                                    <p:set>
+                                      <p:cBhvr>
+                                        <p:cTn id="21" dur="1" fill="hold">
+                                          <p:stCondLst>
+                                            <p:cond delay="0"/>
+                                          </p:stCondLst>
+                                        </p:cTn>
+                                        <p:tgtEl>
+                                          <p:spTgt spid="3">
+                                            <p:txEl>
+                                              <p:pRg st="3" end="3"/>
+                                            </p:txEl>
+                                          </p:spTgt>
+                                        </p:tgtEl>
+                                        <p:attrNameLst>
+                                          <p:attrName>style.visibility</p:attrName>
+                                        </p:attrNameLst>
+                                      </p:cBhvr>
+                                      <p:to>
+                                        <p:strVal val="visible"/>
+                                      </p:to>
+                                    </p:set>
+                                    <p:animEffect transition="in" filter="fade">
+                                      <p:cBhvr>
+                                        <p:cTn id="22" dur="500"/>
+                                        <p:tgtEl>
+                                          <p:spTgt spid="3">
+                                            <p:txEl>
+                                              <p:pRg st="3" end="3"/>
+                                            </p:txEl>
+                                          </p:spTgt>
+                                        </p:tgtEl>
+                                      </p:cBhvr>
+                                    </p:animEffect>
+                                  </p:childTnLst>
+                                </p:cTn>
+                              </p:par>
+                              <p:par>
+                                <p:cTn id="23" presetID="10" presetClass="entr" presetSubtype="0" fill="hold" grpId="0" nodeType="withEffect">
+                                  <p:stCondLst>
+                                    <p:cond delay="0"/>
+                                  </p:stCondLst>
+                                  <p:childTnLst>
+                                    <p:set>
+                                      <p:cBhvr>
+                                        <p:cTn id="24" dur="1" fill="hold">
+                                          <p:stCondLst>
+                                            <p:cond delay="0"/>
+                                          </p:stCondLst>
+                                        </p:cTn>
+                                        <p:tgtEl>
+                                          <p:spTgt spid="3">
+                                            <p:txEl>
+                                              <p:pRg st="4" end="4"/>
+                                            </p:txEl>
+                                          </p:spTgt>
+                                        </p:tgtEl>
+                                        <p:attrNameLst>
+                                          <p:attrName>style.visibility</p:attrName>
+                                        </p:attrNameLst>
+                                      </p:cBhvr>
+                                      <p:to>
+                                        <p:strVal val="visible"/>
+                                      </p:to>
+                                    </p:set>
+                                    <p:animEffect transition="in" filter="fade">
+                                      <p:cBhvr>
+                                        <p:cTn id="25" dur="500"/>
+                                        <p:tgtEl>
+                                          <p:spTgt spid="3">
+                                            <p:txEl>
+                                              <p:pRg st="4" end="4"/>
+                                            </p:txEl>
+                                          </p:spTgt>
+                                        </p:tgtEl>
+                                      </p:cBhvr>
+                                    </p:animEffect>
+                                  </p:childTnLst>
+                                </p:cTn>
+                              </p:par>
+                              <p:par>
+                                <p:cTn id="26" presetID="10" presetClass="entr" presetSubtype="0" fill="hold" grpId="0" nodeType="withEffect">
+                                  <p:stCondLst>
+                                    <p:cond delay="0"/>
+                                  </p:stCondLst>
+                                  <p:childTnLst>
+                                    <p:set>
+                                      <p:cBhvr>
+                                        <p:cTn id="27" dur="1" fill="hold">
+                                          <p:stCondLst>
+                                            <p:cond delay="0"/>
+                                          </p:stCondLst>
+                                        </p:cTn>
+                                        <p:tgtEl>
+                                          <p:spTgt spid="3">
+                                            <p:txEl>
+                                              <p:pRg st="5" end="5"/>
+                                            </p:txEl>
+                                          </p:spTgt>
+                                        </p:tgtEl>
+                                        <p:attrNameLst>
+                                          <p:attrName>style.visibility</p:attrName>
+                                        </p:attrNameLst>
+                                      </p:cBhvr>
+                                      <p:to>
+                                        <p:strVal val="visible"/>
+                                      </p:to>
+                                    </p:set>
+                                    <p:animEffect transition="in" filter="fade">
+                                      <p:cBhvr>
+                                        <p:cTn id="28" dur="500"/>
+                                        <p:tgtEl>
+                                          <p:spTgt spid="3">
+                                            <p:txEl>
+                                              <p:pRg st="5" end="5"/>
+                                            </p:txEl>
+                                          </p:spTgt>
+                                        </p:tgtEl>
+                                      </p:cBhvr>
+                                    </p:animEffect>
+                                  </p:childTnLst>
+                                </p:cTn>
+                              </p:par>
+                              <p:par>
+                                <p:cTn id="29" presetID="10" presetClass="entr" presetSubtype="0" fill="hold" grpId="0" nodeType="withEffect">
+                                  <p:stCondLst>
+                                    <p:cond delay="0"/>
+                                  </p:stCondLst>
+                                  <p:childTnLst>
+                                    <p:set>
+                                      <p:cBhvr>
+                                        <p:cTn id="30" dur="1" fill="hold">
+                                          <p:stCondLst>
+                                            <p:cond delay="0"/>
+                                          </p:stCondLst>
+                                        </p:cTn>
+                                        <p:tgtEl>
+                                          <p:spTgt spid="3">
+                                            <p:txEl>
+                                              <p:pRg st="6" end="6"/>
+                                            </p:txEl>
+                                          </p:spTgt>
+                                        </p:tgtEl>
+                                        <p:attrNameLst>
+                                          <p:attrName>style.visibility</p:attrName>
+                                        </p:attrNameLst>
+                                      </p:cBhvr>
+                                      <p:to>
+                                        <p:strVal val="visible"/>
+                                      </p:to>
+                                    </p:set>
+                                    <p:animEffect transition="in" filter="fade">
+                                      <p:cBhvr>
+                                        <p:cTn id="31" dur="500"/>
+                                        <p:tgtEl>
+                                          <p:spTgt spid="3">
+                                            <p:txEl>
+                                              <p:pRg st="6" end="6"/>
+                                            </p:txEl>
+                                          </p:spTgt>
+                                        </p:tgtEl>
+                                      </p:cBhvr>
+                                    </p:animEffect>
+                                  </p:childTnLst>
+                                </p:cTn>
+                              </p:par>
+                              <p:par>
+                                <p:cTn id="32" presetID="10" presetClass="entr" presetSubtype="0" fill="hold" grpId="0" nodeType="withEffect">
+                                  <p:stCondLst>
+                                    <p:cond delay="0"/>
+                                  </p:stCondLst>
+                                  <p:childTnLst>
+                                    <p:set>
+                                      <p:cBhvr>
+                                        <p:cTn id="33" dur="1" fill="hold">
+                                          <p:stCondLst>
+                                            <p:cond delay="0"/>
+                                          </p:stCondLst>
+                                        </p:cTn>
+                                        <p:tgtEl>
+                                          <p:spTgt spid="3">
+                                            <p:txEl>
+                                              <p:pRg st="7" end="7"/>
+                                            </p:txEl>
+                                          </p:spTgt>
+                                        </p:tgtEl>
+                                        <p:attrNameLst>
+                                          <p:attrName>style.visibility</p:attrName>
+                                        </p:attrNameLst>
+                                      </p:cBhvr>
+                                      <p:to>
+                                        <p:strVal val="visible"/>
+                                      </p:to>
+                                    </p:set>
+                                    <p:animEffect transition="in" filter="fade">
+                                      <p:cBhvr>
+                                        <p:cTn id="34" dur="500"/>
+                                        <p:tgtEl>
+                                          <p:spTgt spid="3">
+                                            <p:txEl>
+                                              <p:pRg st="7" end="7"/>
+                                            </p:txEl>
+                                          </p:spTgt>
+                                        </p:tgtEl>
+                                      </p:cBhvr>
+                                    </p:animEffect>
+                                  </p:childTnLst>
+                                </p:cTn>
+                              </p:par>
+                            </p:childTnLst>
+                          </p:cTn>
+                        </p:par>
+                      </p:childTnLst>
+                    </p:cTn>
+                  </p:par>
+                  <p:par>
+                    <p:cTn id="35" fill="hold">
+                      <p:stCondLst>
+                        <p:cond delay="indefinite"/>
+                      </p:stCondLst>
+                      <p:childTnLst>
+                        <p:par>
+                          <p:cTn id="36" fill="hold">
+                            <p:stCondLst>
+                              <p:cond delay="0"/>
+                            </p:stCondLst>
+                            <p:childTnLst>
+                              <p:par>
+                                <p:cTn id="37" presetID="10" presetClass="entr" presetSubtype="0" fill="hold" nodeType="clickEffect">
+                                  <p:stCondLst>
+                                    <p:cond delay="0"/>
+                                  </p:stCondLst>
+                                  <p:childTnLst>
+                                    <p:set>
+                                      <p:cBhvr>
+                                        <p:cTn id="38" dur="1" fill="hold">
+                                          <p:stCondLst>
+                                            <p:cond delay="0"/>
+                                          </p:stCondLst>
+                                        </p:cTn>
+                                        <p:tgtEl>
+                                          <p:spTgt spid="11"/>
+                                        </p:tgtEl>
+                                        <p:attrNameLst>
+                                          <p:attrName>style.visibility</p:attrName>
+                                        </p:attrNameLst>
+                                      </p:cBhvr>
+                                      <p:to>
+                                        <p:strVal val="visible"/>
+                                      </p:to>
+                                    </p:set>
+                                    <p:animEffect transition="in" filter="fade">
+                                      <p:cBhvr>
+                                        <p:cTn id="39" dur="500"/>
+                                        <p:tgtEl>
+                                          <p:spTgt spid="11"/>
+                                        </p:tgtEl>
+                                      </p:cBhvr>
+                                    </p:animEffect>
+                                  </p:childTnLst>
+                                </p:cTn>
+                              </p:par>
+                              <p:par>
+                                <p:cTn id="40" presetID="10" presetClass="entr" presetSubtype="0" fill="hold" grpId="0" nodeType="withEffect">
+                                  <p:stCondLst>
+                                    <p:cond delay="0"/>
+                                  </p:stCondLst>
+                                  <p:childTnLst>
+                                    <p:set>
+                                      <p:cBhvr>
+                                        <p:cTn id="41" dur="1" fill="hold">
+                                          <p:stCondLst>
+                                            <p:cond delay="0"/>
+                                          </p:stCondLst>
+                                        </p:cTn>
+                                        <p:tgtEl>
+                                          <p:spTgt spid="7"/>
+                                        </p:tgtEl>
+                                        <p:attrNameLst>
+                                          <p:attrName>style.visibility</p:attrName>
+                                        </p:attrNameLst>
+                                      </p:cBhvr>
+                                      <p:to>
+                                        <p:strVal val="visible"/>
+                                      </p:to>
+                                    </p:set>
+                                    <p:animEffect transition="in" filter="fade">
+                                      <p:cBhvr>
+                                        <p:cTn id="42" dur="500"/>
+                                        <p:tgtEl>
+                                          <p:spTgt spid="7"/>
+                                        </p:tgtEl>
+                                      </p:cBhvr>
+                                    </p:animEffect>
+                                  </p:childTnLst>
+                                </p:cTn>
+                              </p:par>
+                              <p:par>
+                                <p:cTn id="43" presetID="10" presetClass="entr" presetSubtype="0" fill="hold" grpId="0" nodeType="withEffect">
+                                  <p:stCondLst>
+                                    <p:cond delay="0"/>
+                                  </p:stCondLst>
+                                  <p:childTnLst>
+                                    <p:set>
+                                      <p:cBhvr>
+                                        <p:cTn id="44" dur="1" fill="hold">
+                                          <p:stCondLst>
+                                            <p:cond delay="0"/>
+                                          </p:stCondLst>
+                                        </p:cTn>
+                                        <p:tgtEl>
+                                          <p:spTgt spid="9"/>
+                                        </p:tgtEl>
+                                        <p:attrNameLst>
+                                          <p:attrName>style.visibility</p:attrName>
+                                        </p:attrNameLst>
+                                      </p:cBhvr>
+                                      <p:to>
+                                        <p:strVal val="visible"/>
+                                      </p:to>
+                                    </p:set>
+                                    <p:animEffect transition="in" filter="fade">
+                                      <p:cBhvr>
+                                        <p:cTn id="45" dur="500"/>
+                                        <p:tgtEl>
+                                          <p:spTgt spid="9"/>
+                                        </p:tgtEl>
+                                      </p:cBhvr>
+                                    </p:animEffect>
+                                  </p:childTnLst>
+                                </p:cTn>
+                              </p:par>
+                              <p:par>
+                                <p:cTn id="46" presetID="10" presetClass="entr" presetSubtype="0" fill="hold" grpId="0" nodeType="withEffect">
+                                  <p:stCondLst>
+                                    <p:cond delay="0"/>
+                                  </p:stCondLst>
+                                  <p:childTnLst>
+                                    <p:set>
+                                      <p:cBhvr>
+                                        <p:cTn id="47" dur="1" fill="hold">
+                                          <p:stCondLst>
+                                            <p:cond delay="0"/>
+                                          </p:stCondLst>
+                                        </p:cTn>
+                                        <p:tgtEl>
+                                          <p:spTgt spid="6"/>
+                                        </p:tgtEl>
+                                        <p:attrNameLst>
+                                          <p:attrName>style.visibility</p:attrName>
+                                        </p:attrNameLst>
+                                      </p:cBhvr>
+                                      <p:to>
+                                        <p:strVal val="visible"/>
+                                      </p:to>
+                                    </p:set>
+                                    <p:animEffect transition="in" filter="fade">
+                                      <p:cBhvr>
+                                        <p:cTn id="48" dur="500"/>
+                                        <p:tgtEl>
+                                          <p:spTgt spid="6"/>
+                                        </p:tgtEl>
+                                      </p:cBhvr>
+                                    </p:animEffect>
+                                  </p:childTnLst>
+                                </p:cTn>
+                              </p:par>
+                            </p:childTnLst>
+                          </p:cTn>
+                        </p:par>
+                      </p:childTnLst>
+                    </p:cTn>
+                  </p:par>
+                  <p:par>
+                    <p:cTn id="49" fill="hold">
+                      <p:stCondLst>
+                        <p:cond delay="indefinite"/>
+                      </p:stCondLst>
+                      <p:childTnLst>
+                        <p:par>
+                          <p:cTn id="50" fill="hold">
+                            <p:stCondLst>
+                              <p:cond delay="0"/>
+                            </p:stCondLst>
+                            <p:childTnLst>
+                              <p:par>
+                                <p:cTn id="51" presetID="10" presetClass="entr" presetSubtype="0" fill="hold" grpId="0" nodeType="clickEffect">
+                                  <p:stCondLst>
+                                    <p:cond delay="0"/>
+                                  </p:stCondLst>
+                                  <p:childTnLst>
+                                    <p:set>
+                                      <p:cBhvr>
+                                        <p:cTn id="52" dur="1" fill="hold">
+                                          <p:stCondLst>
+                                            <p:cond delay="0"/>
+                                          </p:stCondLst>
+                                        </p:cTn>
+                                        <p:tgtEl>
+                                          <p:spTgt spid="17"/>
+                                        </p:tgtEl>
+                                        <p:attrNameLst>
+                                          <p:attrName>style.visibility</p:attrName>
+                                        </p:attrNameLst>
+                                      </p:cBhvr>
+                                      <p:to>
+                                        <p:strVal val="visible"/>
+                                      </p:to>
+                                    </p:set>
+                                    <p:animEffect transition="in" filter="fade">
+                                      <p:cBhvr>
+                                        <p:cTn id="53" dur="500"/>
+                                        <p:tgtEl>
+                                          <p:spTgt spid="17"/>
+                                        </p:tgtEl>
+                                      </p:cBhvr>
+                                    </p:animEffect>
+                                  </p:childTnLst>
+                                </p:cTn>
+                              </p:par>
+                            </p:childTnLst>
+                          </p:cTn>
+                        </p:par>
+                      </p:childTnLst>
+                    </p:cTn>
+                  </p:par>
+                  <p:par>
+                    <p:cTn id="54" fill="hold">
+                      <p:stCondLst>
+                        <p:cond delay="indefinite"/>
+                      </p:stCondLst>
+                      <p:childTnLst>
+                        <p:par>
+                          <p:cTn id="55" fill="hold">
+                            <p:stCondLst>
+                              <p:cond delay="0"/>
+                            </p:stCondLst>
+                            <p:childTnLst>
+                              <p:par>
+                                <p:cTn id="56" presetID="10" presetClass="entr" presetSubtype="0" fill="hold" nodeType="clickEffect">
+                                  <p:stCondLst>
+                                    <p:cond delay="0"/>
+                                  </p:stCondLst>
+                                  <p:childTnLst>
+                                    <p:set>
+                                      <p:cBhvr>
+                                        <p:cTn id="57" dur="1" fill="hold">
+                                          <p:stCondLst>
+                                            <p:cond delay="0"/>
+                                          </p:stCondLst>
+                                        </p:cTn>
+                                        <p:tgtEl>
+                                          <p:spTgt spid="17">
+                                            <p:txEl>
+                                              <p:pRg st="2" end="2"/>
+                                            </p:txEl>
+                                          </p:spTgt>
+                                        </p:tgtEl>
+                                        <p:attrNameLst>
+                                          <p:attrName>style.visibility</p:attrName>
+                                        </p:attrNameLst>
+                                      </p:cBhvr>
+                                      <p:to>
+                                        <p:strVal val="visible"/>
+                                      </p:to>
+                                    </p:set>
+                                    <p:animEffect transition="in" filter="fade">
+                                      <p:cBhvr>
+                                        <p:cTn id="58" dur="500"/>
+                                        <p:tgtEl>
+                                          <p:spTgt spid="17">
+                                            <p:txEl>
+                                              <p:pRg st="2" end="2"/>
+                                            </p:txEl>
+                                          </p:spTgt>
+                                        </p:tgtEl>
+                                      </p:cBhvr>
+                                    </p:animEffect>
+                                  </p:childTnLst>
+                                </p:cTn>
+                              </p:par>
+                            </p:childTnLst>
+                          </p:cTn>
+                        </p:par>
+                      </p:childTnLst>
+                    </p:cTn>
+                  </p:par>
+                </p:childTnLst>
+              </p:cTn>
+              <p:prevCondLst>
+                <p:cond evt="onPrev" delay="0">
+                  <p:tgtEl>
+                    <p:sldTgt/>
+                  </p:tgtEl>
+                </p:cond>
+              </p:prevCondLst>
+              <p:nextCondLst>
+                <p:cond evt="onNext" delay="0">
+                  <p:tgtEl>
+                    <p:sldTgt/>
+                  </p:tgtEl>
+                </p:cond>
+              </p:nextCondLst>
+            </p:seq>
+          </p:childTnLst>
+        </p:cTn>
+      </p:par>
+    </p:tnLst>
+    <p:bldLst>
+      <p:bldP spid="9" grpId="0" animBg="1"/>
+      <p:bldP spid="8" grpId="0" animBg="1"/>
+      <p:bldP spid="3" grpId="0" build="p"/>
+      <p:bldP spid="4" grpId="0"/>
+      <p:bldP spid="6" grpId="0"/>
+      <p:bldP spid="7" grpId="0"/>
+      <p:bldP spid="17" grpId="0" animBg="1"/>
+    </p:bldLst>
+  </p:timing>
 </p:sld>
 </file>
 
@@ -36417,7 +37868,7 @@
                   <a:schemeClr val="tx2"/>
                 </a:solidFill>
               </a:rPr>
-              <a:t>This is contains JavaScript code</a:t>
+              <a:t>This adds some JavaScript to the HTML page</a:t>
             </a:r>
           </a:p>
           <a:p>
@@ -36977,7 +38428,7 @@
                 </a:solidFill>
                 <a:latin typeface="Consolas" panose="020B0609020204030204" pitchFamily="49" charset="0"/>
               </a:rPr>
-              <a:t>"Hello, world!"</a:t>
+              <a:t>"Hello, World!"</a:t>
             </a:r>
             <a:r>
               <a:rPr lang="en-US" dirty="0">
@@ -37008,7 +38459,7 @@
             </a:r>
             <a:r>
               <a:rPr lang="en-US" dirty="0"/>
-              <a:t> keyword</a:t>
+              <a:t> keyword (must be lowercase)</a:t>
             </a:r>
           </a:p>
           <a:p>
@@ -37079,7 +38530,7 @@
         </p:blipFill>
         <p:spPr>
           <a:xfrm>
-            <a:off x="5181600" y="2835431"/>
+            <a:off x="5181600" y="3314700"/>
             <a:ext cx="6257003" cy="1872938"/>
           </a:xfrm>
           <a:prstGeom prst="rect">
@@ -37087,6 +38538,148 @@
           </a:prstGeom>
         </p:spPr>
       </p:pic>
+      <p:sp>
+        <p:nvSpPr>
+          <p:cNvPr id="5" name="Rectangle 4">
+            <a:extLst>
+              <a:ext uri="{FF2B5EF4-FFF2-40B4-BE49-F238E27FC236}">
+                <a16:creationId xmlns:a16="http://schemas.microsoft.com/office/drawing/2014/main" id="{A4313198-B839-4138-B755-F6EDCF5F2811}"/>
+              </a:ext>
+            </a:extLst>
+          </p:cNvPr>
+          <p:cNvSpPr/>
+          <p:nvPr/>
+        </p:nvSpPr>
+        <p:spPr bwMode="auto">
+          <a:xfrm>
+            <a:off x="6896100" y="1415738"/>
+            <a:ext cx="4686300" cy="1371600"/>
+          </a:xfrm>
+          <a:prstGeom prst="rect">
+            <a:avLst/>
+          </a:prstGeom>
+          <a:solidFill>
+            <a:schemeClr val="tx1"/>
+          </a:solidFill>
+          <a:ln w="12700">
+            <a:solidFill>
+              <a:schemeClr val="tx2"/>
+            </a:solidFill>
+            <a:miter lim="800000"/>
+            <a:headEnd type="none" w="med" len="med"/>
+            <a:tailEnd type="none" w="med" len="med"/>
+          </a:ln>
+          <a:effectLst/>
+        </p:spPr>
+        <p:style>
+          <a:lnRef idx="1">
+            <a:schemeClr val="accent2"/>
+          </a:lnRef>
+          <a:fillRef idx="3">
+            <a:schemeClr val="accent2"/>
+          </a:fillRef>
+          <a:effectRef idx="2">
+            <a:schemeClr val="accent2"/>
+          </a:effectRef>
+          <a:fontRef idx="minor">
+            <a:schemeClr val="lt1"/>
+          </a:fontRef>
+        </p:style>
+        <p:txBody>
+          <a:bodyPr rot="0" spcFirstLastPara="0" vertOverflow="overflow" horzOverflow="overflow" vert="horz" wrap="square" lIns="182880" tIns="146304" rIns="182880" bIns="146304" numCol="1" spcCol="0" rtlCol="0" fromWordArt="0" anchor="t" anchorCtr="0" forceAA="0" compatLnSpc="1">
+            <a:prstTxWarp prst="textNoShape">
+              <a:avLst/>
+            </a:prstTxWarp>
+            <a:noAutofit/>
+          </a:bodyPr>
+          <a:lstStyle/>
+          <a:p>
+            <a:pPr algn="ctr" defTabSz="932472" fontAlgn="base">
+              <a:lnSpc>
+                <a:spcPct val="90000"/>
+              </a:lnSpc>
+              <a:spcBef>
+                <a:spcPct val="0"/>
+              </a:spcBef>
+              <a:spcAft>
+                <a:spcPct val="0"/>
+              </a:spcAft>
+            </a:pPr>
+            <a:r>
+              <a:rPr lang="en-US" sz="2400" b="1" i="1" dirty="0">
+                <a:gradFill>
+                  <a:gsLst>
+                    <a:gs pos="0">
+                      <a:srgbClr val="FFFFFF"/>
+                    </a:gs>
+                    <a:gs pos="100000">
+                      <a:srgbClr val="FFFFFF"/>
+                    </a:gs>
+                  </a:gsLst>
+                  <a:lin ang="5400000" scaled="0"/>
+                </a:gradFill>
+                <a:ea typeface="Segoe UI" pitchFamily="34" charset="0"/>
+                <a:cs typeface="Segoe UI" pitchFamily="34" charset="0"/>
+              </a:rPr>
+              <a:t>Keywords</a:t>
+            </a:r>
+            <a:r>
+              <a:rPr lang="en-US" sz="2400" dirty="0">
+                <a:gradFill>
+                  <a:gsLst>
+                    <a:gs pos="0">
+                      <a:srgbClr val="FFFFFF"/>
+                    </a:gs>
+                    <a:gs pos="100000">
+                      <a:srgbClr val="FFFFFF"/>
+                    </a:gs>
+                  </a:gsLst>
+                  <a:lin ang="5400000" scaled="0"/>
+                </a:gradFill>
+                <a:ea typeface="Segoe UI" pitchFamily="34" charset="0"/>
+                <a:cs typeface="Segoe UI" pitchFamily="34" charset="0"/>
+              </a:rPr>
+              <a:t>, or </a:t>
+            </a:r>
+            <a:r>
+              <a:rPr lang="en-US" sz="2400" b="1" i="1" dirty="0">
+                <a:gradFill>
+                  <a:gsLst>
+                    <a:gs pos="0">
+                      <a:srgbClr val="FFFFFF"/>
+                    </a:gs>
+                    <a:gs pos="100000">
+                      <a:srgbClr val="FFFFFF"/>
+                    </a:gs>
+                  </a:gsLst>
+                  <a:lin ang="5400000" scaled="0"/>
+                </a:gradFill>
+                <a:ea typeface="Segoe UI" pitchFamily="34" charset="0"/>
+                <a:cs typeface="Segoe UI" pitchFamily="34" charset="0"/>
+              </a:rPr>
+              <a:t>reserved words</a:t>
+            </a:r>
+            <a:r>
+              <a:rPr lang="en-US" sz="2400" dirty="0">
+                <a:gradFill>
+                  <a:gsLst>
+                    <a:gs pos="0">
+                      <a:srgbClr val="FFFFFF"/>
+                    </a:gs>
+                    <a:gs pos="100000">
+                      <a:srgbClr val="FFFFFF"/>
+                    </a:gs>
+                  </a:gsLst>
+                  <a:lin ang="5400000" scaled="0"/>
+                </a:gradFill>
+                <a:ea typeface="Segoe UI" pitchFamily="34" charset="0"/>
+                <a:cs typeface="Segoe UI" pitchFamily="34" charset="0"/>
+              </a:rPr>
+              <a:t>, are pieces of text that have a special meaning in JavaScript</a:t>
+            </a:r>
+          </a:p>
+        </p:txBody>
+      </p:sp>
     </p:spTree>
     <p:extLst>
       <p:ext uri="{BB962C8B-B14F-4D97-AF65-F5344CB8AC3E}">
@@ -37195,11 +38788,7 @@
                                           </p:stCondLst>
                                         </p:cTn>
                                         <p:tgtEl>
-                                          <p:spTgt spid="3">
-                                            <p:txEl>
-                                              <p:pRg st="3" end="3"/>
-                                            </p:txEl>
-                                          </p:spTgt>
+                                          <p:spTgt spid="5"/>
                                         </p:tgtEl>
                                         <p:attrNameLst>
                                           <p:attrName>style.visibility</p:attrName>
@@ -37213,11 +38802,7 @@
                                       <p:cBhvr>
                                         <p:cTn id="12" dur="500"/>
                                         <p:tgtEl>
-                                          <p:spTgt spid="3">
-                                            <p:txEl>
-                                              <p:pRg st="3" end="3"/>
-                                            </p:txEl>
-                                          </p:spTgt>
+                                          <p:spTgt spid="5"/>
                                         </p:tgtEl>
                                       </p:cBhvr>
                                     </p:animEffect>
@@ -37258,7 +38843,7 @@
                                         <p:tgtEl>
                                           <p:spTgt spid="3">
                                             <p:txEl>
-                                              <p:pRg st="4" end="4"/>
+                                              <p:pRg st="3" end="3"/>
                                             </p:txEl>
                                           </p:spTgt>
                                         </p:tgtEl>
@@ -37276,7 +38861,7 @@
                                         <p:tgtEl>
                                           <p:spTgt spid="3">
                                             <p:txEl>
-                                              <p:pRg st="4" end="4"/>
+                                              <p:pRg st="3" end="3"/>
                                             </p:txEl>
                                           </p:spTgt>
                                         </p:tgtEl>
@@ -37319,7 +38904,7 @@
                                         <p:tgtEl>
                                           <p:spTgt spid="3">
                                             <p:txEl>
-                                              <p:pRg st="5" end="5"/>
+                                              <p:pRg st="4" end="4"/>
                                             </p:txEl>
                                           </p:spTgt>
                                         </p:tgtEl>
@@ -37337,7 +38922,7 @@
                                         <p:tgtEl>
                                           <p:spTgt spid="3">
                                             <p:txEl>
-                                              <p:pRg st="5" end="5"/>
+                                              <p:pRg st="4" end="4"/>
                                             </p:txEl>
                                           </p:spTgt>
                                         </p:tgtEl>
@@ -37380,7 +38965,7 @@
                                         <p:tgtEl>
                                           <p:spTgt spid="3">
                                             <p:txEl>
-                                              <p:pRg st="6" end="6"/>
+                                              <p:pRg st="5" end="5"/>
                                             </p:txEl>
                                           </p:spTgt>
                                         </p:tgtEl>
@@ -37398,7 +38983,7 @@
                                         <p:tgtEl>
                                           <p:spTgt spid="3">
                                             <p:txEl>
-                                              <p:pRg st="6" end="6"/>
+                                              <p:pRg st="5" end="5"/>
                                             </p:txEl>
                                           </p:spTgt>
                                         </p:tgtEl>
@@ -37441,7 +39026,7 @@
                                         <p:tgtEl>
                                           <p:spTgt spid="3">
                                             <p:txEl>
-                                              <p:pRg st="7" end="7"/>
+                                              <p:pRg st="6" end="6"/>
                                             </p:txEl>
                                           </p:spTgt>
                                         </p:tgtEl>
@@ -37459,7 +39044,7 @@
                                         <p:tgtEl>
                                           <p:spTgt spid="3">
                                             <p:txEl>
-                                              <p:pRg st="7" end="7"/>
+                                              <p:pRg st="6" end="6"/>
                                             </p:txEl>
                                           </p:spTgt>
                                         </p:tgtEl>
@@ -37502,7 +39087,7 @@
                                         <p:tgtEl>
                                           <p:spTgt spid="3">
                                             <p:txEl>
-                                              <p:pRg st="8" end="8"/>
+                                              <p:pRg st="7" end="7"/>
                                             </p:txEl>
                                           </p:spTgt>
                                         </p:tgtEl>
@@ -37520,7 +39105,7 @@
                                         <p:tgtEl>
                                           <p:spTgt spid="3">
                                             <p:txEl>
-                                              <p:pRg st="8" end="8"/>
+                                              <p:pRg st="7" end="7"/>
                                             </p:txEl>
                                           </p:spTgt>
                                         </p:tgtEl>
@@ -37548,7 +39133,7 @@
                             </p:stCondLst>
                             <p:childTnLst>
                               <p:par>
-                                <p:cTn id="40" presetID="10" presetClass="entr" presetSubtype="0" fill="hold" nodeType="clickEffect">
+                                <p:cTn id="40" presetID="10" presetClass="entr" presetSubtype="0" fill="hold" grpId="0" nodeType="clickEffect">
                                   <p:stCondLst>
                                     <p:cond delay="0"/>
                                   </p:stCondLst>
@@ -37556,6 +39141,67 @@
                                     <p:set>
                                       <p:cBhvr>
                                         <p:cTn id="41" dur="1" fill="hold">
+                                          <p:stCondLst>
+                                            <p:cond delay="0"/>
+                                          </p:stCondLst>
+                                        </p:cTn>
+                                        <p:tgtEl>
+                                          <p:spTgt spid="3">
+                                            <p:txEl>
+                                              <p:pRg st="8" end="8"/>
+                                            </p:txEl>
+                                          </p:spTgt>
+                                        </p:tgtEl>
+                                        <p:attrNameLst>
+                                          <p:attrName>style.visibility</p:attrName>
+                                        </p:attrNameLst>
+                                      </p:cBhvr>
+                                      <p:to>
+                                        <p:strVal val="visible"/>
+                                      </p:to>
+                                    </p:set>
+                                    <p:animEffect transition="in" filter="fade">
+                                      <p:cBhvr>
+                                        <p:cTn id="42" dur="500"/>
+                                        <p:tgtEl>
+                                          <p:spTgt spid="3">
+                                            <p:txEl>
+                                              <p:pRg st="8" end="8"/>
+                                            </p:txEl>
+                                          </p:spTgt>
+                                        </p:tgtEl>
+                                      </p:cBhvr>
+                                    </p:animEffect>
+                                  </p:childTnLst>
+                                </p:cTn>
+                              </p:par>
+                            </p:childTnLst>
+                          </p:cTn>
+                        </p:par>
+                      </p:childTnLst>
+                    </p:cTn>
+                  </p:par>
+                  <p:par>
+                    <p:cTn id="43" fill="hold">
+                      <p:stCondLst>
+                        <p:cond delay="indefinite"/>
+                      </p:stCondLst>
+                      <p:childTnLst>
+                        <p:par>
+                          <p:cTn id="44" fill="hold">
+                            <p:stCondLst>
+                              <p:cond delay="0"/>
+                            </p:stCondLst>
+                            <p:childTnLst>
+                              <p:par>
+                                <p:cTn id="45" presetID="10" presetClass="entr" presetSubtype="0" fill="hold" nodeType="clickEffect">
+                                  <p:stCondLst>
+                                    <p:cond delay="0"/>
+                                  </p:stCondLst>
+                                  <p:childTnLst>
+                                    <p:set>
+                                      <p:cBhvr>
+                                        <p:cTn id="46" dur="1" fill="hold">
                                           <p:stCondLst>
                                             <p:cond delay="0"/>
                                           </p:stCondLst>
@@ -37573,7 +39219,7 @@
                                     </p:set>
                                     <p:animEffect transition="in" filter="fade">
                                       <p:cBhvr>
-                                        <p:cTn id="42" dur="500"/>
+                                        <p:cTn id="47" dur="500"/>
                                         <p:tgtEl>
                                           <p:spTgt spid="4"/>
                                         </p:tgtEl>
@@ -37611,6 +39257,7 @@
     </p:tnLst>
     <p:bldLst>
       <p:bldP spid="3" grpId="0" uiExpand="1" build="p"/>
+      <p:bldP spid="5" grpId="0" animBg="1"/>
     </p:bldLst>
   </p:timing>
 </p:sld>
@@ -37736,10 +39383,10 @@
       </p:grpSpPr>
       <p:sp>
         <p:nvSpPr>
-          <p:cNvPr id="2" name="Text Placeholder 1">
+          <p:cNvPr id="2" name="Title 1">
             <a:extLst>
               <a:ext uri="{FF2B5EF4-FFF2-40B4-BE49-F238E27FC236}">
-                <a16:creationId xmlns:a16="http://schemas.microsoft.com/office/drawing/2014/main" id="{B7A791CB-AA68-4769-B673-C015ECF3D832}"/>
+                <a16:creationId xmlns:a16="http://schemas.microsoft.com/office/drawing/2014/main" id="{1AAE2480-6EC5-4F82-A8AF-E7F04F14C1DC}"/>
               </a:ext>
             </a:extLst>
           </p:cNvPr>
@@ -37747,7 +39394,7 @@
             <a:spLocks noGrp="1"/>
           </p:cNvSpPr>
           <p:nvPr>
-            <p:ph type="body" sz="quarter" idx="10"/>
+            <p:ph type="title"/>
           </p:nvPr>
         </p:nvSpPr>
         <p:spPr/>
@@ -37756,8 +39403,69 @@
           <a:lstStyle/>
           <a:p>
             <a:r>
-              <a:rPr lang="en-US"/>
-              <a:t>Questions?</a:t>
+              <a:rPr lang="en-US" dirty="0"/>
+              <a:t>Hello, Drake!</a:t>
+            </a:r>
+          </a:p>
+        </p:txBody>
+      </p:sp>
+      <p:sp>
+        <p:nvSpPr>
+          <p:cNvPr id="5" name="TextBox 4">
+            <a:extLst>
+              <a:ext uri="{FF2B5EF4-FFF2-40B4-BE49-F238E27FC236}">
+                <a16:creationId xmlns:a16="http://schemas.microsoft.com/office/drawing/2014/main" id="{57951CC6-2030-45B1-873D-920D27F40FFC}"/>
+              </a:ext>
+            </a:extLst>
+          </p:cNvPr>
+          <p:cNvSpPr txBox="1"/>
+          <p:nvPr/>
+        </p:nvSpPr>
+        <p:spPr>
+          <a:xfrm>
+            <a:off x="391668" y="2875002"/>
+            <a:ext cx="11430000" cy="1107996"/>
+          </a:xfrm>
+          <a:prstGeom prst="rect">
+            <a:avLst/>
+          </a:prstGeom>
+          <a:noFill/>
+        </p:spPr>
+        <p:txBody>
+          <a:bodyPr wrap="square">
+            <a:spAutoFit/>
+          </a:bodyPr>
+          <a:lstStyle/>
+          <a:p>
+            <a:pPr marL="0" indent="0" algn="ctr">
+              <a:buNone/>
+            </a:pPr>
+            <a:r>
+              <a:rPr lang="en-US" sz="6600" dirty="0">
+                <a:solidFill>
+                  <a:srgbClr val="000000"/>
+                </a:solidFill>
+                <a:latin typeface="Consolas" panose="020B0609020204030204" pitchFamily="49" charset="0"/>
+              </a:rPr>
+              <a:t>alert(</a:t>
+            </a:r>
+            <a:r>
+              <a:rPr lang="en-US" sz="6600" dirty="0">
+                <a:solidFill>
+                  <a:srgbClr val="A31515"/>
+                </a:solidFill>
+                <a:latin typeface="Consolas" panose="020B0609020204030204" pitchFamily="49" charset="0"/>
+              </a:rPr>
+              <a:t>"Hello, Drake!"</a:t>
+            </a:r>
+            <a:r>
+              <a:rPr lang="en-US" sz="6600" dirty="0">
+                <a:solidFill>
+                  <a:srgbClr val="000000"/>
+                </a:solidFill>
+                <a:latin typeface="Consolas" panose="020B0609020204030204" pitchFamily="49" charset="0"/>
+              </a:rPr>
+              <a:t>);</a:t>
             </a:r>
           </a:p>
         </p:txBody>
@@ -37765,7 +39473,7 @@
     </p:spTree>
     <p:extLst>
       <p:ext uri="{BB962C8B-B14F-4D97-AF65-F5344CB8AC3E}">
-        <p14:creationId xmlns:p14="http://schemas.microsoft.com/office/powerpoint/2010/main" val="2492034236"/>
+        <p14:creationId xmlns:p14="http://schemas.microsoft.com/office/powerpoint/2010/main" val="3270118950"/>
       </p:ext>
     </p:extLst>
   </p:cSld>

</xml_diff>